<commit_message>
Final update for Whale & Jaguar
</commit_message>
<xml_diff>
--- a/Ayala-Usma_Whale_Jaguar_Test.pptx
+++ b/Ayala-Usma_Whale_Jaguar_Test.pptx
@@ -6,6 +6,26 @@
   </p:sldMasterIdLst>
   <p:sldIdLst>
     <p:sldId id="256" r:id="rId3"/>
+    <p:sldId id="257" r:id="rId4"/>
+    <p:sldId id="258" r:id="rId5"/>
+    <p:sldId id="259" r:id="rId6"/>
+    <p:sldId id="260" r:id="rId7"/>
+    <p:sldId id="261" r:id="rId8"/>
+    <p:sldId id="262" r:id="rId9"/>
+    <p:sldId id="263" r:id="rId10"/>
+    <p:sldId id="264" r:id="rId11"/>
+    <p:sldId id="265" r:id="rId12"/>
+    <p:sldId id="266" r:id="rId13"/>
+    <p:sldId id="267" r:id="rId14"/>
+    <p:sldId id="268" r:id="rId15"/>
+    <p:sldId id="269" r:id="rId16"/>
+    <p:sldId id="270" r:id="rId17"/>
+    <p:sldId id="271" r:id="rId18"/>
+    <p:sldId id="272" r:id="rId19"/>
+    <p:sldId id="273" r:id="rId20"/>
+    <p:sldId id="274" r:id="rId21"/>
+    <p:sldId id="275" r:id="rId22"/>
+    <p:sldId id="276" r:id="rId23"/>
   </p:sldIdLst>
   <p:sldSz cx="10080625" cy="5670550"/>
   <p:notesSz cx="7772400" cy="10058400"/>
@@ -53,7 +73,7 @@
       </p:grpSpPr>
       <p:sp>
         <p:nvSpPr>
-          <p:cNvPr id="26" name="PlaceHolder 1"/>
+          <p:cNvPr id="23" name="PlaceHolder 1"/>
           <p:cNvSpPr>
             <a:spLocks noGrp="1"/>
           </p:cNvSpPr>
@@ -64,7 +84,7 @@
         <p:spPr>
           <a:xfrm>
             <a:off x="504000" y="226080"/>
-            <a:ext cx="9071640" cy="946440"/>
+            <a:ext cx="9072000" cy="946440"/>
           </a:xfrm>
           <a:prstGeom prst="rect">
             <a:avLst/>
@@ -84,7 +104,7 @@
       </p:sp>
       <p:sp>
         <p:nvSpPr>
-          <p:cNvPr id="27" name="PlaceHolder 2"/>
+          <p:cNvPr id="24" name="PlaceHolder 2"/>
           <p:cNvSpPr>
             <a:spLocks noGrp="1"/>
           </p:cNvSpPr>
@@ -95,7 +115,7 @@
         <p:spPr>
           <a:xfrm>
             <a:off x="504000" y="1326600"/>
-            <a:ext cx="9071640" cy="1568160"/>
+            <a:ext cx="9072000" cy="1568520"/>
           </a:xfrm>
           <a:prstGeom prst="rect">
             <a:avLst/>
@@ -114,7 +134,7 @@
       </p:sp>
       <p:sp>
         <p:nvSpPr>
-          <p:cNvPr id="28" name="PlaceHolder 3"/>
+          <p:cNvPr id="25" name="PlaceHolder 3"/>
           <p:cNvSpPr>
             <a:spLocks noGrp="1"/>
           </p:cNvSpPr>
@@ -124,8 +144,8 @@
         </p:nvSpPr>
         <p:spPr>
           <a:xfrm>
-            <a:off x="504000" y="3044160"/>
-            <a:ext cx="9071640" cy="1568160"/>
+            <a:off x="504000" y="3044520"/>
+            <a:ext cx="9072000" cy="1568520"/>
           </a:xfrm>
           <a:prstGeom prst="rect">
             <a:avLst/>
@@ -166,7 +186,7 @@
       </p:grpSpPr>
       <p:sp>
         <p:nvSpPr>
-          <p:cNvPr id="29" name="PlaceHolder 1"/>
+          <p:cNvPr id="26" name="PlaceHolder 1"/>
           <p:cNvSpPr>
             <a:spLocks noGrp="1"/>
           </p:cNvSpPr>
@@ -177,7 +197,7 @@
         <p:spPr>
           <a:xfrm>
             <a:off x="504000" y="226080"/>
-            <a:ext cx="9071640" cy="946440"/>
+            <a:ext cx="9072000" cy="946440"/>
           </a:xfrm>
           <a:prstGeom prst="rect">
             <a:avLst/>
@@ -197,7 +217,7 @@
       </p:sp>
       <p:sp>
         <p:nvSpPr>
-          <p:cNvPr id="30" name="PlaceHolder 2"/>
+          <p:cNvPr id="27" name="PlaceHolder 2"/>
           <p:cNvSpPr>
             <a:spLocks noGrp="1"/>
           </p:cNvSpPr>
@@ -208,7 +228,7 @@
         <p:spPr>
           <a:xfrm>
             <a:off x="504000" y="1326600"/>
-            <a:ext cx="4426920" cy="1568160"/>
+            <a:ext cx="4426920" cy="1568520"/>
           </a:xfrm>
           <a:prstGeom prst="rect">
             <a:avLst/>
@@ -227,7 +247,7 @@
       </p:sp>
       <p:sp>
         <p:nvSpPr>
-          <p:cNvPr id="31" name="PlaceHolder 3"/>
+          <p:cNvPr id="28" name="PlaceHolder 3"/>
           <p:cNvSpPr>
             <a:spLocks noGrp="1"/>
           </p:cNvSpPr>
@@ -238,7 +258,7 @@
         <p:spPr>
           <a:xfrm>
             <a:off x="5152680" y="1326600"/>
-            <a:ext cx="4426920" cy="1568160"/>
+            <a:ext cx="4426920" cy="1568520"/>
           </a:xfrm>
           <a:prstGeom prst="rect">
             <a:avLst/>
@@ -257,7 +277,7 @@
       </p:sp>
       <p:sp>
         <p:nvSpPr>
-          <p:cNvPr id="32" name="PlaceHolder 4"/>
+          <p:cNvPr id="29" name="PlaceHolder 4"/>
           <p:cNvSpPr>
             <a:spLocks noGrp="1"/>
           </p:cNvSpPr>
@@ -267,8 +287,8 @@
         </p:nvSpPr>
         <p:spPr>
           <a:xfrm>
-            <a:off x="504000" y="3044160"/>
-            <a:ext cx="4426920" cy="1568160"/>
+            <a:off x="504000" y="3044520"/>
+            <a:ext cx="4426920" cy="1568520"/>
           </a:xfrm>
           <a:prstGeom prst="rect">
             <a:avLst/>
@@ -287,7 +307,7 @@
       </p:sp>
       <p:sp>
         <p:nvSpPr>
-          <p:cNvPr id="33" name="PlaceHolder 5"/>
+          <p:cNvPr id="30" name="PlaceHolder 5"/>
           <p:cNvSpPr>
             <a:spLocks noGrp="1"/>
           </p:cNvSpPr>
@@ -297,8 +317,8 @@
         </p:nvSpPr>
         <p:spPr>
           <a:xfrm>
-            <a:off x="5152680" y="3044160"/>
-            <a:ext cx="4426920" cy="1568160"/>
+            <a:off x="5152680" y="3044520"/>
+            <a:ext cx="4426920" cy="1568520"/>
           </a:xfrm>
           <a:prstGeom prst="rect">
             <a:avLst/>
@@ -339,7 +359,7 @@
       </p:grpSpPr>
       <p:sp>
         <p:nvSpPr>
-          <p:cNvPr id="34" name="PlaceHolder 1"/>
+          <p:cNvPr id="31" name="PlaceHolder 1"/>
           <p:cNvSpPr>
             <a:spLocks noGrp="1"/>
           </p:cNvSpPr>
@@ -350,7 +370,7 @@
         <p:spPr>
           <a:xfrm>
             <a:off x="504000" y="226080"/>
-            <a:ext cx="9071640" cy="946440"/>
+            <a:ext cx="9072000" cy="946440"/>
           </a:xfrm>
           <a:prstGeom prst="rect">
             <a:avLst/>
@@ -370,7 +390,7 @@
       </p:sp>
       <p:sp>
         <p:nvSpPr>
-          <p:cNvPr id="35" name="PlaceHolder 2"/>
+          <p:cNvPr id="32" name="PlaceHolder 2"/>
           <p:cNvSpPr>
             <a:spLocks noGrp="1"/>
           </p:cNvSpPr>
@@ -381,7 +401,7 @@
         <p:spPr>
           <a:xfrm>
             <a:off x="504000" y="1326600"/>
-            <a:ext cx="2920680" cy="1568160"/>
+            <a:ext cx="2921040" cy="1568520"/>
           </a:xfrm>
           <a:prstGeom prst="rect">
             <a:avLst/>
@@ -400,7 +420,7 @@
       </p:sp>
       <p:sp>
         <p:nvSpPr>
-          <p:cNvPr id="36" name="PlaceHolder 3"/>
+          <p:cNvPr id="33" name="PlaceHolder 3"/>
           <p:cNvSpPr>
             <a:spLocks noGrp="1"/>
           </p:cNvSpPr>
@@ -410,8 +430,8 @@
         </p:nvSpPr>
         <p:spPr>
           <a:xfrm>
-            <a:off x="3571200" y="1326600"/>
-            <a:ext cx="2920680" cy="1568160"/>
+            <a:off x="3571560" y="1326600"/>
+            <a:ext cx="2921040" cy="1568520"/>
           </a:xfrm>
           <a:prstGeom prst="rect">
             <a:avLst/>
@@ -430,7 +450,7 @@
       </p:sp>
       <p:sp>
         <p:nvSpPr>
-          <p:cNvPr id="37" name="PlaceHolder 4"/>
+          <p:cNvPr id="34" name="PlaceHolder 4"/>
           <p:cNvSpPr>
             <a:spLocks noGrp="1"/>
           </p:cNvSpPr>
@@ -440,8 +460,8 @@
         </p:nvSpPr>
         <p:spPr>
           <a:xfrm>
-            <a:off x="6638040" y="1326600"/>
-            <a:ext cx="2920680" cy="1568160"/>
+            <a:off x="6639120" y="1326600"/>
+            <a:ext cx="2921040" cy="1568520"/>
           </a:xfrm>
           <a:prstGeom prst="rect">
             <a:avLst/>
@@ -460,7 +480,7 @@
       </p:sp>
       <p:sp>
         <p:nvSpPr>
-          <p:cNvPr id="38" name="PlaceHolder 5"/>
+          <p:cNvPr id="35" name="PlaceHolder 5"/>
           <p:cNvSpPr>
             <a:spLocks noGrp="1"/>
           </p:cNvSpPr>
@@ -470,8 +490,8 @@
         </p:nvSpPr>
         <p:spPr>
           <a:xfrm>
-            <a:off x="504000" y="3044160"/>
-            <a:ext cx="2920680" cy="1568160"/>
+            <a:off x="504000" y="3044520"/>
+            <a:ext cx="2921040" cy="1568520"/>
           </a:xfrm>
           <a:prstGeom prst="rect">
             <a:avLst/>
@@ -490,7 +510,7 @@
       </p:sp>
       <p:sp>
         <p:nvSpPr>
-          <p:cNvPr id="39" name="PlaceHolder 6"/>
+          <p:cNvPr id="36" name="PlaceHolder 6"/>
           <p:cNvSpPr>
             <a:spLocks noGrp="1"/>
           </p:cNvSpPr>
@@ -500,8 +520,8 @@
         </p:nvSpPr>
         <p:spPr>
           <a:xfrm>
-            <a:off x="3571200" y="3044160"/>
-            <a:ext cx="2920680" cy="1568160"/>
+            <a:off x="3571560" y="3044520"/>
+            <a:ext cx="2921040" cy="1568520"/>
           </a:xfrm>
           <a:prstGeom prst="rect">
             <a:avLst/>
@@ -520,7 +540,7 @@
       </p:sp>
       <p:sp>
         <p:nvSpPr>
-          <p:cNvPr id="40" name="PlaceHolder 7"/>
+          <p:cNvPr id="37" name="PlaceHolder 7"/>
           <p:cNvSpPr>
             <a:spLocks noGrp="1"/>
           </p:cNvSpPr>
@@ -530,8 +550,8 @@
         </p:nvSpPr>
         <p:spPr>
           <a:xfrm>
-            <a:off x="6638040" y="3044160"/>
-            <a:ext cx="2920680" cy="1568160"/>
+            <a:off x="6639120" y="3044520"/>
+            <a:ext cx="2921040" cy="1568520"/>
           </a:xfrm>
           <a:prstGeom prst="rect">
             <a:avLst/>
@@ -572,7 +592,7 @@
       </p:grpSpPr>
       <p:sp>
         <p:nvSpPr>
-          <p:cNvPr id="5" name="PlaceHolder 1"/>
+          <p:cNvPr id="2" name="PlaceHolder 1"/>
           <p:cNvSpPr>
             <a:spLocks noGrp="1"/>
           </p:cNvSpPr>
@@ -583,7 +603,7 @@
         <p:spPr>
           <a:xfrm>
             <a:off x="504000" y="226080"/>
-            <a:ext cx="9071640" cy="946440"/>
+            <a:ext cx="9072000" cy="946440"/>
           </a:xfrm>
           <a:prstGeom prst="rect">
             <a:avLst/>
@@ -603,7 +623,7 @@
       </p:sp>
       <p:sp>
         <p:nvSpPr>
-          <p:cNvPr id="6" name="PlaceHolder 2"/>
+          <p:cNvPr id="3" name="PlaceHolder 2"/>
           <p:cNvSpPr>
             <a:spLocks noGrp="1"/>
           </p:cNvSpPr>
@@ -614,7 +634,7 @@
         <p:spPr>
           <a:xfrm>
             <a:off x="504000" y="1326600"/>
-            <a:ext cx="9071640" cy="3288240"/>
+            <a:ext cx="9072000" cy="3288600"/>
           </a:xfrm>
           <a:prstGeom prst="rect">
             <a:avLst/>
@@ -656,7 +676,7 @@
       </p:grpSpPr>
       <p:sp>
         <p:nvSpPr>
-          <p:cNvPr id="7" name="PlaceHolder 1"/>
+          <p:cNvPr id="4" name="PlaceHolder 1"/>
           <p:cNvSpPr>
             <a:spLocks noGrp="1"/>
           </p:cNvSpPr>
@@ -667,7 +687,7 @@
         <p:spPr>
           <a:xfrm>
             <a:off x="504000" y="226080"/>
-            <a:ext cx="9071640" cy="946440"/>
+            <a:ext cx="9072000" cy="946440"/>
           </a:xfrm>
           <a:prstGeom prst="rect">
             <a:avLst/>
@@ -687,7 +707,7 @@
       </p:sp>
       <p:sp>
         <p:nvSpPr>
-          <p:cNvPr id="8" name="PlaceHolder 2"/>
+          <p:cNvPr id="5" name="PlaceHolder 2"/>
           <p:cNvSpPr>
             <a:spLocks noGrp="1"/>
           </p:cNvSpPr>
@@ -698,7 +718,7 @@
         <p:spPr>
           <a:xfrm>
             <a:off x="504000" y="1326600"/>
-            <a:ext cx="9071640" cy="3288240"/>
+            <a:ext cx="9072000" cy="3288600"/>
           </a:xfrm>
           <a:prstGeom prst="rect">
             <a:avLst/>
@@ -739,7 +759,7 @@
       </p:grpSpPr>
       <p:sp>
         <p:nvSpPr>
-          <p:cNvPr id="9" name="PlaceHolder 1"/>
+          <p:cNvPr id="6" name="PlaceHolder 1"/>
           <p:cNvSpPr>
             <a:spLocks noGrp="1"/>
           </p:cNvSpPr>
@@ -750,7 +770,7 @@
         <p:spPr>
           <a:xfrm>
             <a:off x="504000" y="226080"/>
-            <a:ext cx="9071640" cy="946440"/>
+            <a:ext cx="9072000" cy="946440"/>
           </a:xfrm>
           <a:prstGeom prst="rect">
             <a:avLst/>
@@ -770,7 +790,7 @@
       </p:sp>
       <p:sp>
         <p:nvSpPr>
-          <p:cNvPr id="10" name="PlaceHolder 2"/>
+          <p:cNvPr id="7" name="PlaceHolder 2"/>
           <p:cNvSpPr>
             <a:spLocks noGrp="1"/>
           </p:cNvSpPr>
@@ -781,7 +801,7 @@
         <p:spPr>
           <a:xfrm>
             <a:off x="504000" y="1326600"/>
-            <a:ext cx="4426920" cy="3288240"/>
+            <a:ext cx="4426920" cy="3288600"/>
           </a:xfrm>
           <a:prstGeom prst="rect">
             <a:avLst/>
@@ -800,7 +820,7 @@
       </p:sp>
       <p:sp>
         <p:nvSpPr>
-          <p:cNvPr id="11" name="PlaceHolder 3"/>
+          <p:cNvPr id="8" name="PlaceHolder 3"/>
           <p:cNvSpPr>
             <a:spLocks noGrp="1"/>
           </p:cNvSpPr>
@@ -811,7 +831,7 @@
         <p:spPr>
           <a:xfrm>
             <a:off x="5152680" y="1326600"/>
-            <a:ext cx="4426920" cy="3288240"/>
+            <a:ext cx="4426920" cy="3288600"/>
           </a:xfrm>
           <a:prstGeom prst="rect">
             <a:avLst/>
@@ -852,7 +872,7 @@
       </p:grpSpPr>
       <p:sp>
         <p:nvSpPr>
-          <p:cNvPr id="12" name="PlaceHolder 1"/>
+          <p:cNvPr id="9" name="PlaceHolder 1"/>
           <p:cNvSpPr>
             <a:spLocks noGrp="1"/>
           </p:cNvSpPr>
@@ -863,7 +883,7 @@
         <p:spPr>
           <a:xfrm>
             <a:off x="504000" y="226080"/>
-            <a:ext cx="9071640" cy="946440"/>
+            <a:ext cx="9072000" cy="946440"/>
           </a:xfrm>
           <a:prstGeom prst="rect">
             <a:avLst/>
@@ -905,7 +925,7 @@
       </p:grpSpPr>
       <p:sp>
         <p:nvSpPr>
-          <p:cNvPr id="13" name="PlaceHolder 1"/>
+          <p:cNvPr id="10" name="PlaceHolder 1"/>
           <p:cNvSpPr>
             <a:spLocks noGrp="1"/>
           </p:cNvSpPr>
@@ -916,7 +936,7 @@
         <p:spPr>
           <a:xfrm>
             <a:off x="504000" y="226080"/>
-            <a:ext cx="9071640" cy="4388400"/>
+            <a:ext cx="9072000" cy="4388400"/>
           </a:xfrm>
           <a:prstGeom prst="rect">
             <a:avLst/>
@@ -958,7 +978,7 @@
       </p:grpSpPr>
       <p:sp>
         <p:nvSpPr>
-          <p:cNvPr id="14" name="PlaceHolder 1"/>
+          <p:cNvPr id="11" name="PlaceHolder 1"/>
           <p:cNvSpPr>
             <a:spLocks noGrp="1"/>
           </p:cNvSpPr>
@@ -969,7 +989,7 @@
         <p:spPr>
           <a:xfrm>
             <a:off x="504000" y="226080"/>
-            <a:ext cx="9071640" cy="946440"/>
+            <a:ext cx="9072000" cy="946440"/>
           </a:xfrm>
           <a:prstGeom prst="rect">
             <a:avLst/>
@@ -989,7 +1009,7 @@
       </p:sp>
       <p:sp>
         <p:nvSpPr>
-          <p:cNvPr id="15" name="PlaceHolder 2"/>
+          <p:cNvPr id="12" name="PlaceHolder 2"/>
           <p:cNvSpPr>
             <a:spLocks noGrp="1"/>
           </p:cNvSpPr>
@@ -1000,7 +1020,7 @@
         <p:spPr>
           <a:xfrm>
             <a:off x="504000" y="1326600"/>
-            <a:ext cx="4426920" cy="1568160"/>
+            <a:ext cx="4426920" cy="1568520"/>
           </a:xfrm>
           <a:prstGeom prst="rect">
             <a:avLst/>
@@ -1019,7 +1039,7 @@
       </p:sp>
       <p:sp>
         <p:nvSpPr>
-          <p:cNvPr id="16" name="PlaceHolder 3"/>
+          <p:cNvPr id="13" name="PlaceHolder 3"/>
           <p:cNvSpPr>
             <a:spLocks noGrp="1"/>
           </p:cNvSpPr>
@@ -1030,7 +1050,7 @@
         <p:spPr>
           <a:xfrm>
             <a:off x="5152680" y="1326600"/>
-            <a:ext cx="4426920" cy="3288240"/>
+            <a:ext cx="4426920" cy="3288600"/>
           </a:xfrm>
           <a:prstGeom prst="rect">
             <a:avLst/>
@@ -1049,7 +1069,7 @@
       </p:sp>
       <p:sp>
         <p:nvSpPr>
-          <p:cNvPr id="17" name="PlaceHolder 4"/>
+          <p:cNvPr id="14" name="PlaceHolder 4"/>
           <p:cNvSpPr>
             <a:spLocks noGrp="1"/>
           </p:cNvSpPr>
@@ -1059,8 +1079,8 @@
         </p:nvSpPr>
         <p:spPr>
           <a:xfrm>
-            <a:off x="504000" y="3044160"/>
-            <a:ext cx="4426920" cy="1568160"/>
+            <a:off x="504000" y="3044520"/>
+            <a:ext cx="4426920" cy="1568520"/>
           </a:xfrm>
           <a:prstGeom prst="rect">
             <a:avLst/>
@@ -1101,7 +1121,7 @@
       </p:grpSpPr>
       <p:sp>
         <p:nvSpPr>
-          <p:cNvPr id="18" name="PlaceHolder 1"/>
+          <p:cNvPr id="15" name="PlaceHolder 1"/>
           <p:cNvSpPr>
             <a:spLocks noGrp="1"/>
           </p:cNvSpPr>
@@ -1112,7 +1132,7 @@
         <p:spPr>
           <a:xfrm>
             <a:off x="504000" y="226080"/>
-            <a:ext cx="9071640" cy="946440"/>
+            <a:ext cx="9072000" cy="946440"/>
           </a:xfrm>
           <a:prstGeom prst="rect">
             <a:avLst/>
@@ -1132,7 +1152,7 @@
       </p:sp>
       <p:sp>
         <p:nvSpPr>
-          <p:cNvPr id="19" name="PlaceHolder 2"/>
+          <p:cNvPr id="16" name="PlaceHolder 2"/>
           <p:cNvSpPr>
             <a:spLocks noGrp="1"/>
           </p:cNvSpPr>
@@ -1143,7 +1163,7 @@
         <p:spPr>
           <a:xfrm>
             <a:off x="504000" y="1326600"/>
-            <a:ext cx="4426920" cy="3288240"/>
+            <a:ext cx="4426920" cy="3288600"/>
           </a:xfrm>
           <a:prstGeom prst="rect">
             <a:avLst/>
@@ -1162,7 +1182,7 @@
       </p:sp>
       <p:sp>
         <p:nvSpPr>
-          <p:cNvPr id="20" name="PlaceHolder 3"/>
+          <p:cNvPr id="17" name="PlaceHolder 3"/>
           <p:cNvSpPr>
             <a:spLocks noGrp="1"/>
           </p:cNvSpPr>
@@ -1173,7 +1193,7 @@
         <p:spPr>
           <a:xfrm>
             <a:off x="5152680" y="1326600"/>
-            <a:ext cx="4426920" cy="1568160"/>
+            <a:ext cx="4426920" cy="1568520"/>
           </a:xfrm>
           <a:prstGeom prst="rect">
             <a:avLst/>
@@ -1192,7 +1212,7 @@
       </p:sp>
       <p:sp>
         <p:nvSpPr>
-          <p:cNvPr id="21" name="PlaceHolder 4"/>
+          <p:cNvPr id="18" name="PlaceHolder 4"/>
           <p:cNvSpPr>
             <a:spLocks noGrp="1"/>
           </p:cNvSpPr>
@@ -1202,8 +1222,8 @@
         </p:nvSpPr>
         <p:spPr>
           <a:xfrm>
-            <a:off x="5152680" y="3044160"/>
-            <a:ext cx="4426920" cy="1568160"/>
+            <a:off x="5152680" y="3044520"/>
+            <a:ext cx="4426920" cy="1568520"/>
           </a:xfrm>
           <a:prstGeom prst="rect">
             <a:avLst/>
@@ -1244,7 +1264,7 @@
       </p:grpSpPr>
       <p:sp>
         <p:nvSpPr>
-          <p:cNvPr id="22" name="PlaceHolder 1"/>
+          <p:cNvPr id="19" name="PlaceHolder 1"/>
           <p:cNvSpPr>
             <a:spLocks noGrp="1"/>
           </p:cNvSpPr>
@@ -1255,7 +1275,7 @@
         <p:spPr>
           <a:xfrm>
             <a:off x="504000" y="226080"/>
-            <a:ext cx="9071640" cy="946440"/>
+            <a:ext cx="9072000" cy="946440"/>
           </a:xfrm>
           <a:prstGeom prst="rect">
             <a:avLst/>
@@ -1275,7 +1295,7 @@
       </p:sp>
       <p:sp>
         <p:nvSpPr>
-          <p:cNvPr id="23" name="PlaceHolder 2"/>
+          <p:cNvPr id="20" name="PlaceHolder 2"/>
           <p:cNvSpPr>
             <a:spLocks noGrp="1"/>
           </p:cNvSpPr>
@@ -1286,7 +1306,7 @@
         <p:spPr>
           <a:xfrm>
             <a:off x="504000" y="1326600"/>
-            <a:ext cx="4426920" cy="1568160"/>
+            <a:ext cx="4426920" cy="1568520"/>
           </a:xfrm>
           <a:prstGeom prst="rect">
             <a:avLst/>
@@ -1305,7 +1325,7 @@
       </p:sp>
       <p:sp>
         <p:nvSpPr>
-          <p:cNvPr id="24" name="PlaceHolder 3"/>
+          <p:cNvPr id="21" name="PlaceHolder 3"/>
           <p:cNvSpPr>
             <a:spLocks noGrp="1"/>
           </p:cNvSpPr>
@@ -1316,7 +1336,7 @@
         <p:spPr>
           <a:xfrm>
             <a:off x="5152680" y="1326600"/>
-            <a:ext cx="4426920" cy="1568160"/>
+            <a:ext cx="4426920" cy="1568520"/>
           </a:xfrm>
           <a:prstGeom prst="rect">
             <a:avLst/>
@@ -1335,7 +1355,7 @@
       </p:sp>
       <p:sp>
         <p:nvSpPr>
-          <p:cNvPr id="25" name="PlaceHolder 4"/>
+          <p:cNvPr id="22" name="PlaceHolder 4"/>
           <p:cNvSpPr>
             <a:spLocks noGrp="1"/>
           </p:cNvSpPr>
@@ -1345,8 +1365,8 @@
         </p:nvSpPr>
         <p:spPr>
           <a:xfrm>
-            <a:off x="504000" y="3044160"/>
-            <a:ext cx="9071640" cy="1568160"/>
+            <a:off x="504000" y="3044520"/>
+            <a:ext cx="9072000" cy="1568520"/>
           </a:xfrm>
           <a:prstGeom prst="rect">
             <a:avLst/>
@@ -1398,7 +1418,7 @@
         <p:spPr>
           <a:xfrm>
             <a:off x="504000" y="226080"/>
-            <a:ext cx="9071640" cy="946440"/>
+            <a:ext cx="9072000" cy="946440"/>
           </a:xfrm>
           <a:prstGeom prst="rect">
             <a:avLst/>
@@ -1435,7 +1455,7 @@
         <p:spPr>
           <a:xfrm>
             <a:off x="504000" y="1326600"/>
-            <a:ext cx="9071640" cy="3288240"/>
+            <a:ext cx="9072000" cy="3288600"/>
           </a:xfrm>
           <a:prstGeom prst="rect">
             <a:avLst/>
@@ -1597,116 +1617,6 @@
             </a:r>
             <a:endParaRPr b="0" lang="en-US" sz="2000" spc="-1" strike="noStrike">
               <a:latin typeface="Arial"/>
-            </a:endParaRPr>
-          </a:p>
-        </p:txBody>
-      </p:sp>
-      <p:sp>
-        <p:nvSpPr>
-          <p:cNvPr id="2" name="PlaceHolder 3"/>
-          <p:cNvSpPr>
-            <a:spLocks noGrp="1"/>
-          </p:cNvSpPr>
-          <p:nvPr>
-            <p:ph type="dt"/>
-          </p:nvPr>
-        </p:nvSpPr>
-        <p:spPr>
-          <a:xfrm>
-            <a:off x="504000" y="5165280"/>
-            <a:ext cx="2348280" cy="390600"/>
-          </a:xfrm>
-          <a:prstGeom prst="rect">
-            <a:avLst/>
-          </a:prstGeom>
-        </p:spPr>
-        <p:txBody>
-          <a:bodyPr lIns="0" rIns="0" tIns="0" bIns="0">
-            <a:noAutofit/>
-          </a:bodyPr>
-          <a:p>
-            <a:r>
-              <a:rPr b="0" lang="en-US" sz="1400" spc="-1" strike="noStrike">
-                <a:latin typeface="Times New Roman"/>
-              </a:rPr>
-              <a:t>&lt;date/time&gt;</a:t>
-            </a:r>
-            <a:endParaRPr b="0" lang="en-US" sz="1400" spc="-1" strike="noStrike">
-              <a:latin typeface="Times New Roman"/>
-            </a:endParaRPr>
-          </a:p>
-        </p:txBody>
-      </p:sp>
-      <p:sp>
-        <p:nvSpPr>
-          <p:cNvPr id="3" name="PlaceHolder 4"/>
-          <p:cNvSpPr>
-            <a:spLocks noGrp="1"/>
-          </p:cNvSpPr>
-          <p:nvPr>
-            <p:ph type="ftr"/>
-          </p:nvPr>
-        </p:nvSpPr>
-        <p:spPr>
-          <a:xfrm>
-            <a:off x="3447360" y="5165280"/>
-            <a:ext cx="3195000" cy="390600"/>
-          </a:xfrm>
-          <a:prstGeom prst="rect">
-            <a:avLst/>
-          </a:prstGeom>
-        </p:spPr>
-        <p:txBody>
-          <a:bodyPr lIns="0" rIns="0" tIns="0" bIns="0">
-            <a:noAutofit/>
-          </a:bodyPr>
-          <a:p>
-            <a:pPr algn="ctr"/>
-            <a:r>
-              <a:rPr b="0" lang="en-US" sz="1400" spc="-1" strike="noStrike">
-                <a:latin typeface="Times New Roman"/>
-              </a:rPr>
-              <a:t>&lt;footer&gt;</a:t>
-            </a:r>
-            <a:endParaRPr b="0" lang="en-US" sz="1400" spc="-1" strike="noStrike">
-              <a:latin typeface="Times New Roman"/>
-            </a:endParaRPr>
-          </a:p>
-        </p:txBody>
-      </p:sp>
-      <p:sp>
-        <p:nvSpPr>
-          <p:cNvPr id="4" name="PlaceHolder 5"/>
-          <p:cNvSpPr>
-            <a:spLocks noGrp="1"/>
-          </p:cNvSpPr>
-          <p:nvPr>
-            <p:ph type="sldNum"/>
-          </p:nvPr>
-        </p:nvSpPr>
-        <p:spPr>
-          <a:xfrm>
-            <a:off x="7227360" y="5165280"/>
-            <a:ext cx="2348280" cy="390600"/>
-          </a:xfrm>
-          <a:prstGeom prst="rect">
-            <a:avLst/>
-          </a:prstGeom>
-        </p:spPr>
-        <p:txBody>
-          <a:bodyPr lIns="0" rIns="0" tIns="0" bIns="0">
-            <a:noAutofit/>
-          </a:bodyPr>
-          <a:p>
-            <a:pPr algn="r"/>
-            <a:fld id="{910E2D68-FBDF-4847-98EF-181CDF88D77D}" type="slidenum">
-              <a:rPr b="0" lang="en-US" sz="1400" spc="-1" strike="noStrike">
-                <a:latin typeface="Times New Roman"/>
-              </a:rPr>
-              <a:t>&lt;number&gt;</a:t>
-            </a:fld>
-            <a:endParaRPr b="0" lang="en-US" sz="1400" spc="-1" strike="noStrike">
-              <a:latin typeface="Times New Roman"/>
             </a:endParaRPr>
           </a:p>
         </p:txBody>
@@ -1750,14 +1660,14 @@
       </p:grpSpPr>
       <p:sp>
         <p:nvSpPr>
-          <p:cNvPr id="41" name="TextShape 1"/>
-          <p:cNvSpPr txBox="1"/>
+          <p:cNvPr id="38" name="CustomShape 1"/>
+          <p:cNvSpPr/>
           <p:nvPr/>
         </p:nvSpPr>
         <p:spPr>
           <a:xfrm>
-            <a:off x="504000" y="2234160"/>
-            <a:ext cx="9071640" cy="1250280"/>
+            <a:off x="504000" y="2165400"/>
+            <a:ext cx="9071280" cy="1339920"/>
           </a:xfrm>
           <a:prstGeom prst="rect">
             <a:avLst/>
@@ -1767,26 +1677,73 @@
             <a:noFill/>
           </a:ln>
         </p:spPr>
+        <p:style>
+          <a:lnRef idx="0"/>
+          <a:fillRef idx="0"/>
+          <a:effectRef idx="0"/>
+          <a:fontRef idx="minor"/>
+        </p:style>
         <p:txBody>
           <a:bodyPr lIns="0" rIns="0" tIns="0" bIns="0" anchor="ctr">
             <a:spAutoFit/>
           </a:bodyPr>
           <a:p>
-            <a:pPr algn="ctr"/>
-            <a:r>
-              <a:rPr b="0" lang="en-US" sz="4400" spc="-1" strike="noStrike">
+            <a:pPr algn="ctr">
+              <a:lnSpc>
+                <a:spcPct val="100000"/>
+              </a:lnSpc>
+            </a:pPr>
+            <a:r>
+              <a:rPr b="1" lang="en-US" sz="4400" spc="-1" strike="noStrike">
                 <a:latin typeface="Arial"/>
               </a:rPr>
               <a:t>Análisis del conjunto de datos</a:t>
             </a:r>
             <a:br/>
             <a:r>
-              <a:rPr b="0" lang="en-US" sz="4400" spc="-1" strike="noStrike">
+              <a:rPr b="1" lang="en-US" sz="4400" spc="-1" strike="noStrike">
                 <a:latin typeface="Arial"/>
               </a:rPr>
               <a:t>Blog Authorship Corpus</a:t>
             </a:r>
-            <a:endParaRPr b="0" lang="en-US" sz="4400" spc="-1" strike="noStrike">
+            <a:endParaRPr b="1" lang="en-US" sz="4400" spc="-1" strike="noStrike">
+              <a:latin typeface="Arial"/>
+            </a:endParaRPr>
+          </a:p>
+        </p:txBody>
+      </p:sp>
+      <p:sp>
+        <p:nvSpPr>
+          <p:cNvPr id="39" name="TextShape 2"/>
+          <p:cNvSpPr txBox="1"/>
+          <p:nvPr/>
+        </p:nvSpPr>
+        <p:spPr>
+          <a:xfrm>
+            <a:off x="504000" y="3850200"/>
+            <a:ext cx="9072000" cy="765000"/>
+          </a:xfrm>
+          <a:prstGeom prst="rect">
+            <a:avLst/>
+          </a:prstGeom>
+          <a:noFill/>
+          <a:ln>
+            <a:noFill/>
+          </a:ln>
+        </p:spPr>
+        <p:txBody>
+          <a:bodyPr lIns="0" rIns="0" tIns="0" bIns="0" anchor="ctr">
+            <a:spAutoFit/>
+          </a:bodyPr>
+          <a:p>
+            <a:pPr algn="r"/>
+            <a:r>
+              <a:rPr b="0" lang="en-US" sz="3200" spc="-1" strike="noStrike">
+                <a:latin typeface="Arial"/>
+              </a:rPr>
+              <a:t>Por: David Andrés Ayala Usma</a:t>
+            </a:r>
+            <a:endParaRPr b="0" lang="en-US" sz="3200" spc="-1" strike="noStrike">
               <a:latin typeface="Arial"/>
             </a:endParaRPr>
           </a:p>
@@ -1809,6 +1766,3773 @@
           <p:childTnLst>
             <p:seq>
               <p:cTn id="2" dur="indefinite" nodeType="mainSeq"/>
+              <p:prevCondLst>
+                <p:cond delay="0" evt="onPrev">
+                  <p:tgtEl>
+                    <p:sldTgt/>
+                  </p:tgtEl>
+                </p:cond>
+              </p:prevCondLst>
+              <p:nextCondLst>
+                <p:cond delay="0" evt="onNext">
+                  <p:tgtEl>
+                    <p:sldTgt/>
+                  </p:tgtEl>
+                </p:cond>
+              </p:nextCondLst>
+            </p:seq>
+          </p:childTnLst>
+        </p:cTn>
+      </p:par>
+    </p:tnLst>
+  </p:timing>
+</p:sld>
+</file>
+
+<file path=ppt/slides/slide10.xml><?xml version="1.0" encoding="utf-8"?>
+<p:sld xmlns:a="http://schemas.openxmlformats.org/drawingml/2006/main" xmlns:p="http://schemas.openxmlformats.org/presentationml/2006/main" xmlns:r="http://schemas.openxmlformats.org/officeDocument/2006/relationships" xmlns:p14="http://schemas.microsoft.com/office/powerpoint/2010/main" xmlns:p15="http://schemas.microsoft.com/office/powerpoint/2012/main" xmlns:mc="http://schemas.openxmlformats.org/markup-compatibility/2006">
+  <p:cSld>
+    <p:spTree>
+      <p:nvGrpSpPr>
+        <p:cNvPr id="1" name=""/>
+        <p:cNvGrpSpPr/>
+        <p:nvPr/>
+      </p:nvGrpSpPr>
+      <p:grpSpPr>
+        <a:xfrm>
+          <a:off x="0" y="0"/>
+          <a:ext cx="0" cy="0"/>
+          <a:chOff x="0" y="0"/>
+          <a:chExt cx="0" cy="0"/>
+        </a:xfrm>
+      </p:grpSpPr>
+      <p:sp>
+        <p:nvSpPr>
+          <p:cNvPr id="54" name="TextShape 1"/>
+          <p:cNvSpPr txBox="1"/>
+          <p:nvPr/>
+        </p:nvSpPr>
+        <p:spPr>
+          <a:xfrm>
+            <a:off x="504000" y="226080"/>
+            <a:ext cx="9072000" cy="946440"/>
+          </a:xfrm>
+          <a:prstGeom prst="rect">
+            <a:avLst/>
+          </a:prstGeom>
+          <a:noFill/>
+          <a:ln>
+            <a:noFill/>
+          </a:ln>
+        </p:spPr>
+        <p:txBody>
+          <a:bodyPr lIns="0" rIns="0" tIns="0" bIns="0" anchor="ctr">
+            <a:spAutoFit/>
+          </a:bodyPr>
+          <a:p>
+            <a:r>
+              <a:rPr b="0" lang="en-US" sz="4400" spc="-1" strike="noStrike">
+                <a:latin typeface="Arial"/>
+              </a:rPr>
+              <a:t>Resultados</a:t>
+            </a:r>
+            <a:endParaRPr b="0" lang="en-US" sz="4400" spc="-1" strike="noStrike">
+              <a:latin typeface="Arial"/>
+            </a:endParaRPr>
+          </a:p>
+        </p:txBody>
+      </p:sp>
+      <p:pic>
+        <p:nvPicPr>
+          <p:cNvPr id="55" name="" descr=""/>
+          <p:cNvPicPr/>
+          <p:nvPr/>
+        </p:nvPicPr>
+        <p:blipFill>
+          <a:blip r:embed="rId1"/>
+          <a:stretch/>
+        </p:blipFill>
+        <p:spPr>
+          <a:xfrm>
+            <a:off x="4568400" y="360"/>
+            <a:ext cx="4843800" cy="5670360"/>
+          </a:xfrm>
+          <a:prstGeom prst="rect">
+            <a:avLst/>
+          </a:prstGeom>
+          <a:ln>
+            <a:noFill/>
+          </a:ln>
+        </p:spPr>
+      </p:pic>
+    </p:spTree>
+  </p:cSld>
+  <mc:AlternateContent>
+    <mc:Choice Requires="p14">
+      <p:transition spd="slow" p14:dur="2000"/>
+    </mc:Choice>
+    <mc:Fallback>
+      <p:transition spd="slow"/>
+    </mc:Fallback>
+  </mc:AlternateContent>
+  <p:timing>
+    <p:tnLst>
+      <p:par>
+        <p:cTn id="19" dur="indefinite" restart="never" nodeType="tmRoot">
+          <p:childTnLst>
+            <p:seq>
+              <p:cTn id="20" dur="indefinite" nodeType="mainSeq"/>
+              <p:prevCondLst>
+                <p:cond delay="0" evt="onPrev">
+                  <p:tgtEl>
+                    <p:sldTgt/>
+                  </p:tgtEl>
+                </p:cond>
+              </p:prevCondLst>
+              <p:nextCondLst>
+                <p:cond delay="0" evt="onNext">
+                  <p:tgtEl>
+                    <p:sldTgt/>
+                  </p:tgtEl>
+                </p:cond>
+              </p:nextCondLst>
+            </p:seq>
+          </p:childTnLst>
+        </p:cTn>
+      </p:par>
+    </p:tnLst>
+  </p:timing>
+</p:sld>
+</file>
+
+<file path=ppt/slides/slide11.xml><?xml version="1.0" encoding="utf-8"?>
+<p:sld xmlns:a="http://schemas.openxmlformats.org/drawingml/2006/main" xmlns:p="http://schemas.openxmlformats.org/presentationml/2006/main" xmlns:r="http://schemas.openxmlformats.org/officeDocument/2006/relationships" xmlns:p14="http://schemas.microsoft.com/office/powerpoint/2010/main" xmlns:p15="http://schemas.microsoft.com/office/powerpoint/2012/main" xmlns:mc="http://schemas.openxmlformats.org/markup-compatibility/2006">
+  <p:cSld>
+    <p:spTree>
+      <p:nvGrpSpPr>
+        <p:cNvPr id="1" name=""/>
+        <p:cNvGrpSpPr/>
+        <p:nvPr/>
+      </p:nvGrpSpPr>
+      <p:grpSpPr>
+        <a:xfrm>
+          <a:off x="0" y="0"/>
+          <a:ext cx="0" cy="0"/>
+          <a:chOff x="0" y="0"/>
+          <a:chExt cx="0" cy="0"/>
+        </a:xfrm>
+      </p:grpSpPr>
+      <p:sp>
+        <p:nvSpPr>
+          <p:cNvPr id="56" name="TextShape 1"/>
+          <p:cNvSpPr txBox="1"/>
+          <p:nvPr/>
+        </p:nvSpPr>
+        <p:spPr>
+          <a:xfrm>
+            <a:off x="504000" y="226080"/>
+            <a:ext cx="9072000" cy="946440"/>
+          </a:xfrm>
+          <a:prstGeom prst="rect">
+            <a:avLst/>
+          </a:prstGeom>
+          <a:noFill/>
+          <a:ln>
+            <a:noFill/>
+          </a:ln>
+        </p:spPr>
+        <p:txBody>
+          <a:bodyPr lIns="0" rIns="0" tIns="0" bIns="0" anchor="ctr">
+            <a:spAutoFit/>
+          </a:bodyPr>
+          <a:p>
+            <a:pPr algn="ctr"/>
+            <a:r>
+              <a:rPr b="0" lang="en-US" sz="4400" spc="-1" strike="noStrike">
+                <a:latin typeface="Arial"/>
+              </a:rPr>
+              <a:t>Insights principales</a:t>
+            </a:r>
+            <a:endParaRPr b="0" lang="en-US" sz="4400" spc="-1" strike="noStrike">
+              <a:latin typeface="Arial"/>
+            </a:endParaRPr>
+          </a:p>
+        </p:txBody>
+      </p:sp>
+      <p:sp>
+        <p:nvSpPr>
+          <p:cNvPr id="57" name="TextShape 2"/>
+          <p:cNvSpPr txBox="1"/>
+          <p:nvPr/>
+        </p:nvSpPr>
+        <p:spPr>
+          <a:xfrm>
+            <a:off x="504000" y="1479240"/>
+            <a:ext cx="9072000" cy="3288600"/>
+          </a:xfrm>
+          <a:prstGeom prst="rect">
+            <a:avLst/>
+          </a:prstGeom>
+          <a:noFill/>
+          <a:ln>
+            <a:noFill/>
+          </a:ln>
+        </p:spPr>
+        <p:txBody>
+          <a:bodyPr lIns="0" rIns="0" tIns="0" bIns="0" anchor="ctr">
+            <a:spAutoFit/>
+          </a:bodyPr>
+          <a:p>
+            <a:pPr marL="216000" indent="-216000" algn="just">
+              <a:buClr>
+                <a:srgbClr val="000000"/>
+              </a:buClr>
+              <a:buSzPct val="45000"/>
+              <a:buFont typeface="Wingdings" charset="2"/>
+              <a:buChar char=""/>
+            </a:pPr>
+            <a:r>
+              <a:rPr b="0" lang="en-US" sz="2200" spc="-1" strike="noStrike">
+                <a:latin typeface="Arial"/>
+              </a:rPr>
+              <a:t>Se observa que los hombres suelen abordar más temas de Tecnología, Internet, Ingeniería, Leyes y Comunicaciones y medios en sus entradas de blogs con respecto a las mujeres.</a:t>
+            </a:r>
+            <a:endParaRPr b="0" lang="en-US" sz="2200" spc="-1" strike="noStrike">
+              <a:latin typeface="Arial"/>
+            </a:endParaRPr>
+          </a:p>
+          <a:p>
+            <a:pPr marL="216000" indent="-216000" algn="just">
+              <a:buClr>
+                <a:srgbClr val="000000"/>
+              </a:buClr>
+              <a:buSzPct val="45000"/>
+              <a:buFont typeface="Wingdings" charset="2"/>
+              <a:buChar char=""/>
+            </a:pPr>
+            <a:endParaRPr b="0" lang="en-US" sz="2200" spc="-1" strike="noStrike">
+              <a:latin typeface="Arial"/>
+            </a:endParaRPr>
+          </a:p>
+          <a:p>
+            <a:pPr marL="216000" indent="-216000" algn="just">
+              <a:buClr>
+                <a:srgbClr val="000000"/>
+              </a:buClr>
+              <a:buSzPct val="45000"/>
+              <a:buFont typeface="Wingdings" charset="2"/>
+              <a:buChar char=""/>
+            </a:pPr>
+            <a:r>
+              <a:rPr b="0" lang="en-US" sz="2200" spc="-1" strike="noStrike">
+                <a:latin typeface="Arial"/>
+              </a:rPr>
+              <a:t>Las mujeres suelen tener mayor contenido de Artes, Educación, Contaduría y Mercadeo con respecto a los hombres.</a:t>
+            </a:r>
+            <a:endParaRPr b="0" lang="en-US" sz="2200" spc="-1" strike="noStrike">
+              <a:latin typeface="Arial"/>
+            </a:endParaRPr>
+          </a:p>
+        </p:txBody>
+      </p:sp>
+    </p:spTree>
+  </p:cSld>
+  <mc:AlternateContent>
+    <mc:Choice Requires="p14">
+      <p:transition spd="slow" p14:dur="2000"/>
+    </mc:Choice>
+    <mc:Fallback>
+      <p:transition spd="slow"/>
+    </mc:Fallback>
+  </mc:AlternateContent>
+  <p:timing>
+    <p:tnLst>
+      <p:par>
+        <p:cTn id="21" dur="indefinite" restart="never" nodeType="tmRoot">
+          <p:childTnLst>
+            <p:seq>
+              <p:cTn id="22" dur="indefinite" nodeType="mainSeq"/>
+              <p:prevCondLst>
+                <p:cond delay="0" evt="onPrev">
+                  <p:tgtEl>
+                    <p:sldTgt/>
+                  </p:tgtEl>
+                </p:cond>
+              </p:prevCondLst>
+              <p:nextCondLst>
+                <p:cond delay="0" evt="onNext">
+                  <p:tgtEl>
+                    <p:sldTgt/>
+                  </p:tgtEl>
+                </p:cond>
+              </p:nextCondLst>
+            </p:seq>
+          </p:childTnLst>
+        </p:cTn>
+      </p:par>
+    </p:tnLst>
+  </p:timing>
+</p:sld>
+</file>
+
+<file path=ppt/slides/slide12.xml><?xml version="1.0" encoding="utf-8"?>
+<p:sld xmlns:a="http://schemas.openxmlformats.org/drawingml/2006/main" xmlns:p="http://schemas.openxmlformats.org/presentationml/2006/main" xmlns:r="http://schemas.openxmlformats.org/officeDocument/2006/relationships" xmlns:p14="http://schemas.microsoft.com/office/powerpoint/2010/main" xmlns:p15="http://schemas.microsoft.com/office/powerpoint/2012/main" xmlns:mc="http://schemas.openxmlformats.org/markup-compatibility/2006">
+  <p:cSld>
+    <p:spTree>
+      <p:nvGrpSpPr>
+        <p:cNvPr id="1" name=""/>
+        <p:cNvGrpSpPr/>
+        <p:nvPr/>
+      </p:nvGrpSpPr>
+      <p:grpSpPr>
+        <a:xfrm>
+          <a:off x="0" y="0"/>
+          <a:ext cx="0" cy="0"/>
+          <a:chOff x="0" y="0"/>
+          <a:chExt cx="0" cy="0"/>
+        </a:xfrm>
+      </p:grpSpPr>
+      <p:sp>
+        <p:nvSpPr>
+          <p:cNvPr id="58" name="TextShape 1"/>
+          <p:cNvSpPr txBox="1"/>
+          <p:nvPr/>
+        </p:nvSpPr>
+        <p:spPr>
+          <a:xfrm>
+            <a:off x="504360" y="2210400"/>
+            <a:ext cx="9072000" cy="1250280"/>
+          </a:xfrm>
+          <a:prstGeom prst="rect">
+            <a:avLst/>
+          </a:prstGeom>
+          <a:noFill/>
+          <a:ln>
+            <a:noFill/>
+          </a:ln>
+        </p:spPr>
+        <p:txBody>
+          <a:bodyPr lIns="0" rIns="0" tIns="0" bIns="0" anchor="ctr">
+            <a:spAutoFit/>
+          </a:bodyPr>
+          <a:p>
+            <a:pPr algn="ctr"/>
+            <a:r>
+              <a:rPr b="0" lang="en-US" sz="4400" spc="-1" strike="noStrike">
+                <a:latin typeface="Arial"/>
+              </a:rPr>
+              <a:t>Segmentación de temas por signo zodiacal</a:t>
+            </a:r>
+            <a:endParaRPr b="0" lang="en-US" sz="4400" spc="-1" strike="noStrike">
+              <a:latin typeface="Arial"/>
+            </a:endParaRPr>
+          </a:p>
+        </p:txBody>
+      </p:sp>
+    </p:spTree>
+  </p:cSld>
+  <mc:AlternateContent>
+    <mc:Choice Requires="p14">
+      <p:transition spd="slow" p14:dur="2000"/>
+    </mc:Choice>
+    <mc:Fallback>
+      <p:transition spd="slow"/>
+    </mc:Fallback>
+  </mc:AlternateContent>
+  <p:timing>
+    <p:tnLst>
+      <p:par>
+        <p:cTn id="23" dur="indefinite" restart="never" nodeType="tmRoot">
+          <p:childTnLst>
+            <p:seq>
+              <p:cTn id="24" dur="indefinite" nodeType="mainSeq"/>
+              <p:prevCondLst>
+                <p:cond delay="0" evt="onPrev">
+                  <p:tgtEl>
+                    <p:sldTgt/>
+                  </p:tgtEl>
+                </p:cond>
+              </p:prevCondLst>
+              <p:nextCondLst>
+                <p:cond delay="0" evt="onNext">
+                  <p:tgtEl>
+                    <p:sldTgt/>
+                  </p:tgtEl>
+                </p:cond>
+              </p:nextCondLst>
+            </p:seq>
+          </p:childTnLst>
+        </p:cTn>
+      </p:par>
+    </p:tnLst>
+  </p:timing>
+</p:sld>
+</file>
+
+<file path=ppt/slides/slide13.xml><?xml version="1.0" encoding="utf-8"?>
+<p:sld xmlns:a="http://schemas.openxmlformats.org/drawingml/2006/main" xmlns:p="http://schemas.openxmlformats.org/presentationml/2006/main" xmlns:r="http://schemas.openxmlformats.org/officeDocument/2006/relationships" xmlns:p14="http://schemas.microsoft.com/office/powerpoint/2010/main" xmlns:p15="http://schemas.microsoft.com/office/powerpoint/2012/main" xmlns:mc="http://schemas.openxmlformats.org/markup-compatibility/2006">
+  <p:cSld>
+    <p:spTree>
+      <p:nvGrpSpPr>
+        <p:cNvPr id="1" name=""/>
+        <p:cNvGrpSpPr/>
+        <p:nvPr/>
+      </p:nvGrpSpPr>
+      <p:grpSpPr>
+        <a:xfrm>
+          <a:off x="0" y="0"/>
+          <a:ext cx="0" cy="0"/>
+          <a:chOff x="0" y="0"/>
+          <a:chExt cx="0" cy="0"/>
+        </a:xfrm>
+      </p:grpSpPr>
+      <p:sp>
+        <p:nvSpPr>
+          <p:cNvPr id="59" name="TextShape 1"/>
+          <p:cNvSpPr txBox="1"/>
+          <p:nvPr/>
+        </p:nvSpPr>
+        <p:spPr>
+          <a:xfrm>
+            <a:off x="504000" y="226080"/>
+            <a:ext cx="9072000" cy="946440"/>
+          </a:xfrm>
+          <a:prstGeom prst="rect">
+            <a:avLst/>
+          </a:prstGeom>
+          <a:noFill/>
+          <a:ln>
+            <a:noFill/>
+          </a:ln>
+        </p:spPr>
+        <p:txBody>
+          <a:bodyPr lIns="0" rIns="0" tIns="0" bIns="0" anchor="ctr">
+            <a:spAutoFit/>
+          </a:bodyPr>
+          <a:p>
+            <a:pPr algn="ctr"/>
+            <a:r>
+              <a:rPr b="0" lang="en-US" sz="4400" spc="-1" strike="noStrike">
+                <a:latin typeface="Arial"/>
+              </a:rPr>
+              <a:t>Método</a:t>
+            </a:r>
+            <a:endParaRPr b="0" lang="en-US" sz="4400" spc="-1" strike="noStrike">
+              <a:latin typeface="Arial"/>
+            </a:endParaRPr>
+          </a:p>
+        </p:txBody>
+      </p:sp>
+      <p:sp>
+        <p:nvSpPr>
+          <p:cNvPr id="60" name="TextShape 2"/>
+          <p:cNvSpPr txBox="1"/>
+          <p:nvPr/>
+        </p:nvSpPr>
+        <p:spPr>
+          <a:xfrm>
+            <a:off x="504000" y="1974600"/>
+            <a:ext cx="9452160" cy="3288600"/>
+          </a:xfrm>
+          <a:prstGeom prst="rect">
+            <a:avLst/>
+          </a:prstGeom>
+          <a:noFill/>
+          <a:ln>
+            <a:noFill/>
+          </a:ln>
+        </p:spPr>
+        <p:txBody>
+          <a:bodyPr lIns="0" rIns="0" tIns="0" bIns="0">
+            <a:normAutofit/>
+          </a:bodyPr>
+          <a:p>
+            <a:pPr marL="432000" indent="-324000">
+              <a:spcBef>
+                <a:spcPts val="1417"/>
+              </a:spcBef>
+              <a:buClr>
+                <a:srgbClr val="000000"/>
+              </a:buClr>
+              <a:buSzPct val="45000"/>
+              <a:buFont typeface="Wingdings" charset="2"/>
+              <a:buChar char=""/>
+            </a:pPr>
+            <a:r>
+              <a:rPr b="0" lang="en-US" sz="3200" spc="-1" strike="noStrike">
+                <a:latin typeface="Arial"/>
+              </a:rPr>
+              <a:t>Comparación de las distribuciones de edad por temas mediante visualización y Análisis de Chi-cuadrado.</a:t>
+            </a:r>
+            <a:endParaRPr b="0" lang="en-US" sz="3200" spc="-1" strike="noStrike">
+              <a:latin typeface="Arial"/>
+            </a:endParaRPr>
+          </a:p>
+        </p:txBody>
+      </p:sp>
+    </p:spTree>
+  </p:cSld>
+  <mc:AlternateContent>
+    <mc:Choice Requires="p14">
+      <p:transition spd="slow" p14:dur="2000"/>
+    </mc:Choice>
+    <mc:Fallback>
+      <p:transition spd="slow"/>
+    </mc:Fallback>
+  </mc:AlternateContent>
+  <p:timing>
+    <p:tnLst>
+      <p:par>
+        <p:cTn id="25" dur="indefinite" restart="never" nodeType="tmRoot">
+          <p:childTnLst>
+            <p:seq>
+              <p:cTn id="26" dur="indefinite" nodeType="mainSeq"/>
+              <p:prevCondLst>
+                <p:cond delay="0" evt="onPrev">
+                  <p:tgtEl>
+                    <p:sldTgt/>
+                  </p:tgtEl>
+                </p:cond>
+              </p:prevCondLst>
+              <p:nextCondLst>
+                <p:cond delay="0" evt="onNext">
+                  <p:tgtEl>
+                    <p:sldTgt/>
+                  </p:tgtEl>
+                </p:cond>
+              </p:nextCondLst>
+            </p:seq>
+          </p:childTnLst>
+        </p:cTn>
+      </p:par>
+    </p:tnLst>
+  </p:timing>
+</p:sld>
+</file>
+
+<file path=ppt/slides/slide14.xml><?xml version="1.0" encoding="utf-8"?>
+<p:sld xmlns:a="http://schemas.openxmlformats.org/drawingml/2006/main" xmlns:p="http://schemas.openxmlformats.org/presentationml/2006/main" xmlns:r="http://schemas.openxmlformats.org/officeDocument/2006/relationships" xmlns:p14="http://schemas.microsoft.com/office/powerpoint/2010/main" xmlns:p15="http://schemas.microsoft.com/office/powerpoint/2012/main" xmlns:mc="http://schemas.openxmlformats.org/markup-compatibility/2006">
+  <p:cSld>
+    <p:spTree>
+      <p:nvGrpSpPr>
+        <p:cNvPr id="1" name=""/>
+        <p:cNvGrpSpPr/>
+        <p:nvPr/>
+      </p:nvGrpSpPr>
+      <p:grpSpPr>
+        <a:xfrm>
+          <a:off x="0" y="0"/>
+          <a:ext cx="0" cy="0"/>
+          <a:chOff x="0" y="0"/>
+          <a:chExt cx="0" cy="0"/>
+        </a:xfrm>
+      </p:grpSpPr>
+      <p:sp>
+        <p:nvSpPr>
+          <p:cNvPr id="61" name="TextShape 1"/>
+          <p:cNvSpPr txBox="1"/>
+          <p:nvPr/>
+        </p:nvSpPr>
+        <p:spPr>
+          <a:xfrm>
+            <a:off x="504000" y="226080"/>
+            <a:ext cx="9072000" cy="946440"/>
+          </a:xfrm>
+          <a:prstGeom prst="rect">
+            <a:avLst/>
+          </a:prstGeom>
+          <a:noFill/>
+          <a:ln>
+            <a:noFill/>
+          </a:ln>
+        </p:spPr>
+        <p:txBody>
+          <a:bodyPr lIns="0" rIns="0" tIns="0" bIns="0" anchor="ctr">
+            <a:spAutoFit/>
+          </a:bodyPr>
+          <a:p>
+            <a:r>
+              <a:rPr b="0" lang="en-US" sz="4400" spc="-1" strike="noStrike">
+                <a:latin typeface="Arial"/>
+              </a:rPr>
+              <a:t>Resultados</a:t>
+            </a:r>
+            <a:endParaRPr b="0" lang="en-US" sz="4400" spc="-1" strike="noStrike">
+              <a:latin typeface="Arial"/>
+            </a:endParaRPr>
+          </a:p>
+        </p:txBody>
+      </p:sp>
+      <p:pic>
+        <p:nvPicPr>
+          <p:cNvPr id="62" name="" descr=""/>
+          <p:cNvPicPr/>
+          <p:nvPr/>
+        </p:nvPicPr>
+        <p:blipFill>
+          <a:blip r:embed="rId1"/>
+          <a:stretch/>
+        </p:blipFill>
+        <p:spPr>
+          <a:xfrm>
+            <a:off x="4284720" y="49680"/>
+            <a:ext cx="4828680" cy="5571720"/>
+          </a:xfrm>
+          <a:prstGeom prst="rect">
+            <a:avLst/>
+          </a:prstGeom>
+          <a:ln>
+            <a:noFill/>
+          </a:ln>
+        </p:spPr>
+      </p:pic>
+    </p:spTree>
+  </p:cSld>
+  <mc:AlternateContent>
+    <mc:Choice Requires="p14">
+      <p:transition spd="slow" p14:dur="2000"/>
+    </mc:Choice>
+    <mc:Fallback>
+      <p:transition spd="slow"/>
+    </mc:Fallback>
+  </mc:AlternateContent>
+  <p:timing>
+    <p:tnLst>
+      <p:par>
+        <p:cTn id="27" dur="indefinite" restart="never" nodeType="tmRoot">
+          <p:childTnLst>
+            <p:seq>
+              <p:cTn id="28" dur="indefinite" nodeType="mainSeq"/>
+              <p:prevCondLst>
+                <p:cond delay="0" evt="onPrev">
+                  <p:tgtEl>
+                    <p:sldTgt/>
+                  </p:tgtEl>
+                </p:cond>
+              </p:prevCondLst>
+              <p:nextCondLst>
+                <p:cond delay="0" evt="onNext">
+                  <p:tgtEl>
+                    <p:sldTgt/>
+                  </p:tgtEl>
+                </p:cond>
+              </p:nextCondLst>
+            </p:seq>
+          </p:childTnLst>
+        </p:cTn>
+      </p:par>
+    </p:tnLst>
+  </p:timing>
+</p:sld>
+</file>
+
+<file path=ppt/slides/slide15.xml><?xml version="1.0" encoding="utf-8"?>
+<p:sld xmlns:a="http://schemas.openxmlformats.org/drawingml/2006/main" xmlns:p="http://schemas.openxmlformats.org/presentationml/2006/main" xmlns:r="http://schemas.openxmlformats.org/officeDocument/2006/relationships" xmlns:p14="http://schemas.microsoft.com/office/powerpoint/2010/main" xmlns:p15="http://schemas.microsoft.com/office/powerpoint/2012/main" xmlns:mc="http://schemas.openxmlformats.org/markup-compatibility/2006">
+  <p:cSld>
+    <p:spTree>
+      <p:nvGrpSpPr>
+        <p:cNvPr id="1" name=""/>
+        <p:cNvGrpSpPr/>
+        <p:nvPr/>
+      </p:nvGrpSpPr>
+      <p:grpSpPr>
+        <a:xfrm>
+          <a:off x="0" y="0"/>
+          <a:ext cx="0" cy="0"/>
+          <a:chOff x="0" y="0"/>
+          <a:chExt cx="0" cy="0"/>
+        </a:xfrm>
+      </p:grpSpPr>
+      <p:sp>
+        <p:nvSpPr>
+          <p:cNvPr id="63" name="TextShape 1"/>
+          <p:cNvSpPr txBox="1"/>
+          <p:nvPr/>
+        </p:nvSpPr>
+        <p:spPr>
+          <a:xfrm>
+            <a:off x="504000" y="226080"/>
+            <a:ext cx="9072000" cy="946440"/>
+          </a:xfrm>
+          <a:prstGeom prst="rect">
+            <a:avLst/>
+          </a:prstGeom>
+          <a:noFill/>
+          <a:ln>
+            <a:noFill/>
+          </a:ln>
+        </p:spPr>
+        <p:txBody>
+          <a:bodyPr lIns="0" rIns="0" tIns="0" bIns="0" anchor="ctr">
+            <a:spAutoFit/>
+          </a:bodyPr>
+          <a:p>
+            <a:pPr algn="ctr"/>
+            <a:r>
+              <a:rPr b="0" lang="en-US" sz="4400" spc="-1" strike="noStrike">
+                <a:latin typeface="Arial"/>
+              </a:rPr>
+              <a:t>Insights principales</a:t>
+            </a:r>
+            <a:endParaRPr b="0" lang="en-US" sz="4400" spc="-1" strike="noStrike">
+              <a:latin typeface="Arial"/>
+            </a:endParaRPr>
+          </a:p>
+        </p:txBody>
+      </p:sp>
+      <p:sp>
+        <p:nvSpPr>
+          <p:cNvPr id="64" name="TextShape 2"/>
+          <p:cNvSpPr txBox="1"/>
+          <p:nvPr/>
+        </p:nvSpPr>
+        <p:spPr>
+          <a:xfrm>
+            <a:off x="504000" y="1526400"/>
+            <a:ext cx="9072000" cy="3288600"/>
+          </a:xfrm>
+          <a:prstGeom prst="rect">
+            <a:avLst/>
+          </a:prstGeom>
+          <a:noFill/>
+          <a:ln>
+            <a:noFill/>
+          </a:ln>
+        </p:spPr>
+        <p:txBody>
+          <a:bodyPr lIns="0" rIns="0" tIns="0" bIns="0" anchor="ctr">
+            <a:spAutoFit/>
+          </a:bodyPr>
+          <a:p>
+            <a:pPr marL="216000" indent="-216000" algn="just">
+              <a:buClr>
+                <a:srgbClr val="000000"/>
+              </a:buClr>
+              <a:buSzPct val="45000"/>
+              <a:buFont typeface="Wingdings" charset="2"/>
+              <a:buChar char=""/>
+            </a:pPr>
+            <a:r>
+              <a:rPr b="0" lang="en-US" sz="2200" spc="-1" strike="noStrike">
+                <a:latin typeface="Arial"/>
+              </a:rPr>
+              <a:t>Se observó que Aries, Tauro, Virgo y Libra son los que más escriben sobre tecnología.</a:t>
+            </a:r>
+            <a:endParaRPr b="0" lang="en-US" sz="2200" spc="-1" strike="noStrike">
+              <a:latin typeface="Arial"/>
+            </a:endParaRPr>
+          </a:p>
+          <a:p>
+            <a:pPr marL="216000" indent="-216000" algn="just">
+              <a:buClr>
+                <a:srgbClr val="000000"/>
+              </a:buClr>
+              <a:buSzPct val="45000"/>
+              <a:buFont typeface="Wingdings" charset="2"/>
+              <a:buChar char=""/>
+            </a:pPr>
+            <a:endParaRPr b="0" lang="en-US" sz="2200" spc="-1" strike="noStrike">
+              <a:latin typeface="Arial"/>
+            </a:endParaRPr>
+          </a:p>
+          <a:p>
+            <a:pPr marL="216000" indent="-216000" algn="just">
+              <a:buClr>
+                <a:srgbClr val="000000"/>
+              </a:buClr>
+              <a:buSzPct val="45000"/>
+              <a:buFont typeface="Wingdings" charset="2"/>
+              <a:buChar char=""/>
+            </a:pPr>
+            <a:r>
+              <a:rPr b="0" lang="en-US" sz="2200" spc="-1" strike="noStrike">
+                <a:latin typeface="Arial"/>
+              </a:rPr>
+              <a:t>Las personas de signo Piscis son las que más escriben sobre temas de internet.</a:t>
+            </a:r>
+            <a:endParaRPr b="0" lang="en-US" sz="2200" spc="-1" strike="noStrike">
+              <a:latin typeface="Arial"/>
+            </a:endParaRPr>
+          </a:p>
+          <a:p>
+            <a:pPr marL="216000" indent="-216000" algn="just">
+              <a:buClr>
+                <a:srgbClr val="000000"/>
+              </a:buClr>
+              <a:buSzPct val="45000"/>
+              <a:buFont typeface="Wingdings" charset="2"/>
+              <a:buChar char=""/>
+            </a:pPr>
+            <a:endParaRPr b="0" lang="en-US" sz="2200" spc="-1" strike="noStrike">
+              <a:latin typeface="Arial"/>
+            </a:endParaRPr>
+          </a:p>
+          <a:p>
+            <a:pPr marL="216000" indent="-216000" algn="just">
+              <a:buClr>
+                <a:srgbClr val="000000"/>
+              </a:buClr>
+              <a:buSzPct val="45000"/>
+              <a:buFont typeface="Wingdings" charset="2"/>
+              <a:buChar char=""/>
+            </a:pPr>
+            <a:r>
+              <a:rPr b="0" lang="en-US" sz="2200" spc="-1" strike="noStrike">
+                <a:latin typeface="Arial"/>
+              </a:rPr>
+              <a:t>Los Libra son los que más escriben sobre ingeniería y artes.</a:t>
+            </a:r>
+            <a:endParaRPr b="0" lang="en-US" sz="2200" spc="-1" strike="noStrike">
+              <a:latin typeface="Arial"/>
+            </a:endParaRPr>
+          </a:p>
+          <a:p>
+            <a:pPr marL="216000" indent="-216000" algn="just">
+              <a:buClr>
+                <a:srgbClr val="000000"/>
+              </a:buClr>
+              <a:buSzPct val="45000"/>
+              <a:buFont typeface="Wingdings" charset="2"/>
+              <a:buChar char=""/>
+            </a:pPr>
+            <a:endParaRPr b="0" lang="en-US" sz="2200" spc="-1" strike="noStrike">
+              <a:latin typeface="Arial"/>
+            </a:endParaRPr>
+          </a:p>
+          <a:p>
+            <a:pPr marL="216000" indent="-216000" algn="just">
+              <a:buClr>
+                <a:srgbClr val="000000"/>
+              </a:buClr>
+              <a:buSzPct val="45000"/>
+              <a:buFont typeface="Wingdings" charset="2"/>
+              <a:buChar char=""/>
+            </a:pPr>
+            <a:r>
+              <a:rPr b="0" lang="en-US" sz="2200" spc="-1" strike="noStrike">
+                <a:latin typeface="Arial"/>
+              </a:rPr>
+              <a:t>Géminis, Leo, Acuario y Virgo son los que más escriben sobre educación.</a:t>
+            </a:r>
+            <a:endParaRPr b="0" lang="en-US" sz="2200" spc="-1" strike="noStrike">
+              <a:latin typeface="Arial"/>
+            </a:endParaRPr>
+          </a:p>
+        </p:txBody>
+      </p:sp>
+    </p:spTree>
+  </p:cSld>
+  <mc:AlternateContent>
+    <mc:Choice Requires="p14">
+      <p:transition spd="slow" p14:dur="2000"/>
+    </mc:Choice>
+    <mc:Fallback>
+      <p:transition spd="slow"/>
+    </mc:Fallback>
+  </mc:AlternateContent>
+  <p:timing>
+    <p:tnLst>
+      <p:par>
+        <p:cTn id="29" dur="indefinite" restart="never" nodeType="tmRoot">
+          <p:childTnLst>
+            <p:seq>
+              <p:cTn id="30" dur="indefinite" nodeType="mainSeq"/>
+              <p:prevCondLst>
+                <p:cond delay="0" evt="onPrev">
+                  <p:tgtEl>
+                    <p:sldTgt/>
+                  </p:tgtEl>
+                </p:cond>
+              </p:prevCondLst>
+              <p:nextCondLst>
+                <p:cond delay="0" evt="onNext">
+                  <p:tgtEl>
+                    <p:sldTgt/>
+                  </p:tgtEl>
+                </p:cond>
+              </p:nextCondLst>
+            </p:seq>
+          </p:childTnLst>
+        </p:cTn>
+      </p:par>
+    </p:tnLst>
+  </p:timing>
+</p:sld>
+</file>
+
+<file path=ppt/slides/slide16.xml><?xml version="1.0" encoding="utf-8"?>
+<p:sld xmlns:a="http://schemas.openxmlformats.org/drawingml/2006/main" xmlns:p="http://schemas.openxmlformats.org/presentationml/2006/main" xmlns:r="http://schemas.openxmlformats.org/officeDocument/2006/relationships" xmlns:p14="http://schemas.microsoft.com/office/powerpoint/2010/main" xmlns:p15="http://schemas.microsoft.com/office/powerpoint/2012/main" xmlns:mc="http://schemas.openxmlformats.org/markup-compatibility/2006">
+  <p:cSld>
+    <p:spTree>
+      <p:nvGrpSpPr>
+        <p:cNvPr id="1" name=""/>
+        <p:cNvGrpSpPr/>
+        <p:nvPr/>
+      </p:nvGrpSpPr>
+      <p:grpSpPr>
+        <a:xfrm>
+          <a:off x="0" y="0"/>
+          <a:ext cx="0" cy="0"/>
+          <a:chOff x="0" y="0"/>
+          <a:chExt cx="0" cy="0"/>
+        </a:xfrm>
+      </p:grpSpPr>
+      <p:sp>
+        <p:nvSpPr>
+          <p:cNvPr id="65" name="TextShape 1"/>
+          <p:cNvSpPr txBox="1"/>
+          <p:nvPr/>
+        </p:nvSpPr>
+        <p:spPr>
+          <a:xfrm>
+            <a:off x="504360" y="2210400"/>
+            <a:ext cx="9072000" cy="1250280"/>
+          </a:xfrm>
+          <a:prstGeom prst="rect">
+            <a:avLst/>
+          </a:prstGeom>
+          <a:noFill/>
+          <a:ln>
+            <a:noFill/>
+          </a:ln>
+        </p:spPr>
+        <p:txBody>
+          <a:bodyPr lIns="0" rIns="0" tIns="0" bIns="0" anchor="ctr">
+            <a:spAutoFit/>
+          </a:bodyPr>
+          <a:p>
+            <a:pPr algn="ctr"/>
+            <a:r>
+              <a:rPr b="0" lang="en-US" sz="4400" spc="-1" strike="noStrike">
+                <a:latin typeface="Arial"/>
+              </a:rPr>
+              <a:t>Entidades más nombradas en el corpus de datos de blogs</a:t>
+            </a:r>
+            <a:endParaRPr b="0" lang="en-US" sz="4400" spc="-1" strike="noStrike">
+              <a:latin typeface="Arial"/>
+            </a:endParaRPr>
+          </a:p>
+        </p:txBody>
+      </p:sp>
+    </p:spTree>
+  </p:cSld>
+  <mc:AlternateContent>
+    <mc:Choice Requires="p14">
+      <p:transition spd="slow" p14:dur="2000"/>
+    </mc:Choice>
+    <mc:Fallback>
+      <p:transition spd="slow"/>
+    </mc:Fallback>
+  </mc:AlternateContent>
+  <p:timing>
+    <p:tnLst>
+      <p:par>
+        <p:cTn id="31" dur="indefinite" restart="never" nodeType="tmRoot">
+          <p:childTnLst>
+            <p:seq>
+              <p:cTn id="32" dur="indefinite" nodeType="mainSeq"/>
+              <p:prevCondLst>
+                <p:cond delay="0" evt="onPrev">
+                  <p:tgtEl>
+                    <p:sldTgt/>
+                  </p:tgtEl>
+                </p:cond>
+              </p:prevCondLst>
+              <p:nextCondLst>
+                <p:cond delay="0" evt="onNext">
+                  <p:tgtEl>
+                    <p:sldTgt/>
+                  </p:tgtEl>
+                </p:cond>
+              </p:nextCondLst>
+            </p:seq>
+          </p:childTnLst>
+        </p:cTn>
+      </p:par>
+    </p:tnLst>
+  </p:timing>
+</p:sld>
+</file>
+
+<file path=ppt/slides/slide17.xml><?xml version="1.0" encoding="utf-8"?>
+<p:sld xmlns:a="http://schemas.openxmlformats.org/drawingml/2006/main" xmlns:p="http://schemas.openxmlformats.org/presentationml/2006/main" xmlns:r="http://schemas.openxmlformats.org/officeDocument/2006/relationships" xmlns:p14="http://schemas.microsoft.com/office/powerpoint/2010/main" xmlns:p15="http://schemas.microsoft.com/office/powerpoint/2012/main" xmlns:mc="http://schemas.openxmlformats.org/markup-compatibility/2006">
+  <p:cSld>
+    <p:spTree>
+      <p:nvGrpSpPr>
+        <p:cNvPr id="1" name=""/>
+        <p:cNvGrpSpPr/>
+        <p:nvPr/>
+      </p:nvGrpSpPr>
+      <p:grpSpPr>
+        <a:xfrm>
+          <a:off x="0" y="0"/>
+          <a:ext cx="0" cy="0"/>
+          <a:chOff x="0" y="0"/>
+          <a:chExt cx="0" cy="0"/>
+        </a:xfrm>
+      </p:grpSpPr>
+      <p:sp>
+        <p:nvSpPr>
+          <p:cNvPr id="66" name="TextShape 1"/>
+          <p:cNvSpPr txBox="1"/>
+          <p:nvPr/>
+        </p:nvSpPr>
+        <p:spPr>
+          <a:xfrm>
+            <a:off x="504000" y="226080"/>
+            <a:ext cx="9072000" cy="946440"/>
+          </a:xfrm>
+          <a:prstGeom prst="rect">
+            <a:avLst/>
+          </a:prstGeom>
+          <a:noFill/>
+          <a:ln>
+            <a:noFill/>
+          </a:ln>
+        </p:spPr>
+        <p:txBody>
+          <a:bodyPr lIns="0" rIns="0" tIns="0" bIns="0" anchor="ctr">
+            <a:spAutoFit/>
+          </a:bodyPr>
+          <a:p>
+            <a:pPr algn="ctr"/>
+            <a:r>
+              <a:rPr b="0" lang="en-US" sz="4400" spc="-1" strike="noStrike">
+                <a:latin typeface="Arial"/>
+              </a:rPr>
+              <a:t>Método</a:t>
+            </a:r>
+            <a:endParaRPr b="0" lang="en-US" sz="4400" spc="-1" strike="noStrike">
+              <a:latin typeface="Arial"/>
+            </a:endParaRPr>
+          </a:p>
+        </p:txBody>
+      </p:sp>
+      <p:sp>
+        <p:nvSpPr>
+          <p:cNvPr id="67" name="TextShape 2"/>
+          <p:cNvSpPr txBox="1"/>
+          <p:nvPr/>
+        </p:nvSpPr>
+        <p:spPr>
+          <a:xfrm>
+            <a:off x="314280" y="1974600"/>
+            <a:ext cx="9452160" cy="3288600"/>
+          </a:xfrm>
+          <a:prstGeom prst="rect">
+            <a:avLst/>
+          </a:prstGeom>
+          <a:noFill/>
+          <a:ln>
+            <a:noFill/>
+          </a:ln>
+        </p:spPr>
+        <p:txBody>
+          <a:bodyPr lIns="0" rIns="0" tIns="0" bIns="0">
+            <a:normAutofit/>
+          </a:bodyPr>
+          <a:p>
+            <a:pPr marL="432000" indent="-324000">
+              <a:spcBef>
+                <a:spcPts val="1417"/>
+              </a:spcBef>
+              <a:buClr>
+                <a:srgbClr val="000000"/>
+              </a:buClr>
+              <a:buSzPct val="45000"/>
+              <a:buFont typeface="Wingdings" charset="2"/>
+              <a:buChar char=""/>
+            </a:pPr>
+            <a:r>
+              <a:rPr b="0" lang="en-US" sz="3200" spc="-1" strike="noStrike">
+                <a:latin typeface="Arial"/>
+              </a:rPr>
+              <a:t>Procesamiento del texto de las entradas de los blogs mediante la implementación de Name Entity Recognition del paquete SpaCy.</a:t>
+            </a:r>
+            <a:endParaRPr b="0" lang="en-US" sz="3200" spc="-1" strike="noStrike">
+              <a:latin typeface="Arial"/>
+            </a:endParaRPr>
+          </a:p>
+        </p:txBody>
+      </p:sp>
+    </p:spTree>
+  </p:cSld>
+  <mc:AlternateContent>
+    <mc:Choice Requires="p14">
+      <p:transition spd="slow" p14:dur="2000"/>
+    </mc:Choice>
+    <mc:Fallback>
+      <p:transition spd="slow"/>
+    </mc:Fallback>
+  </mc:AlternateContent>
+  <p:timing>
+    <p:tnLst>
+      <p:par>
+        <p:cTn id="33" dur="indefinite" restart="never" nodeType="tmRoot">
+          <p:childTnLst>
+            <p:seq>
+              <p:cTn id="34" dur="indefinite" nodeType="mainSeq"/>
+              <p:prevCondLst>
+                <p:cond delay="0" evt="onPrev">
+                  <p:tgtEl>
+                    <p:sldTgt/>
+                  </p:tgtEl>
+                </p:cond>
+              </p:prevCondLst>
+              <p:nextCondLst>
+                <p:cond delay="0" evt="onNext">
+                  <p:tgtEl>
+                    <p:sldTgt/>
+                  </p:tgtEl>
+                </p:cond>
+              </p:nextCondLst>
+            </p:seq>
+          </p:childTnLst>
+        </p:cTn>
+      </p:par>
+    </p:tnLst>
+  </p:timing>
+</p:sld>
+</file>
+
+<file path=ppt/slides/slide18.xml><?xml version="1.0" encoding="utf-8"?>
+<p:sld xmlns:a="http://schemas.openxmlformats.org/drawingml/2006/main" xmlns:p="http://schemas.openxmlformats.org/presentationml/2006/main" xmlns:r="http://schemas.openxmlformats.org/officeDocument/2006/relationships" xmlns:p14="http://schemas.microsoft.com/office/powerpoint/2010/main" xmlns:p15="http://schemas.microsoft.com/office/powerpoint/2012/main" xmlns:mc="http://schemas.openxmlformats.org/markup-compatibility/2006">
+  <p:cSld>
+    <p:spTree>
+      <p:nvGrpSpPr>
+        <p:cNvPr id="1" name=""/>
+        <p:cNvGrpSpPr/>
+        <p:nvPr/>
+      </p:nvGrpSpPr>
+      <p:grpSpPr>
+        <a:xfrm>
+          <a:off x="0" y="0"/>
+          <a:ext cx="0" cy="0"/>
+          <a:chOff x="0" y="0"/>
+          <a:chExt cx="0" cy="0"/>
+        </a:xfrm>
+      </p:grpSpPr>
+      <p:sp>
+        <p:nvSpPr>
+          <p:cNvPr id="68" name="TextShape 1"/>
+          <p:cNvSpPr txBox="1"/>
+          <p:nvPr/>
+        </p:nvSpPr>
+        <p:spPr>
+          <a:xfrm>
+            <a:off x="504000" y="226080"/>
+            <a:ext cx="9072000" cy="946440"/>
+          </a:xfrm>
+          <a:prstGeom prst="rect">
+            <a:avLst/>
+          </a:prstGeom>
+          <a:noFill/>
+          <a:ln>
+            <a:noFill/>
+          </a:ln>
+        </p:spPr>
+        <p:txBody>
+          <a:bodyPr lIns="0" rIns="0" tIns="0" bIns="0" anchor="ctr">
+            <a:spAutoFit/>
+          </a:bodyPr>
+          <a:p>
+            <a:r>
+              <a:rPr b="0" lang="en-US" sz="4400" spc="-1" strike="noStrike">
+                <a:latin typeface="Arial"/>
+              </a:rPr>
+              <a:t>Resultados</a:t>
+            </a:r>
+            <a:endParaRPr b="0" lang="en-US" sz="4400" spc="-1" strike="noStrike">
+              <a:latin typeface="Arial"/>
+            </a:endParaRPr>
+          </a:p>
+        </p:txBody>
+      </p:sp>
+      <p:sp>
+        <p:nvSpPr>
+          <p:cNvPr id="69" name="TextShape 2"/>
+          <p:cNvSpPr txBox="1"/>
+          <p:nvPr/>
+        </p:nvSpPr>
+        <p:spPr>
+          <a:xfrm>
+            <a:off x="4120560" y="1450440"/>
+            <a:ext cx="5340960" cy="3913920"/>
+          </a:xfrm>
+          <a:prstGeom prst="rect">
+            <a:avLst/>
+          </a:prstGeom>
+          <a:noFill/>
+          <a:ln>
+            <a:noFill/>
+          </a:ln>
+        </p:spPr>
+        <p:txBody>
+          <a:bodyPr lIns="90000" rIns="90000" tIns="45000" bIns="45000">
+            <a:spAutoFit/>
+          </a:bodyPr>
+          <a:p>
+            <a:r>
+              <a:rPr b="0" lang="en-US" sz="1400" spc="-1" strike="noStrike">
+                <a:latin typeface="Liberation Mono;Courier New;DejaVu Sans Mono"/>
+              </a:rPr>
+              <a:t>[(('Jesus', 'PERSON'), 1758),</a:t>
+            </a:r>
+            <a:endParaRPr b="0" lang="en-US" sz="1400" spc="-1" strike="noStrike">
+              <a:latin typeface="Liberation Mono;Courier New;DejaVu Sans Mono"/>
+              <a:ea typeface="Liberation Mono;Courier New;DejaVu Sans Mono"/>
+            </a:endParaRPr>
+          </a:p>
+          <a:p>
+            <a:r>
+              <a:rPr b="0" lang="en-US" sz="1400" spc="-1" strike="noStrike">
+                <a:latin typeface="Liberation Mono;Courier New;DejaVu Sans Mono"/>
+              </a:rPr>
+              <a:t> </a:t>
+            </a:r>
+            <a:r>
+              <a:rPr b="0" lang="en-US" sz="1400" spc="-1" strike="noStrike">
+                <a:latin typeface="Liberation Mono;Courier New;DejaVu Sans Mono"/>
+              </a:rPr>
+              <a:t>(('Chris', 'PERSON'), 1321),</a:t>
+            </a:r>
+            <a:endParaRPr b="0" lang="en-US" sz="1400" spc="-1" strike="noStrike">
+              <a:latin typeface="Liberation Mono;Courier New;DejaVu Sans Mono"/>
+              <a:ea typeface="Liberation Mono;Courier New;DejaVu Sans Mono"/>
+            </a:endParaRPr>
+          </a:p>
+          <a:p>
+            <a:r>
+              <a:rPr b="0" lang="en-US" sz="1400" spc="-1" strike="noStrike">
+                <a:latin typeface="Liberation Mono;Courier New;DejaVu Sans Mono"/>
+              </a:rPr>
+              <a:t> </a:t>
+            </a:r>
+            <a:r>
+              <a:rPr b="0" lang="en-US" sz="1400" spc="-1" strike="noStrike">
+                <a:latin typeface="Liberation Mono;Courier New;DejaVu Sans Mono"/>
+              </a:rPr>
+              <a:t>(('John', 'PERSON'), 1113),</a:t>
+            </a:r>
+            <a:endParaRPr b="0" lang="en-US" sz="1400" spc="-1" strike="noStrike">
+              <a:latin typeface="Liberation Mono;Courier New;DejaVu Sans Mono"/>
+              <a:ea typeface="Liberation Mono;Courier New;DejaVu Sans Mono"/>
+            </a:endParaRPr>
+          </a:p>
+          <a:p>
+            <a:r>
+              <a:rPr b="0" lang="en-US" sz="1400" spc="-1" strike="noStrike">
+                <a:latin typeface="Liberation Mono;Courier New;DejaVu Sans Mono"/>
+              </a:rPr>
+              <a:t> </a:t>
+            </a:r>
+            <a:r>
+              <a:rPr b="0" lang="en-US" sz="1400" spc="-1" strike="noStrike">
+                <a:latin typeface="Liberation Mono;Courier New;DejaVu Sans Mono"/>
+              </a:rPr>
+              <a:t>(('Matt', 'PERSON'), 1070),</a:t>
+            </a:r>
+            <a:endParaRPr b="0" lang="en-US" sz="1400" spc="-1" strike="noStrike">
+              <a:latin typeface="Liberation Mono;Courier New;DejaVu Sans Mono"/>
+              <a:ea typeface="Liberation Mono;Courier New;DejaVu Sans Mono"/>
+            </a:endParaRPr>
+          </a:p>
+          <a:p>
+            <a:r>
+              <a:rPr b="0" lang="en-US" sz="1400" spc="-1" strike="noStrike">
+                <a:latin typeface="Liberation Mono;Courier New;DejaVu Sans Mono"/>
+              </a:rPr>
+              <a:t> </a:t>
+            </a:r>
+            <a:r>
+              <a:rPr b="0" lang="en-US" sz="1400" spc="-1" strike="noStrike">
+                <a:latin typeface="Liberation Mono;Courier New;DejaVu Sans Mono"/>
+              </a:rPr>
+              <a:t>(('Mike', 'PERSON'), 1038),</a:t>
+            </a:r>
+            <a:endParaRPr b="0" lang="en-US" sz="1400" spc="-1" strike="noStrike">
+              <a:latin typeface="Liberation Mono;Courier New;DejaVu Sans Mono"/>
+              <a:ea typeface="Liberation Mono;Courier New;DejaVu Sans Mono"/>
+            </a:endParaRPr>
+          </a:p>
+          <a:p>
+            <a:r>
+              <a:rPr b="0" lang="en-US" sz="1400" spc="-1" strike="noStrike">
+                <a:latin typeface="Liberation Mono;Courier New;DejaVu Sans Mono"/>
+              </a:rPr>
+              <a:t> </a:t>
+            </a:r>
+            <a:r>
+              <a:rPr b="0" lang="en-US" sz="1400" spc="-1" strike="noStrike">
+                <a:latin typeface="Liberation Mono;Courier New;DejaVu Sans Mono"/>
+              </a:rPr>
+              <a:t>(('Paul', 'PERSON'), 1033),</a:t>
+            </a:r>
+            <a:endParaRPr b="0" lang="en-US" sz="1400" spc="-1" strike="noStrike">
+              <a:latin typeface="Liberation Mono;Courier New;DejaVu Sans Mono"/>
+              <a:ea typeface="Liberation Mono;Courier New;DejaVu Sans Mono"/>
+            </a:endParaRPr>
+          </a:p>
+          <a:p>
+            <a:r>
+              <a:rPr b="0" lang="en-US" sz="1400" spc="-1" strike="noStrike">
+                <a:latin typeface="Liberation Mono;Courier New;DejaVu Sans Mono"/>
+              </a:rPr>
+              <a:t> </a:t>
+            </a:r>
+            <a:r>
+              <a:rPr b="0" lang="en-US" sz="1400" spc="-1" strike="noStrike">
+                <a:latin typeface="Liberation Mono;Courier New;DejaVu Sans Mono"/>
+              </a:rPr>
+              <a:t>(('Haha', 'PERSON'), 963),</a:t>
+            </a:r>
+            <a:endParaRPr b="0" lang="en-US" sz="1400" spc="-1" strike="noStrike">
+              <a:latin typeface="Liberation Mono;Courier New;DejaVu Sans Mono"/>
+              <a:ea typeface="Liberation Mono;Courier New;DejaVu Sans Mono"/>
+            </a:endParaRPr>
+          </a:p>
+          <a:p>
+            <a:r>
+              <a:rPr b="0" lang="en-US" sz="1400" spc="-1" strike="noStrike">
+                <a:latin typeface="Liberation Mono;Courier New;DejaVu Sans Mono"/>
+              </a:rPr>
+              <a:t> </a:t>
+            </a:r>
+            <a:r>
+              <a:rPr b="0" lang="en-US" sz="1400" spc="-1" strike="noStrike">
+                <a:latin typeface="Liberation Mono;Courier New;DejaVu Sans Mono"/>
+              </a:rPr>
+              <a:t>(('God', 'PERSON'), 902),</a:t>
+            </a:r>
+            <a:endParaRPr b="0" lang="en-US" sz="1400" spc="-1" strike="noStrike">
+              <a:latin typeface="Liberation Mono;Courier New;DejaVu Sans Mono"/>
+              <a:ea typeface="Liberation Mono;Courier New;DejaVu Sans Mono"/>
+            </a:endParaRPr>
+          </a:p>
+          <a:p>
+            <a:r>
+              <a:rPr b="0" lang="en-US" sz="1400" spc="-1" strike="noStrike">
+                <a:latin typeface="Liberation Mono;Courier New;DejaVu Sans Mono"/>
+              </a:rPr>
+              <a:t> </a:t>
+            </a:r>
+            <a:r>
+              <a:rPr b="0" lang="en-US" sz="1400" spc="-1" strike="noStrike">
+                <a:latin typeface="Liberation Mono;Courier New;DejaVu Sans Mono"/>
+              </a:rPr>
+              <a:t>(('Sarah', 'PERSON'), 824),</a:t>
+            </a:r>
+            <a:endParaRPr b="0" lang="en-US" sz="1400" spc="-1" strike="noStrike">
+              <a:latin typeface="Liberation Mono;Courier New;DejaVu Sans Mono"/>
+              <a:ea typeface="Liberation Mono;Courier New;DejaVu Sans Mono"/>
+            </a:endParaRPr>
+          </a:p>
+          <a:p>
+            <a:r>
+              <a:rPr b="0" lang="en-US" sz="1400" spc="-1" strike="noStrike">
+                <a:latin typeface="Liberation Mono;Courier New;DejaVu Sans Mono"/>
+              </a:rPr>
+              <a:t> </a:t>
+            </a:r>
+            <a:r>
+              <a:rPr b="0" lang="en-US" sz="1400" spc="-1" strike="noStrike">
+                <a:latin typeface="Liberation Mono;Courier New;DejaVu Sans Mono"/>
+              </a:rPr>
+              <a:t>(('Kerry', 'PERSON'), 821),</a:t>
+            </a:r>
+            <a:endParaRPr b="0" lang="en-US" sz="1400" spc="-1" strike="noStrike">
+              <a:latin typeface="Liberation Mono;Courier New;DejaVu Sans Mono"/>
+              <a:ea typeface="Liberation Mono;Courier New;DejaVu Sans Mono"/>
+            </a:endParaRPr>
+          </a:p>
+          <a:p>
+            <a:r>
+              <a:rPr b="0" lang="en-US" sz="1400" spc="-1" strike="noStrike">
+                <a:latin typeface="Liberation Mono;Courier New;DejaVu Sans Mono"/>
+              </a:rPr>
+              <a:t> </a:t>
+            </a:r>
+            <a:r>
+              <a:rPr b="0" lang="en-US" sz="1400" spc="-1" strike="noStrike">
+                <a:latin typeface="Liberation Mono;Courier New;DejaVu Sans Mono"/>
+              </a:rPr>
+              <a:t>(('SBristowSD6', 'PERSON'), 772),</a:t>
+            </a:r>
+            <a:endParaRPr b="0" lang="en-US" sz="1400" spc="-1" strike="noStrike">
+              <a:latin typeface="Liberation Mono;Courier New;DejaVu Sans Mono"/>
+              <a:ea typeface="Liberation Mono;Courier New;DejaVu Sans Mono"/>
+            </a:endParaRPr>
+          </a:p>
+          <a:p>
+            <a:r>
+              <a:rPr b="0" lang="en-US" sz="1400" spc="-1" strike="noStrike">
+                <a:latin typeface="Liberation Mono;Courier New;DejaVu Sans Mono"/>
+              </a:rPr>
+              <a:t> </a:t>
+            </a:r>
+            <a:r>
+              <a:rPr b="0" lang="en-US" sz="1400" spc="-1" strike="noStrike">
+                <a:latin typeface="Liberation Mono;Courier New;DejaVu Sans Mono"/>
+              </a:rPr>
+              <a:t>(('David', 'PERSON'), 723),</a:t>
+            </a:r>
+            <a:endParaRPr b="0" lang="en-US" sz="1400" spc="-1" strike="noStrike">
+              <a:latin typeface="Liberation Mono;Courier New;DejaVu Sans Mono"/>
+              <a:ea typeface="Liberation Mono;Courier New;DejaVu Sans Mono"/>
+            </a:endParaRPr>
+          </a:p>
+          <a:p>
+            <a:r>
+              <a:rPr b="0" lang="en-US" sz="1400" spc="-1" strike="noStrike">
+                <a:latin typeface="Liberation Mono;Courier New;DejaVu Sans Mono"/>
+              </a:rPr>
+              <a:t> </a:t>
+            </a:r>
+            <a:r>
+              <a:rPr b="0" lang="en-US" sz="1400" spc="-1" strike="noStrike">
+                <a:latin typeface="Liberation Mono;Courier New;DejaVu Sans Mono"/>
+              </a:rPr>
+              <a:t>(('Dave', 'PERSON'), 711),</a:t>
+            </a:r>
+            <a:endParaRPr b="0" lang="en-US" sz="1400" spc="-1" strike="noStrike">
+              <a:latin typeface="Liberation Mono;Courier New;DejaVu Sans Mono"/>
+              <a:ea typeface="Liberation Mono;Courier New;DejaVu Sans Mono"/>
+            </a:endParaRPr>
+          </a:p>
+          <a:p>
+            <a:r>
+              <a:rPr b="0" lang="en-US" sz="1400" spc="-1" strike="noStrike">
+                <a:latin typeface="Liberation Mono;Courier New;DejaVu Sans Mono"/>
+              </a:rPr>
+              <a:t> </a:t>
+            </a:r>
+            <a:r>
+              <a:rPr b="0" lang="en-US" sz="1400" spc="-1" strike="noStrike">
+                <a:latin typeface="Liberation Mono;Courier New;DejaVu Sans Mono"/>
+              </a:rPr>
+              <a:t>(('Michael', 'PERSON'), 684),</a:t>
+            </a:r>
+            <a:endParaRPr b="0" lang="en-US" sz="1400" spc="-1" strike="noStrike">
+              <a:latin typeface="Liberation Mono;Courier New;DejaVu Sans Mono"/>
+              <a:ea typeface="Liberation Mono;Courier New;DejaVu Sans Mono"/>
+            </a:endParaRPr>
+          </a:p>
+          <a:p>
+            <a:r>
+              <a:rPr b="0" lang="en-US" sz="1400" spc="-1" strike="noStrike">
+                <a:latin typeface="Liberation Mono;Courier New;DejaVu Sans Mono"/>
+              </a:rPr>
+              <a:t> </a:t>
+            </a:r>
+            <a:r>
+              <a:rPr b="0" lang="en-US" sz="1400" spc="-1" strike="noStrike">
+                <a:latin typeface="Liberation Mono;Courier New;DejaVu Sans Mono"/>
+              </a:rPr>
+              <a:t>(('Josh', 'PERSON'), 679),</a:t>
+            </a:r>
+            <a:endParaRPr b="0" lang="en-US" sz="1400" spc="-1" strike="noStrike">
+              <a:latin typeface="Liberation Mono;Courier New;DejaVu Sans Mono"/>
+              <a:ea typeface="Liberation Mono;Courier New;DejaVu Sans Mono"/>
+            </a:endParaRPr>
+          </a:p>
+          <a:p>
+            <a:r>
+              <a:rPr b="0" lang="en-US" sz="1400" spc="-1" strike="noStrike">
+                <a:latin typeface="Liberation Mono;Courier New;DejaVu Sans Mono"/>
+              </a:rPr>
+              <a:t> </a:t>
+            </a:r>
+            <a:r>
+              <a:rPr b="0" lang="en-US" sz="1400" spc="-1" strike="noStrike">
+                <a:latin typeface="Liberation Mono;Courier New;DejaVu Sans Mono"/>
+              </a:rPr>
+              <a:t>(('Brian', 'PERSON'), 659),</a:t>
+            </a:r>
+            <a:endParaRPr b="0" lang="en-US" sz="1400" spc="-1" strike="noStrike">
+              <a:latin typeface="Liberation Mono;Courier New;DejaVu Sans Mono"/>
+              <a:ea typeface="Liberation Mono;Courier New;DejaVu Sans Mono"/>
+            </a:endParaRPr>
+          </a:p>
+          <a:p>
+            <a:r>
+              <a:rPr b="0" lang="en-US" sz="1400" spc="-1" strike="noStrike">
+                <a:latin typeface="Liberation Mono;Courier New;DejaVu Sans Mono"/>
+              </a:rPr>
+              <a:t> </a:t>
+            </a:r>
+            <a:r>
+              <a:rPr b="0" lang="en-US" sz="1400" spc="-1" strike="noStrike">
+                <a:latin typeface="Liberation Mono;Courier New;DejaVu Sans Mono"/>
+              </a:rPr>
+              <a:t>(('Joe', 'PERSON'), 657),</a:t>
+            </a:r>
+            <a:endParaRPr b="0" lang="en-US" sz="1400" spc="-1" strike="noStrike">
+              <a:latin typeface="Liberation Mono;Courier New;DejaVu Sans Mono"/>
+              <a:ea typeface="Liberation Mono;Courier New;DejaVu Sans Mono"/>
+            </a:endParaRPr>
+          </a:p>
+          <a:p>
+            <a:r>
+              <a:rPr b="0" lang="en-US" sz="1400" spc="-1" strike="noStrike">
+                <a:latin typeface="Liberation Mono;Courier New;DejaVu Sans Mono"/>
+              </a:rPr>
+              <a:t> </a:t>
+            </a:r>
+            <a:r>
+              <a:rPr b="0" lang="en-US" sz="1400" spc="-1" strike="noStrike">
+                <a:latin typeface="Liberation Mono;Courier New;DejaVu Sans Mono"/>
+              </a:rPr>
+              <a:t>(('Dan', 'PERSON'), 655),</a:t>
+            </a:r>
+            <a:endParaRPr b="0" lang="en-US" sz="1400" spc="-1" strike="noStrike">
+              <a:latin typeface="Liberation Mono;Courier New;DejaVu Sans Mono"/>
+              <a:ea typeface="Liberation Mono;Courier New;DejaVu Sans Mono"/>
+            </a:endParaRPr>
+          </a:p>
+          <a:p>
+            <a:r>
+              <a:rPr b="0" lang="en-US" sz="1400" spc="-1" strike="noStrike">
+                <a:latin typeface="Liberation Mono;Courier New;DejaVu Sans Mono"/>
+              </a:rPr>
+              <a:t> </a:t>
+            </a:r>
+            <a:r>
+              <a:rPr b="0" lang="en-US" sz="1400" spc="-1" strike="noStrike">
+                <a:latin typeface="Liberation Mono;Courier New;DejaVu Sans Mono"/>
+              </a:rPr>
+              <a:t>(('Ryan', 'PERSON'), 645)]</a:t>
+            </a:r>
+            <a:endParaRPr b="0" lang="en-US" sz="1400" spc="-1" strike="noStrike">
+              <a:latin typeface="Liberation Mono;Courier New;DejaVu Sans Mono"/>
+              <a:ea typeface="Liberation Mono;Courier New;DejaVu Sans Mono"/>
+            </a:endParaRPr>
+          </a:p>
+        </p:txBody>
+      </p:sp>
+    </p:spTree>
+  </p:cSld>
+  <mc:AlternateContent>
+    <mc:Choice Requires="p14">
+      <p:transition spd="slow" p14:dur="2000"/>
+    </mc:Choice>
+    <mc:Fallback>
+      <p:transition spd="slow"/>
+    </mc:Fallback>
+  </mc:AlternateContent>
+  <p:timing>
+    <p:tnLst>
+      <p:par>
+        <p:cTn id="35" dur="indefinite" restart="never" nodeType="tmRoot">
+          <p:childTnLst>
+            <p:seq>
+              <p:cTn id="36" dur="indefinite" nodeType="mainSeq"/>
+              <p:prevCondLst>
+                <p:cond delay="0" evt="onPrev">
+                  <p:tgtEl>
+                    <p:sldTgt/>
+                  </p:tgtEl>
+                </p:cond>
+              </p:prevCondLst>
+              <p:nextCondLst>
+                <p:cond delay="0" evt="onNext">
+                  <p:tgtEl>
+                    <p:sldTgt/>
+                  </p:tgtEl>
+                </p:cond>
+              </p:nextCondLst>
+            </p:seq>
+          </p:childTnLst>
+        </p:cTn>
+      </p:par>
+    </p:tnLst>
+  </p:timing>
+</p:sld>
+</file>
+
+<file path=ppt/slides/slide19.xml><?xml version="1.0" encoding="utf-8"?>
+<p:sld xmlns:a="http://schemas.openxmlformats.org/drawingml/2006/main" xmlns:p="http://schemas.openxmlformats.org/presentationml/2006/main" xmlns:r="http://schemas.openxmlformats.org/officeDocument/2006/relationships" xmlns:p14="http://schemas.microsoft.com/office/powerpoint/2010/main" xmlns:p15="http://schemas.microsoft.com/office/powerpoint/2012/main" xmlns:mc="http://schemas.openxmlformats.org/markup-compatibility/2006">
+  <p:cSld>
+    <p:spTree>
+      <p:nvGrpSpPr>
+        <p:cNvPr id="1" name=""/>
+        <p:cNvGrpSpPr/>
+        <p:nvPr/>
+      </p:nvGrpSpPr>
+      <p:grpSpPr>
+        <a:xfrm>
+          <a:off x="0" y="0"/>
+          <a:ext cx="0" cy="0"/>
+          <a:chOff x="0" y="0"/>
+          <a:chExt cx="0" cy="0"/>
+        </a:xfrm>
+      </p:grpSpPr>
+      <p:sp>
+        <p:nvSpPr>
+          <p:cNvPr id="70" name="TextShape 1"/>
+          <p:cNvSpPr txBox="1"/>
+          <p:nvPr/>
+        </p:nvSpPr>
+        <p:spPr>
+          <a:xfrm>
+            <a:off x="504000" y="226080"/>
+            <a:ext cx="9072000" cy="946440"/>
+          </a:xfrm>
+          <a:prstGeom prst="rect">
+            <a:avLst/>
+          </a:prstGeom>
+          <a:noFill/>
+          <a:ln>
+            <a:noFill/>
+          </a:ln>
+        </p:spPr>
+        <p:txBody>
+          <a:bodyPr lIns="0" rIns="0" tIns="0" bIns="0" anchor="ctr">
+            <a:spAutoFit/>
+          </a:bodyPr>
+          <a:p>
+            <a:r>
+              <a:rPr b="0" lang="en-US" sz="4400" spc="-1" strike="noStrike">
+                <a:latin typeface="Arial"/>
+              </a:rPr>
+              <a:t>Resultados</a:t>
+            </a:r>
+            <a:endParaRPr b="0" lang="en-US" sz="4400" spc="-1" strike="noStrike">
+              <a:latin typeface="Arial"/>
+            </a:endParaRPr>
+          </a:p>
+        </p:txBody>
+      </p:sp>
+      <p:sp>
+        <p:nvSpPr>
+          <p:cNvPr id="71" name="TextShape 2"/>
+          <p:cNvSpPr txBox="1"/>
+          <p:nvPr/>
+        </p:nvSpPr>
+        <p:spPr>
+          <a:xfrm>
+            <a:off x="4120560" y="1450440"/>
+            <a:ext cx="5340960" cy="3913920"/>
+          </a:xfrm>
+          <a:prstGeom prst="rect">
+            <a:avLst/>
+          </a:prstGeom>
+          <a:noFill/>
+          <a:ln>
+            <a:noFill/>
+          </a:ln>
+        </p:spPr>
+        <p:txBody>
+          <a:bodyPr lIns="90000" rIns="90000" tIns="45000" bIns="45000">
+            <a:spAutoFit/>
+          </a:bodyPr>
+          <a:p>
+            <a:r>
+              <a:rPr b="0" lang="en-US" sz="1400" spc="-1" strike="noStrike">
+                <a:latin typeface="Liberation Mono;Courier New;DejaVu Sans Mono"/>
+                <a:ea typeface="Liberation Mono;Courier New;DejaVu Sans Mono"/>
+              </a:rPr>
+              <a:t>[(('America', 'GPE'), 1978),</a:t>
+            </a:r>
+            <a:endParaRPr b="0" lang="en-US" sz="1400" spc="-1" strike="noStrike">
+              <a:latin typeface="Liberation Mono;Courier New;DejaVu Sans Mono"/>
+              <a:ea typeface="Liberation Mono;Courier New;DejaVu Sans Mono"/>
+            </a:endParaRPr>
+          </a:p>
+          <a:p>
+            <a:r>
+              <a:rPr b="0" lang="en-US" sz="1400" spc="-1" strike="noStrike">
+                <a:latin typeface="Liberation Mono;Courier New;DejaVu Sans Mono"/>
+                <a:ea typeface="Liberation Mono;Courier New;DejaVu Sans Mono"/>
+              </a:rPr>
+              <a:t> </a:t>
+            </a:r>
+            <a:r>
+              <a:rPr b="0" lang="en-US" sz="1400" spc="-1" strike="noStrike">
+                <a:latin typeface="Liberation Mono;Courier New;DejaVu Sans Mono"/>
+                <a:ea typeface="Liberation Mono;Courier New;DejaVu Sans Mono"/>
+              </a:rPr>
+              <a:t>(('US', 'GPE'), 1686),</a:t>
+            </a:r>
+            <a:endParaRPr b="0" lang="en-US" sz="1400" spc="-1" strike="noStrike">
+              <a:latin typeface="Liberation Mono;Courier New;DejaVu Sans Mono"/>
+              <a:ea typeface="Liberation Mono;Courier New;DejaVu Sans Mono"/>
+            </a:endParaRPr>
+          </a:p>
+          <a:p>
+            <a:r>
+              <a:rPr b="0" lang="en-US" sz="1400" spc="-1" strike="noStrike">
+                <a:latin typeface="Liberation Mono;Courier New;DejaVu Sans Mono"/>
+                <a:ea typeface="Liberation Mono;Courier New;DejaVu Sans Mono"/>
+              </a:rPr>
+              <a:t> </a:t>
+            </a:r>
+            <a:r>
+              <a:rPr b="0" lang="en-US" sz="1400" spc="-1" strike="noStrike">
+                <a:latin typeface="Liberation Mono;Courier New;DejaVu Sans Mono"/>
+                <a:ea typeface="Liberation Mono;Courier New;DejaVu Sans Mono"/>
+              </a:rPr>
+              <a:t>(('U  ', 'LOC'), 1315),</a:t>
+            </a:r>
+            <a:endParaRPr b="0" lang="en-US" sz="1400" spc="-1" strike="noStrike">
+              <a:latin typeface="Liberation Mono;Courier New;DejaVu Sans Mono"/>
+              <a:ea typeface="Liberation Mono;Courier New;DejaVu Sans Mono"/>
+            </a:endParaRPr>
+          </a:p>
+          <a:p>
+            <a:r>
+              <a:rPr b="0" lang="en-US" sz="1400" spc="-1" strike="noStrike">
+                <a:latin typeface="Liberation Mono;Courier New;DejaVu Sans Mono"/>
+                <a:ea typeface="Liberation Mono;Courier New;DejaVu Sans Mono"/>
+              </a:rPr>
+              <a:t> </a:t>
+            </a:r>
+            <a:r>
+              <a:rPr b="0" lang="en-US" sz="1400" spc="-1" strike="noStrike">
+                <a:latin typeface="Liberation Mono;Courier New;DejaVu Sans Mono"/>
+                <a:ea typeface="Liberation Mono;Courier New;DejaVu Sans Mono"/>
+              </a:rPr>
+              <a:t>(('U.S.', 'GPE'), 1280),</a:t>
+            </a:r>
+            <a:endParaRPr b="0" lang="en-US" sz="1400" spc="-1" strike="noStrike">
+              <a:latin typeface="Liberation Mono;Courier New;DejaVu Sans Mono"/>
+              <a:ea typeface="Liberation Mono;Courier New;DejaVu Sans Mono"/>
+            </a:endParaRPr>
+          </a:p>
+          <a:p>
+            <a:r>
+              <a:rPr b="0" lang="en-US" sz="1400" spc="-1" strike="noStrike">
+                <a:latin typeface="Liberation Mono;Courier New;DejaVu Sans Mono"/>
+                <a:ea typeface="Liberation Mono;Courier New;DejaVu Sans Mono"/>
+              </a:rPr>
+              <a:t> </a:t>
+            </a:r>
+            <a:r>
+              <a:rPr b="0" lang="en-US" sz="1400" spc="-1" strike="noStrike">
+                <a:latin typeface="Liberation Mono;Courier New;DejaVu Sans Mono"/>
+                <a:ea typeface="Liberation Mono;Courier New;DejaVu Sans Mono"/>
+              </a:rPr>
+              <a:t>(('New York', 'GPE'), 899),</a:t>
+            </a:r>
+            <a:endParaRPr b="0" lang="en-US" sz="1400" spc="-1" strike="noStrike">
+              <a:latin typeface="Liberation Mono;Courier New;DejaVu Sans Mono"/>
+              <a:ea typeface="Liberation Mono;Courier New;DejaVu Sans Mono"/>
+            </a:endParaRPr>
+          </a:p>
+          <a:p>
+            <a:r>
+              <a:rPr b="0" lang="en-US" sz="1400" spc="-1" strike="noStrike">
+                <a:latin typeface="Liberation Mono;Courier New;DejaVu Sans Mono"/>
+                <a:ea typeface="Liberation Mono;Courier New;DejaVu Sans Mono"/>
+              </a:rPr>
+              <a:t> </a:t>
+            </a:r>
+            <a:r>
+              <a:rPr b="0" lang="en-US" sz="1400" spc="-1" strike="noStrike">
+                <a:latin typeface="Liberation Mono;Courier New;DejaVu Sans Mono"/>
+                <a:ea typeface="Liberation Mono;Courier New;DejaVu Sans Mono"/>
+              </a:rPr>
+              <a:t>(('China', 'GPE'), 878),</a:t>
+            </a:r>
+            <a:endParaRPr b="0" lang="en-US" sz="1400" spc="-1" strike="noStrike">
+              <a:latin typeface="Liberation Mono;Courier New;DejaVu Sans Mono"/>
+              <a:ea typeface="Liberation Mono;Courier New;DejaVu Sans Mono"/>
+            </a:endParaRPr>
+          </a:p>
+          <a:p>
+            <a:r>
+              <a:rPr b="0" lang="en-US" sz="1400" spc="-1" strike="noStrike">
+                <a:latin typeface="Liberation Mono;Courier New;DejaVu Sans Mono"/>
+                <a:ea typeface="Liberation Mono;Courier New;DejaVu Sans Mono"/>
+              </a:rPr>
+              <a:t> </a:t>
+            </a:r>
+            <a:r>
+              <a:rPr b="0" lang="en-US" sz="1400" spc="-1" strike="noStrike">
+                <a:latin typeface="Liberation Mono;Courier New;DejaVu Sans Mono"/>
+                <a:ea typeface="Liberation Mono;Courier New;DejaVu Sans Mono"/>
+              </a:rPr>
+              <a:t>(('California', 'GPE'), 864),</a:t>
+            </a:r>
+            <a:endParaRPr b="0" lang="en-US" sz="1400" spc="-1" strike="noStrike">
+              <a:latin typeface="Liberation Mono;Courier New;DejaVu Sans Mono"/>
+              <a:ea typeface="Liberation Mono;Courier New;DejaVu Sans Mono"/>
+            </a:endParaRPr>
+          </a:p>
+          <a:p>
+            <a:r>
+              <a:rPr b="0" lang="en-US" sz="1400" spc="-1" strike="noStrike">
+                <a:latin typeface="Liberation Mono;Courier New;DejaVu Sans Mono"/>
+                <a:ea typeface="Liberation Mono;Courier New;DejaVu Sans Mono"/>
+              </a:rPr>
+              <a:t> </a:t>
+            </a:r>
+            <a:r>
+              <a:rPr b="0" lang="en-US" sz="1400" spc="-1" strike="noStrike">
+                <a:latin typeface="Liberation Mono;Courier New;DejaVu Sans Mono"/>
+                <a:ea typeface="Liberation Mono;Courier New;DejaVu Sans Mono"/>
+              </a:rPr>
+              <a:t>(('Texas', 'GPE'), 825),</a:t>
+            </a:r>
+            <a:endParaRPr b="0" lang="en-US" sz="1400" spc="-1" strike="noStrike">
+              <a:latin typeface="Liberation Mono;Courier New;DejaVu Sans Mono"/>
+              <a:ea typeface="Liberation Mono;Courier New;DejaVu Sans Mono"/>
+            </a:endParaRPr>
+          </a:p>
+          <a:p>
+            <a:r>
+              <a:rPr b="0" lang="en-US" sz="1400" spc="-1" strike="noStrike">
+                <a:latin typeface="Liberation Mono;Courier New;DejaVu Sans Mono"/>
+                <a:ea typeface="Liberation Mono;Courier New;DejaVu Sans Mono"/>
+              </a:rPr>
+              <a:t> </a:t>
+            </a:r>
+            <a:r>
+              <a:rPr b="0" lang="en-US" sz="1400" spc="-1" strike="noStrike">
+                <a:latin typeface="Liberation Mono;Courier New;DejaVu Sans Mono"/>
+                <a:ea typeface="Liberation Mono;Courier New;DejaVu Sans Mono"/>
+              </a:rPr>
+              <a:t>(('Chicago', 'GPE'), 773),</a:t>
+            </a:r>
+            <a:endParaRPr b="0" lang="en-US" sz="1400" spc="-1" strike="noStrike">
+              <a:latin typeface="Liberation Mono;Courier New;DejaVu Sans Mono"/>
+              <a:ea typeface="Liberation Mono;Courier New;DejaVu Sans Mono"/>
+            </a:endParaRPr>
+          </a:p>
+          <a:p>
+            <a:r>
+              <a:rPr b="0" lang="en-US" sz="1400" spc="-1" strike="noStrike">
+                <a:latin typeface="Liberation Mono;Courier New;DejaVu Sans Mono"/>
+                <a:ea typeface="Liberation Mono;Courier New;DejaVu Sans Mono"/>
+              </a:rPr>
+              <a:t> </a:t>
+            </a:r>
+            <a:r>
+              <a:rPr b="0" lang="en-US" sz="1400" spc="-1" strike="noStrike">
+                <a:latin typeface="Liberation Mono;Courier New;DejaVu Sans Mono"/>
+                <a:ea typeface="Liberation Mono;Courier New;DejaVu Sans Mono"/>
+              </a:rPr>
+              <a:t>(('the United States', 'GPE'), 727),</a:t>
+            </a:r>
+            <a:endParaRPr b="0" lang="en-US" sz="1400" spc="-1" strike="noStrike">
+              <a:latin typeface="Liberation Mono;Courier New;DejaVu Sans Mono"/>
+              <a:ea typeface="Liberation Mono;Courier New;DejaVu Sans Mono"/>
+            </a:endParaRPr>
+          </a:p>
+          <a:p>
+            <a:r>
+              <a:rPr b="0" lang="en-US" sz="1400" spc="-1" strike="noStrike">
+                <a:latin typeface="Liberation Mono;Courier New;DejaVu Sans Mono"/>
+                <a:ea typeface="Liberation Mono;Courier New;DejaVu Sans Mono"/>
+              </a:rPr>
+              <a:t> </a:t>
+            </a:r>
+            <a:r>
+              <a:rPr b="0" lang="en-US" sz="1400" spc="-1" strike="noStrike">
+                <a:latin typeface="Liberation Mono;Courier New;DejaVu Sans Mono"/>
+                <a:ea typeface="Liberation Mono;Courier New;DejaVu Sans Mono"/>
+              </a:rPr>
+              <a:t>(('Canada', 'GPE'), 704),</a:t>
+            </a:r>
+            <a:endParaRPr b="0" lang="en-US" sz="1400" spc="-1" strike="noStrike">
+              <a:latin typeface="Liberation Mono;Courier New;DejaVu Sans Mono"/>
+              <a:ea typeface="Liberation Mono;Courier New;DejaVu Sans Mono"/>
+            </a:endParaRPr>
+          </a:p>
+          <a:p>
+            <a:r>
+              <a:rPr b="0" lang="en-US" sz="1400" spc="-1" strike="noStrike">
+                <a:latin typeface="Liberation Mono;Courier New;DejaVu Sans Mono"/>
+                <a:ea typeface="Liberation Mono;Courier New;DejaVu Sans Mono"/>
+              </a:rPr>
+              <a:t> </a:t>
+            </a:r>
+            <a:r>
+              <a:rPr b="0" lang="en-US" sz="1400" spc="-1" strike="noStrike">
+                <a:latin typeface="Liberation Mono;Courier New;DejaVu Sans Mono"/>
+                <a:ea typeface="Liberation Mono;Courier New;DejaVu Sans Mono"/>
+              </a:rPr>
+              <a:t>(('India', 'GPE'), 642),</a:t>
+            </a:r>
+            <a:endParaRPr b="0" lang="en-US" sz="1400" spc="-1" strike="noStrike">
+              <a:latin typeface="Liberation Mono;Courier New;DejaVu Sans Mono"/>
+              <a:ea typeface="Liberation Mono;Courier New;DejaVu Sans Mono"/>
+            </a:endParaRPr>
+          </a:p>
+          <a:p>
+            <a:r>
+              <a:rPr b="0" lang="en-US" sz="1400" spc="-1" strike="noStrike">
+                <a:latin typeface="Liberation Mono;Courier New;DejaVu Sans Mono"/>
+                <a:ea typeface="Liberation Mono;Courier New;DejaVu Sans Mono"/>
+              </a:rPr>
+              <a:t> </a:t>
+            </a:r>
+            <a:r>
+              <a:rPr b="0" lang="en-US" sz="1400" spc="-1" strike="noStrike">
+                <a:latin typeface="Liberation Mono;Courier New;DejaVu Sans Mono"/>
+                <a:ea typeface="Liberation Mono;Courier New;DejaVu Sans Mono"/>
+              </a:rPr>
+              <a:t>(('London', 'GPE'), 624),</a:t>
+            </a:r>
+            <a:endParaRPr b="0" lang="en-US" sz="1400" spc="-1" strike="noStrike">
+              <a:latin typeface="Liberation Mono;Courier New;DejaVu Sans Mono"/>
+              <a:ea typeface="Liberation Mono;Courier New;DejaVu Sans Mono"/>
+            </a:endParaRPr>
+          </a:p>
+          <a:p>
+            <a:r>
+              <a:rPr b="0" lang="en-US" sz="1400" spc="-1" strike="noStrike">
+                <a:latin typeface="Liberation Mono;Courier New;DejaVu Sans Mono"/>
+                <a:ea typeface="Liberation Mono;Courier New;DejaVu Sans Mono"/>
+              </a:rPr>
+              <a:t> </a:t>
+            </a:r>
+            <a:r>
+              <a:rPr b="0" lang="en-US" sz="1400" spc="-1" strike="noStrike">
+                <a:latin typeface="Liberation Mono;Courier New;DejaVu Sans Mono"/>
+                <a:ea typeface="Liberation Mono;Courier New;DejaVu Sans Mono"/>
+              </a:rPr>
+              <a:t>(('Kerry', 'GPE'), 612),</a:t>
+            </a:r>
+            <a:endParaRPr b="0" lang="en-US" sz="1400" spc="-1" strike="noStrike">
+              <a:latin typeface="Liberation Mono;Courier New;DejaVu Sans Mono"/>
+              <a:ea typeface="Liberation Mono;Courier New;DejaVu Sans Mono"/>
+            </a:endParaRPr>
+          </a:p>
+          <a:p>
+            <a:r>
+              <a:rPr b="0" lang="en-US" sz="1400" spc="-1" strike="noStrike">
+                <a:latin typeface="Liberation Mono;Courier New;DejaVu Sans Mono"/>
+                <a:ea typeface="Liberation Mono;Courier New;DejaVu Sans Mono"/>
+              </a:rPr>
+              <a:t> </a:t>
+            </a:r>
+            <a:r>
+              <a:rPr b="0" lang="en-US" sz="1400" spc="-1" strike="noStrike">
+                <a:latin typeface="Liberation Mono;Courier New;DejaVu Sans Mono"/>
+                <a:ea typeface="Liberation Mono;Courier New;DejaVu Sans Mono"/>
+              </a:rPr>
+              <a:t>(('Florida', 'GPE'), 603),</a:t>
+            </a:r>
+            <a:endParaRPr b="0" lang="en-US" sz="1400" spc="-1" strike="noStrike">
+              <a:latin typeface="Liberation Mono;Courier New;DejaVu Sans Mono"/>
+              <a:ea typeface="Liberation Mono;Courier New;DejaVu Sans Mono"/>
+            </a:endParaRPr>
+          </a:p>
+          <a:p>
+            <a:r>
+              <a:rPr b="0" lang="en-US" sz="1400" spc="-1" strike="noStrike">
+                <a:latin typeface="Liberation Mono;Courier New;DejaVu Sans Mono"/>
+                <a:ea typeface="Liberation Mono;Courier New;DejaVu Sans Mono"/>
+              </a:rPr>
+              <a:t> </a:t>
+            </a:r>
+            <a:r>
+              <a:rPr b="0" lang="en-US" sz="1400" spc="-1" strike="noStrike">
+                <a:latin typeface="Liberation Mono;Courier New;DejaVu Sans Mono"/>
+                <a:ea typeface="Liberation Mono;Courier New;DejaVu Sans Mono"/>
+              </a:rPr>
+              <a:t>(('Japan', 'GPE'), 601),</a:t>
+            </a:r>
+            <a:endParaRPr b="0" lang="en-US" sz="1400" spc="-1" strike="noStrike">
+              <a:latin typeface="Liberation Mono;Courier New;DejaVu Sans Mono"/>
+              <a:ea typeface="Liberation Mono;Courier New;DejaVu Sans Mono"/>
+            </a:endParaRPr>
+          </a:p>
+          <a:p>
+            <a:r>
+              <a:rPr b="0" lang="en-US" sz="1400" spc="-1" strike="noStrike">
+                <a:latin typeface="Liberation Mono;Courier New;DejaVu Sans Mono"/>
+                <a:ea typeface="Liberation Mono;Courier New;DejaVu Sans Mono"/>
+              </a:rPr>
+              <a:t> </a:t>
+            </a:r>
+            <a:r>
+              <a:rPr b="0" lang="en-US" sz="1400" spc="-1" strike="noStrike">
+                <a:latin typeface="Liberation Mono;Courier New;DejaVu Sans Mono"/>
+                <a:ea typeface="Liberation Mono;Courier New;DejaVu Sans Mono"/>
+              </a:rPr>
+              <a:t>(('England', 'GPE'), 569),</a:t>
+            </a:r>
+            <a:endParaRPr b="0" lang="en-US" sz="1400" spc="-1" strike="noStrike">
+              <a:latin typeface="Liberation Mono;Courier New;DejaVu Sans Mono"/>
+              <a:ea typeface="Liberation Mono;Courier New;DejaVu Sans Mono"/>
+            </a:endParaRPr>
+          </a:p>
+          <a:p>
+            <a:r>
+              <a:rPr b="0" lang="en-US" sz="1400" spc="-1" strike="noStrike">
+                <a:latin typeface="Liberation Mono;Courier New;DejaVu Sans Mono"/>
+                <a:ea typeface="Liberation Mono;Courier New;DejaVu Sans Mono"/>
+              </a:rPr>
+              <a:t> </a:t>
+            </a:r>
+            <a:r>
+              <a:rPr b="0" lang="en-US" sz="1400" spc="-1" strike="noStrike">
+                <a:latin typeface="Liberation Mono;Courier New;DejaVu Sans Mono"/>
+                <a:ea typeface="Liberation Mono;Courier New;DejaVu Sans Mono"/>
+              </a:rPr>
+              <a:t>(('Israel', 'GPE'), 541),</a:t>
+            </a:r>
+            <a:endParaRPr b="0" lang="en-US" sz="1400" spc="-1" strike="noStrike">
+              <a:latin typeface="Liberation Mono;Courier New;DejaVu Sans Mono"/>
+              <a:ea typeface="Liberation Mono;Courier New;DejaVu Sans Mono"/>
+            </a:endParaRPr>
+          </a:p>
+          <a:p>
+            <a:r>
+              <a:rPr b="0" lang="en-US" sz="1400" spc="-1" strike="noStrike">
+                <a:latin typeface="Liberation Mono;Courier New;DejaVu Sans Mono"/>
+                <a:ea typeface="Liberation Mono;Courier New;DejaVu Sans Mono"/>
+              </a:rPr>
+              <a:t> </a:t>
+            </a:r>
+            <a:r>
+              <a:rPr b="0" lang="en-US" sz="1400" spc="-1" strike="noStrike">
+                <a:latin typeface="Liberation Mono;Courier New;DejaVu Sans Mono"/>
+                <a:ea typeface="Liberation Mono;Courier New;DejaVu Sans Mono"/>
+              </a:rPr>
+              <a:t>(('France', 'GPE'), 537)]</a:t>
+            </a:r>
+            <a:endParaRPr b="0" lang="en-US" sz="1400" spc="-1" strike="noStrike">
+              <a:latin typeface="Liberation Mono;Courier New;DejaVu Sans Mono"/>
+              <a:ea typeface="Liberation Mono;Courier New;DejaVu Sans Mono"/>
+            </a:endParaRPr>
+          </a:p>
+        </p:txBody>
+      </p:sp>
+    </p:spTree>
+  </p:cSld>
+  <mc:AlternateContent>
+    <mc:Choice Requires="p14">
+      <p:transition spd="slow" p14:dur="2000"/>
+    </mc:Choice>
+    <mc:Fallback>
+      <p:transition spd="slow"/>
+    </mc:Fallback>
+  </mc:AlternateContent>
+  <p:timing>
+    <p:tnLst>
+      <p:par>
+        <p:cTn id="37" dur="indefinite" restart="never" nodeType="tmRoot">
+          <p:childTnLst>
+            <p:seq>
+              <p:cTn id="38" dur="indefinite" nodeType="mainSeq"/>
+              <p:prevCondLst>
+                <p:cond delay="0" evt="onPrev">
+                  <p:tgtEl>
+                    <p:sldTgt/>
+                  </p:tgtEl>
+                </p:cond>
+              </p:prevCondLst>
+              <p:nextCondLst>
+                <p:cond delay="0" evt="onNext">
+                  <p:tgtEl>
+                    <p:sldTgt/>
+                  </p:tgtEl>
+                </p:cond>
+              </p:nextCondLst>
+            </p:seq>
+          </p:childTnLst>
+        </p:cTn>
+      </p:par>
+    </p:tnLst>
+  </p:timing>
+</p:sld>
+</file>
+
+<file path=ppt/slides/slide2.xml><?xml version="1.0" encoding="utf-8"?>
+<p:sld xmlns:a="http://schemas.openxmlformats.org/drawingml/2006/main" xmlns:p="http://schemas.openxmlformats.org/presentationml/2006/main" xmlns:r="http://schemas.openxmlformats.org/officeDocument/2006/relationships" xmlns:p14="http://schemas.microsoft.com/office/powerpoint/2010/main" xmlns:p15="http://schemas.microsoft.com/office/powerpoint/2012/main" xmlns:mc="http://schemas.openxmlformats.org/markup-compatibility/2006">
+  <p:cSld>
+    <p:spTree>
+      <p:nvGrpSpPr>
+        <p:cNvPr id="1" name=""/>
+        <p:cNvGrpSpPr/>
+        <p:nvPr/>
+      </p:nvGrpSpPr>
+      <p:grpSpPr>
+        <a:xfrm>
+          <a:off x="0" y="0"/>
+          <a:ext cx="0" cy="0"/>
+          <a:chOff x="0" y="0"/>
+          <a:chExt cx="0" cy="0"/>
+        </a:xfrm>
+      </p:grpSpPr>
+      <p:sp>
+        <p:nvSpPr>
+          <p:cNvPr id="40" name="TextShape 1"/>
+          <p:cNvSpPr txBox="1"/>
+          <p:nvPr/>
+        </p:nvSpPr>
+        <p:spPr>
+          <a:xfrm>
+            <a:off x="504360" y="2362320"/>
+            <a:ext cx="9072000" cy="946440"/>
+          </a:xfrm>
+          <a:prstGeom prst="rect">
+            <a:avLst/>
+          </a:prstGeom>
+          <a:noFill/>
+          <a:ln>
+            <a:noFill/>
+          </a:ln>
+        </p:spPr>
+        <p:txBody>
+          <a:bodyPr lIns="0" rIns="0" tIns="0" bIns="0" anchor="ctr">
+            <a:spAutoFit/>
+          </a:bodyPr>
+          <a:p>
+            <a:pPr algn="ctr"/>
+            <a:r>
+              <a:rPr b="0" lang="en-US" sz="4400" spc="-1" strike="noStrike">
+                <a:latin typeface="Arial"/>
+              </a:rPr>
+              <a:t>Segmentación de temas por edad</a:t>
+            </a:r>
+            <a:endParaRPr b="0" lang="en-US" sz="4400" spc="-1" strike="noStrike">
+              <a:latin typeface="Arial"/>
+            </a:endParaRPr>
+          </a:p>
+        </p:txBody>
+      </p:sp>
+    </p:spTree>
+  </p:cSld>
+  <mc:AlternateContent>
+    <mc:Choice Requires="p14">
+      <p:transition spd="slow" p14:dur="2000"/>
+    </mc:Choice>
+    <mc:Fallback>
+      <p:transition spd="slow"/>
+    </mc:Fallback>
+  </mc:AlternateContent>
+  <p:timing>
+    <p:tnLst>
+      <p:par>
+        <p:cTn id="3" dur="indefinite" restart="never" nodeType="tmRoot">
+          <p:childTnLst>
+            <p:seq>
+              <p:cTn id="4" dur="indefinite" nodeType="mainSeq"/>
+              <p:prevCondLst>
+                <p:cond delay="0" evt="onPrev">
+                  <p:tgtEl>
+                    <p:sldTgt/>
+                  </p:tgtEl>
+                </p:cond>
+              </p:prevCondLst>
+              <p:nextCondLst>
+                <p:cond delay="0" evt="onNext">
+                  <p:tgtEl>
+                    <p:sldTgt/>
+                  </p:tgtEl>
+                </p:cond>
+              </p:nextCondLst>
+            </p:seq>
+          </p:childTnLst>
+        </p:cTn>
+      </p:par>
+    </p:tnLst>
+  </p:timing>
+</p:sld>
+</file>
+
+<file path=ppt/slides/slide20.xml><?xml version="1.0" encoding="utf-8"?>
+<p:sld xmlns:a="http://schemas.openxmlformats.org/drawingml/2006/main" xmlns:p="http://schemas.openxmlformats.org/presentationml/2006/main" xmlns:r="http://schemas.openxmlformats.org/officeDocument/2006/relationships" xmlns:p14="http://schemas.microsoft.com/office/powerpoint/2010/main" xmlns:p15="http://schemas.microsoft.com/office/powerpoint/2012/main" xmlns:mc="http://schemas.openxmlformats.org/markup-compatibility/2006">
+  <p:cSld>
+    <p:spTree>
+      <p:nvGrpSpPr>
+        <p:cNvPr id="1" name=""/>
+        <p:cNvGrpSpPr/>
+        <p:nvPr/>
+      </p:nvGrpSpPr>
+      <p:grpSpPr>
+        <a:xfrm>
+          <a:off x="0" y="0"/>
+          <a:ext cx="0" cy="0"/>
+          <a:chOff x="0" y="0"/>
+          <a:chExt cx="0" cy="0"/>
+        </a:xfrm>
+      </p:grpSpPr>
+      <p:sp>
+        <p:nvSpPr>
+          <p:cNvPr id="72" name="TextShape 1"/>
+          <p:cNvSpPr txBox="1"/>
+          <p:nvPr/>
+        </p:nvSpPr>
+        <p:spPr>
+          <a:xfrm>
+            <a:off x="504000" y="226080"/>
+            <a:ext cx="9072000" cy="946440"/>
+          </a:xfrm>
+          <a:prstGeom prst="rect">
+            <a:avLst/>
+          </a:prstGeom>
+          <a:noFill/>
+          <a:ln>
+            <a:noFill/>
+          </a:ln>
+        </p:spPr>
+        <p:txBody>
+          <a:bodyPr lIns="0" rIns="0" tIns="0" bIns="0" anchor="ctr">
+            <a:spAutoFit/>
+          </a:bodyPr>
+          <a:p>
+            <a:r>
+              <a:rPr b="0" lang="en-US" sz="4400" spc="-1" strike="noStrike">
+                <a:latin typeface="Arial"/>
+              </a:rPr>
+              <a:t>Resultados</a:t>
+            </a:r>
+            <a:endParaRPr b="0" lang="en-US" sz="4400" spc="-1" strike="noStrike">
+              <a:latin typeface="Arial"/>
+            </a:endParaRPr>
+          </a:p>
+        </p:txBody>
+      </p:sp>
+      <p:sp>
+        <p:nvSpPr>
+          <p:cNvPr id="73" name="TextShape 2"/>
+          <p:cNvSpPr txBox="1"/>
+          <p:nvPr/>
+        </p:nvSpPr>
+        <p:spPr>
+          <a:xfrm>
+            <a:off x="4120560" y="1450440"/>
+            <a:ext cx="5340960" cy="3913920"/>
+          </a:xfrm>
+          <a:prstGeom prst="rect">
+            <a:avLst/>
+          </a:prstGeom>
+          <a:noFill/>
+          <a:ln>
+            <a:noFill/>
+          </a:ln>
+        </p:spPr>
+        <p:txBody>
+          <a:bodyPr lIns="90000" rIns="90000" tIns="45000" bIns="45000">
+            <a:spAutoFit/>
+          </a:bodyPr>
+          <a:p>
+            <a:r>
+              <a:rPr b="0" lang="en-US" sz="1400" spc="-1" strike="noStrike">
+                <a:latin typeface="Liberation Mono;Courier New;DejaVu Sans Mono"/>
+                <a:ea typeface="Liberation Mono;Courier New;DejaVu Sans Mono"/>
+              </a:rPr>
+              <a:t>[(('Jessica', 'PRODUCT'), 207),</a:t>
+            </a:r>
+            <a:endParaRPr b="0" lang="en-US" sz="1400" spc="-1" strike="noStrike">
+              <a:latin typeface="Liberation Mono;Courier New;DejaVu Sans Mono"/>
+              <a:ea typeface="Liberation Mono;Courier New;DejaVu Sans Mono"/>
+            </a:endParaRPr>
+          </a:p>
+          <a:p>
+            <a:r>
+              <a:rPr b="0" lang="en-US" sz="1400" spc="-1" strike="noStrike">
+                <a:latin typeface="Liberation Mono;Courier New;DejaVu Sans Mono"/>
+                <a:ea typeface="Liberation Mono;Courier New;DejaVu Sans Mono"/>
+              </a:rPr>
+              <a:t> </a:t>
+            </a:r>
+            <a:r>
+              <a:rPr b="0" lang="en-US" sz="1400" spc="-1" strike="noStrike">
+                <a:latin typeface="Liberation Mono;Courier New;DejaVu Sans Mono"/>
+                <a:ea typeface="Liberation Mono;Courier New;DejaVu Sans Mono"/>
+              </a:rPr>
+              <a:t>(('Baby', 'PRODUCT'), 136),</a:t>
+            </a:r>
+            <a:endParaRPr b="0" lang="en-US" sz="1400" spc="-1" strike="noStrike">
+              <a:latin typeface="Liberation Mono;Courier New;DejaVu Sans Mono"/>
+              <a:ea typeface="Liberation Mono;Courier New;DejaVu Sans Mono"/>
+            </a:endParaRPr>
+          </a:p>
+          <a:p>
+            <a:r>
+              <a:rPr b="0" lang="en-US" sz="1400" spc="-1" strike="noStrike">
+                <a:latin typeface="Liberation Mono;Courier New;DejaVu Sans Mono"/>
+                <a:ea typeface="Liberation Mono;Courier New;DejaVu Sans Mono"/>
+              </a:rPr>
+              <a:t> </a:t>
+            </a:r>
+            <a:r>
+              <a:rPr b="0" lang="en-US" sz="1400" spc="-1" strike="noStrike">
+                <a:latin typeface="Liberation Mono;Courier New;DejaVu Sans Mono"/>
+                <a:ea typeface="Liberation Mono;Courier New;DejaVu Sans Mono"/>
+              </a:rPr>
+              <a:t>(('Jimmy', 'PRODUCT'), 136),</a:t>
+            </a:r>
+            <a:endParaRPr b="0" lang="en-US" sz="1400" spc="-1" strike="noStrike">
+              <a:latin typeface="Liberation Mono;Courier New;DejaVu Sans Mono"/>
+              <a:ea typeface="Liberation Mono;Courier New;DejaVu Sans Mono"/>
+            </a:endParaRPr>
+          </a:p>
+          <a:p>
+            <a:r>
+              <a:rPr b="0" lang="en-US" sz="1400" spc="-1" strike="noStrike">
+                <a:latin typeface="Liberation Mono;Courier New;DejaVu Sans Mono"/>
+                <a:ea typeface="Liberation Mono;Courier New;DejaVu Sans Mono"/>
+              </a:rPr>
+              <a:t> </a:t>
+            </a:r>
+            <a:r>
+              <a:rPr b="0" lang="en-US" sz="1400" spc="-1" strike="noStrike">
+                <a:latin typeface="Liberation Mono;Courier New;DejaVu Sans Mono"/>
+                <a:ea typeface="Liberation Mono;Courier New;DejaVu Sans Mono"/>
+              </a:rPr>
+              <a:t>(('Green Knight', 'PRODUCT'), 110),</a:t>
+            </a:r>
+            <a:endParaRPr b="0" lang="en-US" sz="1400" spc="-1" strike="noStrike">
+              <a:latin typeface="Liberation Mono;Courier New;DejaVu Sans Mono"/>
+              <a:ea typeface="Liberation Mono;Courier New;DejaVu Sans Mono"/>
+            </a:endParaRPr>
+          </a:p>
+          <a:p>
+            <a:r>
+              <a:rPr b="0" lang="en-US" sz="1400" spc="-1" strike="noStrike">
+                <a:latin typeface="Liberation Mono;Courier New;DejaVu Sans Mono"/>
+                <a:ea typeface="Liberation Mono;Courier New;DejaVu Sans Mono"/>
+              </a:rPr>
+              <a:t> </a:t>
+            </a:r>
+            <a:r>
+              <a:rPr b="0" lang="en-US" sz="1400" spc="-1" strike="noStrike">
+                <a:latin typeface="Liberation Mono;Courier New;DejaVu Sans Mono"/>
+                <a:ea typeface="Liberation Mono;Courier New;DejaVu Sans Mono"/>
+              </a:rPr>
+              <a:t>(('Google', 'PRODUCT'), 71),</a:t>
+            </a:r>
+            <a:endParaRPr b="0" lang="en-US" sz="1400" spc="-1" strike="noStrike">
+              <a:latin typeface="Liberation Mono;Courier New;DejaVu Sans Mono"/>
+              <a:ea typeface="Liberation Mono;Courier New;DejaVu Sans Mono"/>
+            </a:endParaRPr>
+          </a:p>
+          <a:p>
+            <a:r>
+              <a:rPr b="0" lang="en-US" sz="1400" spc="-1" strike="noStrike">
+                <a:latin typeface="Liberation Mono;Courier New;DejaVu Sans Mono"/>
+                <a:ea typeface="Liberation Mono;Courier New;DejaVu Sans Mono"/>
+              </a:rPr>
+              <a:t> </a:t>
+            </a:r>
+            <a:r>
+              <a:rPr b="0" lang="en-US" sz="1400" spc="-1" strike="noStrike">
+                <a:latin typeface="Liberation Mono;Courier New;DejaVu Sans Mono"/>
+                <a:ea typeface="Liberation Mono;Courier New;DejaVu Sans Mono"/>
+              </a:rPr>
+              <a:t>(('Geo', 'PRODUCT'), 66),</a:t>
+            </a:r>
+            <a:endParaRPr b="0" lang="en-US" sz="1400" spc="-1" strike="noStrike">
+              <a:latin typeface="Liberation Mono;Courier New;DejaVu Sans Mono"/>
+              <a:ea typeface="Liberation Mono;Courier New;DejaVu Sans Mono"/>
+            </a:endParaRPr>
+          </a:p>
+          <a:p>
+            <a:r>
+              <a:rPr b="0" lang="en-US" sz="1400" spc="-1" strike="noStrike">
+                <a:latin typeface="Liberation Mono;Courier New;DejaVu Sans Mono"/>
+                <a:ea typeface="Liberation Mono;Courier New;DejaVu Sans Mono"/>
+              </a:rPr>
+              <a:t> </a:t>
+            </a:r>
+            <a:r>
+              <a:rPr b="0" lang="en-US" sz="1400" spc="-1" strike="noStrike">
+                <a:latin typeface="Liberation Mono;Courier New;DejaVu Sans Mono"/>
+                <a:ea typeface="Liberation Mono;Courier New;DejaVu Sans Mono"/>
+              </a:rPr>
+              <a:t>(('Click', 'PRODUCT'), 65),</a:t>
+            </a:r>
+            <a:endParaRPr b="0" lang="en-US" sz="1400" spc="-1" strike="noStrike">
+              <a:latin typeface="Liberation Mono;Courier New;DejaVu Sans Mono"/>
+              <a:ea typeface="Liberation Mono;Courier New;DejaVu Sans Mono"/>
+            </a:endParaRPr>
+          </a:p>
+          <a:p>
+            <a:r>
+              <a:rPr b="0" lang="en-US" sz="1400" spc="-1" strike="noStrike">
+                <a:latin typeface="Liberation Mono;Courier New;DejaVu Sans Mono"/>
+                <a:ea typeface="Liberation Mono;Courier New;DejaVu Sans Mono"/>
+              </a:rPr>
+              <a:t> </a:t>
+            </a:r>
+            <a:r>
+              <a:rPr b="0" lang="en-US" sz="1400" spc="-1" strike="noStrike">
+                <a:latin typeface="Liberation Mono;Courier New;DejaVu Sans Mono"/>
+                <a:ea typeface="Liberation Mono;Courier New;DejaVu Sans Mono"/>
+              </a:rPr>
+              <a:t>(('Netscape', 'PRODUCT'), 62),</a:t>
+            </a:r>
+            <a:endParaRPr b="0" lang="en-US" sz="1400" spc="-1" strike="noStrike">
+              <a:latin typeface="Liberation Mono;Courier New;DejaVu Sans Mono"/>
+              <a:ea typeface="Liberation Mono;Courier New;DejaVu Sans Mono"/>
+            </a:endParaRPr>
+          </a:p>
+          <a:p>
+            <a:r>
+              <a:rPr b="0" lang="en-US" sz="1400" spc="-1" strike="noStrike">
+                <a:latin typeface="Liberation Mono;Courier New;DejaVu Sans Mono"/>
+                <a:ea typeface="Liberation Mono;Courier New;DejaVu Sans Mono"/>
+              </a:rPr>
+              <a:t> </a:t>
+            </a:r>
+            <a:r>
+              <a:rPr b="0" lang="en-US" sz="1400" spc="-1" strike="noStrike">
+                <a:latin typeface="Liberation Mono;Courier New;DejaVu Sans Mono"/>
+                <a:ea typeface="Liberation Mono;Courier New;DejaVu Sans Mono"/>
+              </a:rPr>
+              <a:t>(('Notes', 'PRODUCT'), 49),</a:t>
+            </a:r>
+            <a:endParaRPr b="0" lang="en-US" sz="1400" spc="-1" strike="noStrike">
+              <a:latin typeface="Liberation Mono;Courier New;DejaVu Sans Mono"/>
+              <a:ea typeface="Liberation Mono;Courier New;DejaVu Sans Mono"/>
+            </a:endParaRPr>
+          </a:p>
+          <a:p>
+            <a:r>
+              <a:rPr b="0" lang="en-US" sz="1400" spc="-1" strike="noStrike">
+                <a:latin typeface="Liberation Mono;Courier New;DejaVu Sans Mono"/>
+                <a:ea typeface="Liberation Mono;Courier New;DejaVu Sans Mono"/>
+              </a:rPr>
+              <a:t> </a:t>
+            </a:r>
+            <a:r>
+              <a:rPr b="0" lang="en-US" sz="1400" spc="-1" strike="noStrike">
+                <a:latin typeface="Liberation Mono;Courier New;DejaVu Sans Mono"/>
+                <a:ea typeface="Liberation Mono;Courier New;DejaVu Sans Mono"/>
+              </a:rPr>
+              <a:t>(('Excel', 'PRODUCT'), 46),</a:t>
+            </a:r>
+            <a:endParaRPr b="0" lang="en-US" sz="1400" spc="-1" strike="noStrike">
+              <a:latin typeface="Liberation Mono;Courier New;DejaVu Sans Mono"/>
+              <a:ea typeface="Liberation Mono;Courier New;DejaVu Sans Mono"/>
+            </a:endParaRPr>
+          </a:p>
+          <a:p>
+            <a:r>
+              <a:rPr b="0" lang="en-US" sz="1400" spc="-1" strike="noStrike">
+                <a:latin typeface="Liberation Mono;Courier New;DejaVu Sans Mono"/>
+                <a:ea typeface="Liberation Mono;Courier New;DejaVu Sans Mono"/>
+              </a:rPr>
+              <a:t> </a:t>
+            </a:r>
+            <a:r>
+              <a:rPr b="0" lang="en-US" sz="1400" spc="-1" strike="noStrike">
+                <a:latin typeface="Liberation Mono;Courier New;DejaVu Sans Mono"/>
+                <a:ea typeface="Liberation Mono;Courier New;DejaVu Sans Mono"/>
+              </a:rPr>
+              <a:t>(('Blogger', 'PRODUCT'), 43),</a:t>
+            </a:r>
+            <a:endParaRPr b="0" lang="en-US" sz="1400" spc="-1" strike="noStrike">
+              <a:latin typeface="Liberation Mono;Courier New;DejaVu Sans Mono"/>
+              <a:ea typeface="Liberation Mono;Courier New;DejaVu Sans Mono"/>
+            </a:endParaRPr>
+          </a:p>
+          <a:p>
+            <a:r>
+              <a:rPr b="0" lang="en-US" sz="1400" spc="-1" strike="noStrike">
+                <a:latin typeface="Liberation Mono;Courier New;DejaVu Sans Mono"/>
+                <a:ea typeface="Liberation Mono;Courier New;DejaVu Sans Mono"/>
+              </a:rPr>
+              <a:t> </a:t>
+            </a:r>
+            <a:r>
+              <a:rPr b="0" lang="en-US" sz="1400" spc="-1" strike="noStrike">
+                <a:latin typeface="Liberation Mono;Courier New;DejaVu Sans Mono"/>
+                <a:ea typeface="Liberation Mono;Courier New;DejaVu Sans Mono"/>
+              </a:rPr>
+              <a:t>(('Surprisingly', 'PRODUCT'), 43),</a:t>
+            </a:r>
+            <a:endParaRPr b="0" lang="en-US" sz="1400" spc="-1" strike="noStrike">
+              <a:latin typeface="Liberation Mono;Courier New;DejaVu Sans Mono"/>
+              <a:ea typeface="Liberation Mono;Courier New;DejaVu Sans Mono"/>
+            </a:endParaRPr>
+          </a:p>
+          <a:p>
+            <a:r>
+              <a:rPr b="0" lang="en-US" sz="1400" spc="-1" strike="noStrike">
+                <a:latin typeface="Liberation Mono;Courier New;DejaVu Sans Mono"/>
+                <a:ea typeface="Liberation Mono;Courier New;DejaVu Sans Mono"/>
+              </a:rPr>
+              <a:t> </a:t>
+            </a:r>
+            <a:r>
+              <a:rPr b="0" lang="en-US" sz="1400" spc="-1" strike="noStrike">
+                <a:latin typeface="Liberation Mono;Courier New;DejaVu Sans Mono"/>
+                <a:ea typeface="Liberation Mono;Courier New;DejaVu Sans Mono"/>
+              </a:rPr>
+              <a:t>(('Saturn', 'PRODUCT'), 42),</a:t>
+            </a:r>
+            <a:endParaRPr b="0" lang="en-US" sz="1400" spc="-1" strike="noStrike">
+              <a:latin typeface="Liberation Mono;Courier New;DejaVu Sans Mono"/>
+              <a:ea typeface="Liberation Mono;Courier New;DejaVu Sans Mono"/>
+            </a:endParaRPr>
+          </a:p>
+          <a:p>
+            <a:r>
+              <a:rPr b="0" lang="en-US" sz="1400" spc="-1" strike="noStrike">
+                <a:latin typeface="Liberation Mono;Courier New;DejaVu Sans Mono"/>
+                <a:ea typeface="Liberation Mono;Courier New;DejaVu Sans Mono"/>
+              </a:rPr>
+              <a:t> </a:t>
+            </a:r>
+            <a:r>
+              <a:rPr b="0" lang="en-US" sz="1400" spc="-1" strike="noStrike">
+                <a:latin typeface="Liberation Mono;Courier New;DejaVu Sans Mono"/>
+                <a:ea typeface="Liberation Mono;Courier New;DejaVu Sans Mono"/>
+              </a:rPr>
+              <a:t>(('Captain', 'PRODUCT'), 41),</a:t>
+            </a:r>
+            <a:endParaRPr b="0" lang="en-US" sz="1400" spc="-1" strike="noStrike">
+              <a:latin typeface="Liberation Mono;Courier New;DejaVu Sans Mono"/>
+              <a:ea typeface="Liberation Mono;Courier New;DejaVu Sans Mono"/>
+            </a:endParaRPr>
+          </a:p>
+          <a:p>
+            <a:r>
+              <a:rPr b="0" lang="en-US" sz="1400" spc="-1" strike="noStrike">
+                <a:latin typeface="Liberation Mono;Courier New;DejaVu Sans Mono"/>
+                <a:ea typeface="Liberation Mono;Courier New;DejaVu Sans Mono"/>
+              </a:rPr>
+              <a:t> </a:t>
+            </a:r>
+            <a:r>
+              <a:rPr b="0" lang="en-US" sz="1400" spc="-1" strike="noStrike">
+                <a:latin typeface="Liberation Mono;Courier New;DejaVu Sans Mono"/>
+                <a:ea typeface="Liberation Mono;Courier New;DejaVu Sans Mono"/>
+              </a:rPr>
+              <a:t>(('Apache', 'PRODUCT'), 41),</a:t>
+            </a:r>
+            <a:endParaRPr b="0" lang="en-US" sz="1400" spc="-1" strike="noStrike">
+              <a:latin typeface="Liberation Mono;Courier New;DejaVu Sans Mono"/>
+              <a:ea typeface="Liberation Mono;Courier New;DejaVu Sans Mono"/>
+            </a:endParaRPr>
+          </a:p>
+          <a:p>
+            <a:r>
+              <a:rPr b="0" lang="en-US" sz="1400" spc="-1" strike="noStrike">
+                <a:latin typeface="Liberation Mono;Courier New;DejaVu Sans Mono"/>
+                <a:ea typeface="Liberation Mono;Courier New;DejaVu Sans Mono"/>
+              </a:rPr>
+              <a:t> </a:t>
+            </a:r>
+            <a:r>
+              <a:rPr b="0" lang="en-US" sz="1400" spc="-1" strike="noStrike">
+                <a:latin typeface="Liberation Mono;Courier New;DejaVu Sans Mono"/>
+                <a:ea typeface="Liberation Mono;Courier New;DejaVu Sans Mono"/>
+              </a:rPr>
+              <a:t>(('Ya', 'PRODUCT'), 41),</a:t>
+            </a:r>
+            <a:endParaRPr b="0" lang="en-US" sz="1400" spc="-1" strike="noStrike">
+              <a:latin typeface="Liberation Mono;Courier New;DejaVu Sans Mono"/>
+              <a:ea typeface="Liberation Mono;Courier New;DejaVu Sans Mono"/>
+            </a:endParaRPr>
+          </a:p>
+          <a:p>
+            <a:r>
+              <a:rPr b="0" lang="en-US" sz="1400" spc="-1" strike="noStrike">
+                <a:latin typeface="Liberation Mono;Courier New;DejaVu Sans Mono"/>
+                <a:ea typeface="Liberation Mono;Courier New;DejaVu Sans Mono"/>
+              </a:rPr>
+              <a:t> </a:t>
+            </a:r>
+            <a:r>
+              <a:rPr b="0" lang="en-US" sz="1400" spc="-1" strike="noStrike">
+                <a:latin typeface="Liberation Mono;Courier New;DejaVu Sans Mono"/>
+                <a:ea typeface="Liberation Mono;Courier New;DejaVu Sans Mono"/>
+              </a:rPr>
+              <a:t>(('Sky', 'PRODUCT'), 40),</a:t>
+            </a:r>
+            <a:endParaRPr b="0" lang="en-US" sz="1400" spc="-1" strike="noStrike">
+              <a:latin typeface="Liberation Mono;Courier New;DejaVu Sans Mono"/>
+              <a:ea typeface="Liberation Mono;Courier New;DejaVu Sans Mono"/>
+            </a:endParaRPr>
+          </a:p>
+          <a:p>
+            <a:r>
+              <a:rPr b="0" lang="en-US" sz="1400" spc="-1" strike="noStrike">
+                <a:latin typeface="Liberation Mono;Courier New;DejaVu Sans Mono"/>
+                <a:ea typeface="Liberation Mono;Courier New;DejaVu Sans Mono"/>
+              </a:rPr>
+              <a:t> </a:t>
+            </a:r>
+            <a:r>
+              <a:rPr b="0" lang="en-US" sz="1400" spc="-1" strike="noStrike">
+                <a:latin typeface="Liberation Mono;Courier New;DejaVu Sans Mono"/>
+                <a:ea typeface="Liberation Mono;Courier New;DejaVu Sans Mono"/>
+              </a:rPr>
+              <a:t>(('Diet Coke', 'PRODUCT'), 38),</a:t>
+            </a:r>
+            <a:endParaRPr b="0" lang="en-US" sz="1400" spc="-1" strike="noStrike">
+              <a:latin typeface="Liberation Mono;Courier New;DejaVu Sans Mono"/>
+              <a:ea typeface="Liberation Mono;Courier New;DejaVu Sans Mono"/>
+            </a:endParaRPr>
+          </a:p>
+          <a:p>
+            <a:r>
+              <a:rPr b="0" lang="en-US" sz="1400" spc="-1" strike="noStrike">
+                <a:latin typeface="Liberation Mono;Courier New;DejaVu Sans Mono"/>
+                <a:ea typeface="Liberation Mono;Courier New;DejaVu Sans Mono"/>
+              </a:rPr>
+              <a:t> </a:t>
+            </a:r>
+            <a:r>
+              <a:rPr b="0" lang="en-US" sz="1400" spc="-1" strike="noStrike">
+                <a:latin typeface="Liberation Mono;Courier New;DejaVu Sans Mono"/>
+                <a:ea typeface="Liberation Mono;Courier New;DejaVu Sans Mono"/>
+              </a:rPr>
+              <a:t>(('Superman', 'PRODUCT'), 38)]</a:t>
+            </a:r>
+            <a:endParaRPr b="0" lang="en-US" sz="1400" spc="-1" strike="noStrike">
+              <a:latin typeface="Liberation Mono;Courier New;DejaVu Sans Mono"/>
+              <a:ea typeface="Liberation Mono;Courier New;DejaVu Sans Mono"/>
+            </a:endParaRPr>
+          </a:p>
+        </p:txBody>
+      </p:sp>
+    </p:spTree>
+  </p:cSld>
+  <mc:AlternateContent>
+    <mc:Choice Requires="p14">
+      <p:transition spd="slow" p14:dur="2000"/>
+    </mc:Choice>
+    <mc:Fallback>
+      <p:transition spd="slow"/>
+    </mc:Fallback>
+  </mc:AlternateContent>
+  <p:timing>
+    <p:tnLst>
+      <p:par>
+        <p:cTn id="39" dur="indefinite" restart="never" nodeType="tmRoot">
+          <p:childTnLst>
+            <p:seq>
+              <p:cTn id="40" dur="indefinite" nodeType="mainSeq"/>
+              <p:prevCondLst>
+                <p:cond delay="0" evt="onPrev">
+                  <p:tgtEl>
+                    <p:sldTgt/>
+                  </p:tgtEl>
+                </p:cond>
+              </p:prevCondLst>
+              <p:nextCondLst>
+                <p:cond delay="0" evt="onNext">
+                  <p:tgtEl>
+                    <p:sldTgt/>
+                  </p:tgtEl>
+                </p:cond>
+              </p:nextCondLst>
+            </p:seq>
+          </p:childTnLst>
+        </p:cTn>
+      </p:par>
+    </p:tnLst>
+  </p:timing>
+</p:sld>
+</file>
+
+<file path=ppt/slides/slide21.xml><?xml version="1.0" encoding="utf-8"?>
+<p:sld xmlns:a="http://schemas.openxmlformats.org/drawingml/2006/main" xmlns:p="http://schemas.openxmlformats.org/presentationml/2006/main" xmlns:r="http://schemas.openxmlformats.org/officeDocument/2006/relationships" xmlns:p14="http://schemas.microsoft.com/office/powerpoint/2010/main" xmlns:p15="http://schemas.microsoft.com/office/powerpoint/2012/main" xmlns:mc="http://schemas.openxmlformats.org/markup-compatibility/2006">
+  <p:cSld>
+    <p:spTree>
+      <p:nvGrpSpPr>
+        <p:cNvPr id="1" name=""/>
+        <p:cNvGrpSpPr/>
+        <p:nvPr/>
+      </p:nvGrpSpPr>
+      <p:grpSpPr>
+        <a:xfrm>
+          <a:off x="0" y="0"/>
+          <a:ext cx="0" cy="0"/>
+          <a:chOff x="0" y="0"/>
+          <a:chExt cx="0" cy="0"/>
+        </a:xfrm>
+      </p:grpSpPr>
+      <p:sp>
+        <p:nvSpPr>
+          <p:cNvPr id="74" name="TextShape 1"/>
+          <p:cNvSpPr txBox="1"/>
+          <p:nvPr/>
+        </p:nvSpPr>
+        <p:spPr>
+          <a:xfrm>
+            <a:off x="504000" y="226080"/>
+            <a:ext cx="9072000" cy="946440"/>
+          </a:xfrm>
+          <a:prstGeom prst="rect">
+            <a:avLst/>
+          </a:prstGeom>
+          <a:noFill/>
+          <a:ln>
+            <a:noFill/>
+          </a:ln>
+        </p:spPr>
+        <p:txBody>
+          <a:bodyPr lIns="0" rIns="0" tIns="0" bIns="0" anchor="ctr">
+            <a:spAutoFit/>
+          </a:bodyPr>
+          <a:p>
+            <a:pPr algn="ctr"/>
+            <a:r>
+              <a:rPr b="0" lang="en-US" sz="4400" spc="-1" strike="noStrike">
+                <a:latin typeface="Arial"/>
+              </a:rPr>
+              <a:t>Insights principales</a:t>
+            </a:r>
+            <a:endParaRPr b="0" lang="en-US" sz="4400" spc="-1" strike="noStrike">
+              <a:latin typeface="Arial"/>
+            </a:endParaRPr>
+          </a:p>
+        </p:txBody>
+      </p:sp>
+      <p:sp>
+        <p:nvSpPr>
+          <p:cNvPr id="75" name="TextShape 2"/>
+          <p:cNvSpPr txBox="1"/>
+          <p:nvPr/>
+        </p:nvSpPr>
+        <p:spPr>
+          <a:xfrm>
+            <a:off x="504000" y="1295640"/>
+            <a:ext cx="9072000" cy="3750120"/>
+          </a:xfrm>
+          <a:prstGeom prst="rect">
+            <a:avLst/>
+          </a:prstGeom>
+          <a:noFill/>
+          <a:ln>
+            <a:noFill/>
+          </a:ln>
+        </p:spPr>
+        <p:txBody>
+          <a:bodyPr lIns="0" rIns="0" tIns="0" bIns="0" anchor="ctr">
+            <a:spAutoFit/>
+          </a:bodyPr>
+          <a:p>
+            <a:pPr marL="216000" indent="-216000" algn="just">
+              <a:buClr>
+                <a:srgbClr val="000000"/>
+              </a:buClr>
+              <a:buSzPct val="45000"/>
+              <a:buFont typeface="Wingdings" charset="2"/>
+              <a:buChar char=""/>
+            </a:pPr>
+            <a:r>
+              <a:rPr b="0" lang="en-US" sz="2200" spc="-1" strike="noStrike">
+                <a:latin typeface="Arial"/>
+              </a:rPr>
+              <a:t>Existe un sesgo hacia referencias religiosas y a hablar sobre hombres según la frecuencia de los términos “Jesus”, “God” y nombres masculinos en inglés.</a:t>
+            </a:r>
+            <a:endParaRPr b="0" lang="en-US" sz="2200" spc="-1" strike="noStrike">
+              <a:latin typeface="Arial"/>
+            </a:endParaRPr>
+          </a:p>
+          <a:p>
+            <a:pPr marL="216000" indent="-216000" algn="just">
+              <a:buClr>
+                <a:srgbClr val="000000"/>
+              </a:buClr>
+              <a:buSzPct val="45000"/>
+              <a:buFont typeface="Wingdings" charset="2"/>
+              <a:buChar char=""/>
+            </a:pPr>
+            <a:endParaRPr b="0" lang="en-US" sz="2200" spc="-1" strike="noStrike">
+              <a:latin typeface="Arial"/>
+            </a:endParaRPr>
+          </a:p>
+          <a:p>
+            <a:pPr marL="216000" indent="-216000" algn="just">
+              <a:buClr>
+                <a:srgbClr val="000000"/>
+              </a:buClr>
+              <a:buSzPct val="45000"/>
+              <a:buFont typeface="Wingdings" charset="2"/>
+              <a:buChar char=""/>
+            </a:pPr>
+            <a:r>
+              <a:rPr b="0" lang="en-US" sz="2200" spc="-1" strike="noStrike">
+                <a:latin typeface="Arial"/>
+              </a:rPr>
+              <a:t>El lugar más frecuentemente mencionado es los Estados Unidos referenciado tanto como país como en varios lugares dentro del él. Combinado con lo anterior, es posible pensar que hay un uso preferente de la plataforma por parte de los norteamericanos.</a:t>
+            </a:r>
+            <a:endParaRPr b="0" lang="en-US" sz="2200" spc="-1" strike="noStrike">
+              <a:latin typeface="Arial"/>
+            </a:endParaRPr>
+          </a:p>
+          <a:p>
+            <a:pPr marL="216000" indent="-216000" algn="just">
+              <a:buClr>
+                <a:srgbClr val="000000"/>
+              </a:buClr>
+              <a:buSzPct val="45000"/>
+              <a:buFont typeface="Wingdings" charset="2"/>
+              <a:buChar char=""/>
+            </a:pPr>
+            <a:endParaRPr b="0" lang="en-US" sz="2200" spc="-1" strike="noStrike">
+              <a:latin typeface="Arial"/>
+            </a:endParaRPr>
+          </a:p>
+          <a:p>
+            <a:pPr marL="216000" indent="-216000" algn="just">
+              <a:buClr>
+                <a:srgbClr val="000000"/>
+              </a:buClr>
+              <a:buSzPct val="45000"/>
+              <a:buFont typeface="Wingdings" charset="2"/>
+              <a:buChar char=""/>
+            </a:pPr>
+            <a:r>
+              <a:rPr b="0" lang="en-US" sz="2200" spc="-1" strike="noStrike">
+                <a:latin typeface="Arial"/>
+              </a:rPr>
+              <a:t>Los productos más son informáticos como Google, Excel, Netscape, Apache y Blogger. Esto puede estar dando cuenta de las tendencias de uso de software de los bloggers.</a:t>
+            </a:r>
+            <a:endParaRPr b="0" lang="en-US" sz="2200" spc="-1" strike="noStrike">
+              <a:latin typeface="Arial"/>
+            </a:endParaRPr>
+          </a:p>
+        </p:txBody>
+      </p:sp>
+    </p:spTree>
+  </p:cSld>
+  <mc:AlternateContent>
+    <mc:Choice Requires="p14">
+      <p:transition spd="slow" p14:dur="2000"/>
+    </mc:Choice>
+    <mc:Fallback>
+      <p:transition spd="slow"/>
+    </mc:Fallback>
+  </mc:AlternateContent>
+  <p:timing>
+    <p:tnLst>
+      <p:par>
+        <p:cTn id="41" dur="indefinite" restart="never" nodeType="tmRoot">
+          <p:childTnLst>
+            <p:seq>
+              <p:cTn id="42" dur="indefinite" nodeType="mainSeq"/>
+              <p:prevCondLst>
+                <p:cond delay="0" evt="onPrev">
+                  <p:tgtEl>
+                    <p:sldTgt/>
+                  </p:tgtEl>
+                </p:cond>
+              </p:prevCondLst>
+              <p:nextCondLst>
+                <p:cond delay="0" evt="onNext">
+                  <p:tgtEl>
+                    <p:sldTgt/>
+                  </p:tgtEl>
+                </p:cond>
+              </p:nextCondLst>
+            </p:seq>
+          </p:childTnLst>
+        </p:cTn>
+      </p:par>
+    </p:tnLst>
+  </p:timing>
+</p:sld>
+</file>
+
+<file path=ppt/slides/slide3.xml><?xml version="1.0" encoding="utf-8"?>
+<p:sld xmlns:a="http://schemas.openxmlformats.org/drawingml/2006/main" xmlns:p="http://schemas.openxmlformats.org/presentationml/2006/main" xmlns:r="http://schemas.openxmlformats.org/officeDocument/2006/relationships" xmlns:p14="http://schemas.microsoft.com/office/powerpoint/2010/main" xmlns:p15="http://schemas.microsoft.com/office/powerpoint/2012/main" xmlns:mc="http://schemas.openxmlformats.org/markup-compatibility/2006">
+  <p:cSld>
+    <p:spTree>
+      <p:nvGrpSpPr>
+        <p:cNvPr id="1" name=""/>
+        <p:cNvGrpSpPr/>
+        <p:nvPr/>
+      </p:nvGrpSpPr>
+      <p:grpSpPr>
+        <a:xfrm>
+          <a:off x="0" y="0"/>
+          <a:ext cx="0" cy="0"/>
+          <a:chOff x="0" y="0"/>
+          <a:chExt cx="0" cy="0"/>
+        </a:xfrm>
+      </p:grpSpPr>
+      <p:sp>
+        <p:nvSpPr>
+          <p:cNvPr id="41" name="TextShape 1"/>
+          <p:cNvSpPr txBox="1"/>
+          <p:nvPr/>
+        </p:nvSpPr>
+        <p:spPr>
+          <a:xfrm>
+            <a:off x="504000" y="226080"/>
+            <a:ext cx="9072000" cy="946440"/>
+          </a:xfrm>
+          <a:prstGeom prst="rect">
+            <a:avLst/>
+          </a:prstGeom>
+          <a:noFill/>
+          <a:ln>
+            <a:noFill/>
+          </a:ln>
+        </p:spPr>
+        <p:txBody>
+          <a:bodyPr lIns="0" rIns="0" tIns="0" bIns="0" anchor="ctr">
+            <a:spAutoFit/>
+          </a:bodyPr>
+          <a:p>
+            <a:pPr algn="ctr"/>
+            <a:r>
+              <a:rPr b="0" lang="en-US" sz="4400" spc="-1" strike="noStrike">
+                <a:latin typeface="Arial"/>
+              </a:rPr>
+              <a:t>Método</a:t>
+            </a:r>
+            <a:endParaRPr b="0" lang="en-US" sz="4400" spc="-1" strike="noStrike">
+              <a:latin typeface="Arial"/>
+            </a:endParaRPr>
+          </a:p>
+        </p:txBody>
+      </p:sp>
+      <p:sp>
+        <p:nvSpPr>
+          <p:cNvPr id="42" name="TextShape 2"/>
+          <p:cNvSpPr txBox="1"/>
+          <p:nvPr/>
+        </p:nvSpPr>
+        <p:spPr>
+          <a:xfrm>
+            <a:off x="504000" y="1974600"/>
+            <a:ext cx="9452160" cy="3288600"/>
+          </a:xfrm>
+          <a:prstGeom prst="rect">
+            <a:avLst/>
+          </a:prstGeom>
+          <a:noFill/>
+          <a:ln>
+            <a:noFill/>
+          </a:ln>
+        </p:spPr>
+        <p:txBody>
+          <a:bodyPr lIns="0" rIns="0" tIns="0" bIns="0">
+            <a:normAutofit/>
+          </a:bodyPr>
+          <a:p>
+            <a:pPr marL="432000" indent="-324000">
+              <a:spcBef>
+                <a:spcPts val="1417"/>
+              </a:spcBef>
+              <a:buClr>
+                <a:srgbClr val="000000"/>
+              </a:buClr>
+              <a:buSzPct val="45000"/>
+              <a:buFont typeface="Wingdings" charset="2"/>
+              <a:buChar char=""/>
+            </a:pPr>
+            <a:r>
+              <a:rPr b="0" lang="en-US" sz="3200" spc="-1" strike="noStrike">
+                <a:latin typeface="Arial"/>
+              </a:rPr>
+              <a:t>Comparación de las distribuciones de edad por temas mediante visualización y Análisis de Varianza</a:t>
+            </a:r>
+            <a:endParaRPr b="0" lang="en-US" sz="3200" spc="-1" strike="noStrike">
+              <a:latin typeface="Arial"/>
+            </a:endParaRPr>
+          </a:p>
+        </p:txBody>
+      </p:sp>
+    </p:spTree>
+  </p:cSld>
+  <mc:AlternateContent>
+    <mc:Choice Requires="p14">
+      <p:transition spd="slow" p14:dur="2000"/>
+    </mc:Choice>
+    <mc:Fallback>
+      <p:transition spd="slow"/>
+    </mc:Fallback>
+  </mc:AlternateContent>
+  <p:timing>
+    <p:tnLst>
+      <p:par>
+        <p:cTn id="5" dur="indefinite" restart="never" nodeType="tmRoot">
+          <p:childTnLst>
+            <p:seq>
+              <p:cTn id="6" dur="indefinite" nodeType="mainSeq"/>
+              <p:prevCondLst>
+                <p:cond delay="0" evt="onPrev">
+                  <p:tgtEl>
+                    <p:sldTgt/>
+                  </p:tgtEl>
+                </p:cond>
+              </p:prevCondLst>
+              <p:nextCondLst>
+                <p:cond delay="0" evt="onNext">
+                  <p:tgtEl>
+                    <p:sldTgt/>
+                  </p:tgtEl>
+                </p:cond>
+              </p:nextCondLst>
+            </p:seq>
+          </p:childTnLst>
+        </p:cTn>
+      </p:par>
+    </p:tnLst>
+  </p:timing>
+</p:sld>
+</file>
+
+<file path=ppt/slides/slide4.xml><?xml version="1.0" encoding="utf-8"?>
+<p:sld xmlns:a="http://schemas.openxmlformats.org/drawingml/2006/main" xmlns:p="http://schemas.openxmlformats.org/presentationml/2006/main" xmlns:r="http://schemas.openxmlformats.org/officeDocument/2006/relationships" xmlns:p14="http://schemas.microsoft.com/office/powerpoint/2010/main" xmlns:p15="http://schemas.microsoft.com/office/powerpoint/2012/main" xmlns:mc="http://schemas.openxmlformats.org/markup-compatibility/2006">
+  <p:cSld>
+    <p:spTree>
+      <p:nvGrpSpPr>
+        <p:cNvPr id="1" name=""/>
+        <p:cNvGrpSpPr/>
+        <p:nvPr/>
+      </p:nvGrpSpPr>
+      <p:grpSpPr>
+        <a:xfrm>
+          <a:off x="0" y="0"/>
+          <a:ext cx="0" cy="0"/>
+          <a:chOff x="0" y="0"/>
+          <a:chExt cx="0" cy="0"/>
+        </a:xfrm>
+      </p:grpSpPr>
+      <p:sp>
+        <p:nvSpPr>
+          <p:cNvPr id="43" name="TextShape 1"/>
+          <p:cNvSpPr txBox="1"/>
+          <p:nvPr/>
+        </p:nvSpPr>
+        <p:spPr>
+          <a:xfrm>
+            <a:off x="504000" y="226080"/>
+            <a:ext cx="9072000" cy="946440"/>
+          </a:xfrm>
+          <a:prstGeom prst="rect">
+            <a:avLst/>
+          </a:prstGeom>
+          <a:noFill/>
+          <a:ln>
+            <a:noFill/>
+          </a:ln>
+        </p:spPr>
+        <p:txBody>
+          <a:bodyPr lIns="0" rIns="0" tIns="0" bIns="0" anchor="ctr">
+            <a:spAutoFit/>
+          </a:bodyPr>
+          <a:p>
+            <a:pPr algn="ctr"/>
+            <a:r>
+              <a:rPr b="0" lang="en-US" sz="4400" spc="-1" strike="noStrike">
+                <a:latin typeface="Arial"/>
+              </a:rPr>
+              <a:t>Resultados</a:t>
+            </a:r>
+            <a:endParaRPr b="0" lang="en-US" sz="4400" spc="-1" strike="noStrike">
+              <a:latin typeface="Arial"/>
+            </a:endParaRPr>
+          </a:p>
+        </p:txBody>
+      </p:sp>
+      <p:pic>
+        <p:nvPicPr>
+          <p:cNvPr id="44" name="" descr=""/>
+          <p:cNvPicPr/>
+          <p:nvPr/>
+        </p:nvPicPr>
+        <p:blipFill>
+          <a:blip r:embed="rId1"/>
+          <a:stretch/>
+        </p:blipFill>
+        <p:spPr>
+          <a:xfrm>
+            <a:off x="2880" y="1689840"/>
+            <a:ext cx="10080360" cy="2795040"/>
+          </a:xfrm>
+          <a:prstGeom prst="rect">
+            <a:avLst/>
+          </a:prstGeom>
+          <a:ln>
+            <a:noFill/>
+          </a:ln>
+        </p:spPr>
+      </p:pic>
+    </p:spTree>
+  </p:cSld>
+  <mc:AlternateContent>
+    <mc:Choice Requires="p14">
+      <p:transition spd="slow" p14:dur="2000"/>
+    </mc:Choice>
+    <mc:Fallback>
+      <p:transition spd="slow"/>
+    </mc:Fallback>
+  </mc:AlternateContent>
+  <p:timing>
+    <p:tnLst>
+      <p:par>
+        <p:cTn id="7" dur="indefinite" restart="never" nodeType="tmRoot">
+          <p:childTnLst>
+            <p:seq>
+              <p:cTn id="8" dur="indefinite" nodeType="mainSeq"/>
+              <p:prevCondLst>
+                <p:cond delay="0" evt="onPrev">
+                  <p:tgtEl>
+                    <p:sldTgt/>
+                  </p:tgtEl>
+                </p:cond>
+              </p:prevCondLst>
+              <p:nextCondLst>
+                <p:cond delay="0" evt="onNext">
+                  <p:tgtEl>
+                    <p:sldTgt/>
+                  </p:tgtEl>
+                </p:cond>
+              </p:nextCondLst>
+            </p:seq>
+          </p:childTnLst>
+        </p:cTn>
+      </p:par>
+    </p:tnLst>
+  </p:timing>
+</p:sld>
+</file>
+
+<file path=ppt/slides/slide5.xml><?xml version="1.0" encoding="utf-8"?>
+<p:sld xmlns:a="http://schemas.openxmlformats.org/drawingml/2006/main" xmlns:p="http://schemas.openxmlformats.org/presentationml/2006/main" xmlns:r="http://schemas.openxmlformats.org/officeDocument/2006/relationships" xmlns:p14="http://schemas.microsoft.com/office/powerpoint/2010/main" xmlns:p15="http://schemas.microsoft.com/office/powerpoint/2012/main" xmlns:mc="http://schemas.openxmlformats.org/markup-compatibility/2006">
+  <p:cSld>
+    <p:spTree>
+      <p:nvGrpSpPr>
+        <p:cNvPr id="1" name=""/>
+        <p:cNvGrpSpPr/>
+        <p:nvPr/>
+      </p:nvGrpSpPr>
+      <p:grpSpPr>
+        <a:xfrm>
+          <a:off x="0" y="0"/>
+          <a:ext cx="0" cy="0"/>
+          <a:chOff x="0" y="0"/>
+          <a:chExt cx="0" cy="0"/>
+        </a:xfrm>
+      </p:grpSpPr>
+      <p:sp>
+        <p:nvSpPr>
+          <p:cNvPr id="45" name="TextShape 1"/>
+          <p:cNvSpPr txBox="1"/>
+          <p:nvPr/>
+        </p:nvSpPr>
+        <p:spPr>
+          <a:xfrm>
+            <a:off x="504000" y="226080"/>
+            <a:ext cx="9072000" cy="946440"/>
+          </a:xfrm>
+          <a:prstGeom prst="rect">
+            <a:avLst/>
+          </a:prstGeom>
+          <a:noFill/>
+          <a:ln>
+            <a:noFill/>
+          </a:ln>
+        </p:spPr>
+        <p:txBody>
+          <a:bodyPr lIns="0" rIns="0" tIns="0" bIns="0" anchor="ctr">
+            <a:spAutoFit/>
+          </a:bodyPr>
+          <a:p>
+            <a:pPr algn="ctr"/>
+            <a:r>
+              <a:rPr b="0" lang="en-US" sz="4400" spc="-1" strike="noStrike">
+                <a:latin typeface="Arial"/>
+              </a:rPr>
+              <a:t>Resultados</a:t>
+            </a:r>
+            <a:endParaRPr b="0" lang="en-US" sz="4400" spc="-1" strike="noStrike">
+              <a:latin typeface="Arial"/>
+            </a:endParaRPr>
+          </a:p>
+        </p:txBody>
+      </p:sp>
+      <p:pic>
+        <p:nvPicPr>
+          <p:cNvPr id="46" name="" descr=""/>
+          <p:cNvPicPr/>
+          <p:nvPr/>
+        </p:nvPicPr>
+        <p:blipFill>
+          <a:blip r:embed="rId1"/>
+          <a:stretch/>
+        </p:blipFill>
+        <p:spPr>
+          <a:xfrm>
+            <a:off x="2880" y="1689840"/>
+            <a:ext cx="10080360" cy="2795040"/>
+          </a:xfrm>
+          <a:prstGeom prst="rect">
+            <a:avLst/>
+          </a:prstGeom>
+          <a:ln>
+            <a:noFill/>
+          </a:ln>
+        </p:spPr>
+      </p:pic>
+    </p:spTree>
+  </p:cSld>
+  <mc:AlternateContent>
+    <mc:Choice Requires="p14">
+      <p:transition spd="slow" p14:dur="2000"/>
+    </mc:Choice>
+    <mc:Fallback>
+      <p:transition spd="slow"/>
+    </mc:Fallback>
+  </mc:AlternateContent>
+  <p:timing>
+    <p:tnLst>
+      <p:par>
+        <p:cTn id="9" dur="indefinite" restart="never" nodeType="tmRoot">
+          <p:childTnLst>
+            <p:seq>
+              <p:cTn id="10" dur="indefinite" nodeType="mainSeq"/>
+              <p:prevCondLst>
+                <p:cond delay="0" evt="onPrev">
+                  <p:tgtEl>
+                    <p:sldTgt/>
+                  </p:tgtEl>
+                </p:cond>
+              </p:prevCondLst>
+              <p:nextCondLst>
+                <p:cond delay="0" evt="onNext">
+                  <p:tgtEl>
+                    <p:sldTgt/>
+                  </p:tgtEl>
+                </p:cond>
+              </p:nextCondLst>
+            </p:seq>
+          </p:childTnLst>
+        </p:cTn>
+      </p:par>
+    </p:tnLst>
+  </p:timing>
+</p:sld>
+</file>
+
+<file path=ppt/slides/slide6.xml><?xml version="1.0" encoding="utf-8"?>
+<p:sld xmlns:a="http://schemas.openxmlformats.org/drawingml/2006/main" xmlns:p="http://schemas.openxmlformats.org/presentationml/2006/main" xmlns:r="http://schemas.openxmlformats.org/officeDocument/2006/relationships" xmlns:p14="http://schemas.microsoft.com/office/powerpoint/2010/main" xmlns:p15="http://schemas.microsoft.com/office/powerpoint/2012/main" xmlns:mc="http://schemas.openxmlformats.org/markup-compatibility/2006">
+  <p:cSld>
+    <p:spTree>
+      <p:nvGrpSpPr>
+        <p:cNvPr id="1" name=""/>
+        <p:cNvGrpSpPr/>
+        <p:nvPr/>
+      </p:nvGrpSpPr>
+      <p:grpSpPr>
+        <a:xfrm>
+          <a:off x="0" y="0"/>
+          <a:ext cx="0" cy="0"/>
+          <a:chOff x="0" y="0"/>
+          <a:chExt cx="0" cy="0"/>
+        </a:xfrm>
+      </p:grpSpPr>
+      <p:sp>
+        <p:nvSpPr>
+          <p:cNvPr id="47" name="TextShape 1"/>
+          <p:cNvSpPr txBox="1"/>
+          <p:nvPr/>
+        </p:nvSpPr>
+        <p:spPr>
+          <a:xfrm>
+            <a:off x="504000" y="226080"/>
+            <a:ext cx="9072000" cy="946440"/>
+          </a:xfrm>
+          <a:prstGeom prst="rect">
+            <a:avLst/>
+          </a:prstGeom>
+          <a:noFill/>
+          <a:ln>
+            <a:noFill/>
+          </a:ln>
+        </p:spPr>
+        <p:txBody>
+          <a:bodyPr lIns="0" rIns="0" tIns="0" bIns="0" anchor="ctr">
+            <a:spAutoFit/>
+          </a:bodyPr>
+          <a:p>
+            <a:pPr algn="ctr"/>
+            <a:r>
+              <a:rPr b="0" lang="en-US" sz="4400" spc="-1" strike="noStrike">
+                <a:latin typeface="Arial"/>
+              </a:rPr>
+              <a:t>Resultados</a:t>
+            </a:r>
+            <a:endParaRPr b="0" lang="en-US" sz="4400" spc="-1" strike="noStrike">
+              <a:latin typeface="Arial"/>
+            </a:endParaRPr>
+          </a:p>
+        </p:txBody>
+      </p:sp>
+      <p:pic>
+        <p:nvPicPr>
+          <p:cNvPr id="48" name="" descr=""/>
+          <p:cNvPicPr/>
+          <p:nvPr/>
+        </p:nvPicPr>
+        <p:blipFill>
+          <a:blip r:embed="rId1"/>
+          <a:stretch/>
+        </p:blipFill>
+        <p:spPr>
+          <a:xfrm>
+            <a:off x="2880" y="1707120"/>
+            <a:ext cx="10080360" cy="2795040"/>
+          </a:xfrm>
+          <a:prstGeom prst="rect">
+            <a:avLst/>
+          </a:prstGeom>
+          <a:ln>
+            <a:noFill/>
+          </a:ln>
+        </p:spPr>
+      </p:pic>
+    </p:spTree>
+  </p:cSld>
+  <mc:AlternateContent>
+    <mc:Choice Requires="p14">
+      <p:transition spd="slow" p14:dur="2000"/>
+    </mc:Choice>
+    <mc:Fallback>
+      <p:transition spd="slow"/>
+    </mc:Fallback>
+  </mc:AlternateContent>
+  <p:timing>
+    <p:tnLst>
+      <p:par>
+        <p:cTn id="11" dur="indefinite" restart="never" nodeType="tmRoot">
+          <p:childTnLst>
+            <p:seq>
+              <p:cTn id="12" dur="indefinite" nodeType="mainSeq"/>
+              <p:prevCondLst>
+                <p:cond delay="0" evt="onPrev">
+                  <p:tgtEl>
+                    <p:sldTgt/>
+                  </p:tgtEl>
+                </p:cond>
+              </p:prevCondLst>
+              <p:nextCondLst>
+                <p:cond delay="0" evt="onNext">
+                  <p:tgtEl>
+                    <p:sldTgt/>
+                  </p:tgtEl>
+                </p:cond>
+              </p:nextCondLst>
+            </p:seq>
+          </p:childTnLst>
+        </p:cTn>
+      </p:par>
+    </p:tnLst>
+  </p:timing>
+</p:sld>
+</file>
+
+<file path=ppt/slides/slide7.xml><?xml version="1.0" encoding="utf-8"?>
+<p:sld xmlns:a="http://schemas.openxmlformats.org/drawingml/2006/main" xmlns:p="http://schemas.openxmlformats.org/presentationml/2006/main" xmlns:r="http://schemas.openxmlformats.org/officeDocument/2006/relationships" xmlns:p14="http://schemas.microsoft.com/office/powerpoint/2010/main" xmlns:p15="http://schemas.microsoft.com/office/powerpoint/2012/main" xmlns:mc="http://schemas.openxmlformats.org/markup-compatibility/2006">
+  <p:cSld>
+    <p:spTree>
+      <p:nvGrpSpPr>
+        <p:cNvPr id="1" name=""/>
+        <p:cNvGrpSpPr/>
+        <p:nvPr/>
+      </p:nvGrpSpPr>
+      <p:grpSpPr>
+        <a:xfrm>
+          <a:off x="0" y="0"/>
+          <a:ext cx="0" cy="0"/>
+          <a:chOff x="0" y="0"/>
+          <a:chExt cx="0" cy="0"/>
+        </a:xfrm>
+      </p:grpSpPr>
+      <p:sp>
+        <p:nvSpPr>
+          <p:cNvPr id="49" name="TextShape 1"/>
+          <p:cNvSpPr txBox="1"/>
+          <p:nvPr/>
+        </p:nvSpPr>
+        <p:spPr>
+          <a:xfrm>
+            <a:off x="504000" y="226080"/>
+            <a:ext cx="9072000" cy="946440"/>
+          </a:xfrm>
+          <a:prstGeom prst="rect">
+            <a:avLst/>
+          </a:prstGeom>
+          <a:noFill/>
+          <a:ln>
+            <a:noFill/>
+          </a:ln>
+        </p:spPr>
+        <p:txBody>
+          <a:bodyPr lIns="0" rIns="0" tIns="0" bIns="0" anchor="ctr">
+            <a:spAutoFit/>
+          </a:bodyPr>
+          <a:p>
+            <a:pPr algn="ctr"/>
+            <a:r>
+              <a:rPr b="0" lang="en-US" sz="4400" spc="-1" strike="noStrike">
+                <a:latin typeface="Arial"/>
+              </a:rPr>
+              <a:t>Insights principales</a:t>
+            </a:r>
+            <a:endParaRPr b="0" lang="en-US" sz="4400" spc="-1" strike="noStrike">
+              <a:latin typeface="Arial"/>
+            </a:endParaRPr>
+          </a:p>
+        </p:txBody>
+      </p:sp>
+      <p:sp>
+        <p:nvSpPr>
+          <p:cNvPr id="50" name="TextShape 2"/>
+          <p:cNvSpPr txBox="1"/>
+          <p:nvPr/>
+        </p:nvSpPr>
+        <p:spPr>
+          <a:xfrm>
+            <a:off x="504000" y="1479240"/>
+            <a:ext cx="9072000" cy="3288600"/>
+          </a:xfrm>
+          <a:prstGeom prst="rect">
+            <a:avLst/>
+          </a:prstGeom>
+          <a:noFill/>
+          <a:ln>
+            <a:noFill/>
+          </a:ln>
+        </p:spPr>
+        <p:txBody>
+          <a:bodyPr lIns="0" rIns="0" tIns="0" bIns="0" anchor="ctr">
+            <a:spAutoFit/>
+          </a:bodyPr>
+          <a:p>
+            <a:pPr marL="216000" indent="-216000" algn="just">
+              <a:buClr>
+                <a:srgbClr val="000000"/>
+              </a:buClr>
+              <a:buSzPct val="45000"/>
+              <a:buFont typeface="Wingdings" charset="2"/>
+              <a:buChar char=""/>
+            </a:pPr>
+            <a:r>
+              <a:rPr b="0" lang="en-US" sz="2200" spc="-1" strike="noStrike">
+                <a:latin typeface="Arial"/>
+              </a:rPr>
+              <a:t>Las entradas sobre "Estudiantes" se concentran en el rango más bajo de edades, cerca de los 15 años.</a:t>
+            </a:r>
+            <a:endParaRPr b="0" lang="en-US" sz="2200" spc="-1" strike="noStrike">
+              <a:latin typeface="Arial"/>
+            </a:endParaRPr>
+          </a:p>
+          <a:p>
+            <a:pPr marL="216000" indent="-216000" algn="just">
+              <a:buClr>
+                <a:srgbClr val="000000"/>
+              </a:buClr>
+              <a:buSzPct val="45000"/>
+              <a:buFont typeface="Wingdings" charset="2"/>
+              <a:buChar char=""/>
+            </a:pPr>
+            <a:endParaRPr b="0" lang="en-US" sz="2200" spc="-1" strike="noStrike">
+              <a:latin typeface="Arial"/>
+            </a:endParaRPr>
+          </a:p>
+          <a:p>
+            <a:pPr marL="216000" indent="-216000" algn="just">
+              <a:buClr>
+                <a:srgbClr val="000000"/>
+              </a:buClr>
+              <a:buSzPct val="45000"/>
+              <a:buFont typeface="Wingdings" charset="2"/>
+              <a:buChar char=""/>
+            </a:pPr>
+            <a:r>
+              <a:rPr b="0" lang="en-US" sz="2200" spc="-1" strike="noStrike">
+                <a:latin typeface="Arial"/>
+              </a:rPr>
+              <a:t>Los temas referentes a "Medio ambiente", "Artes", "Químicos", "Ingeniería", "Turismo", "Ciencia", "Arquitectura", "Banca", "Servicios para negocios", "Leyes", "Gobierno", "Mercadeo" son abordados casi que exclusivamente por adultos jóvenes de alrededor de 25 años.</a:t>
+            </a:r>
+            <a:endParaRPr b="0" lang="en-US" sz="2200" spc="-1" strike="noStrike">
+              <a:latin typeface="Arial"/>
+            </a:endParaRPr>
+          </a:p>
+          <a:p>
+            <a:pPr marL="216000" indent="-216000" algn="just">
+              <a:buClr>
+                <a:srgbClr val="000000"/>
+              </a:buClr>
+              <a:buSzPct val="45000"/>
+              <a:buFont typeface="Wingdings" charset="2"/>
+              <a:buChar char=""/>
+            </a:pPr>
+            <a:endParaRPr b="0" lang="en-US" sz="2200" spc="-1" strike="noStrike">
+              <a:latin typeface="Arial"/>
+            </a:endParaRPr>
+          </a:p>
+          <a:p>
+            <a:pPr marL="216000" indent="-216000" algn="just">
+              <a:buClr>
+                <a:srgbClr val="000000"/>
+              </a:buClr>
+              <a:buSzPct val="45000"/>
+              <a:buFont typeface="Wingdings" charset="2"/>
+              <a:buChar char=""/>
+            </a:pPr>
+            <a:r>
+              <a:rPr b="0" lang="en-US" sz="2200" spc="-1" strike="noStrike">
+                <a:latin typeface="Arial"/>
+              </a:rPr>
+              <a:t>Los demás temas son abordados por un rango más amplio de edades.</a:t>
+            </a:r>
+            <a:endParaRPr b="0" lang="en-US" sz="2200" spc="-1" strike="noStrike">
+              <a:latin typeface="Arial"/>
+            </a:endParaRPr>
+          </a:p>
+        </p:txBody>
+      </p:sp>
+    </p:spTree>
+  </p:cSld>
+  <mc:AlternateContent>
+    <mc:Choice Requires="p14">
+      <p:transition spd="slow" p14:dur="2000"/>
+    </mc:Choice>
+    <mc:Fallback>
+      <p:transition spd="slow"/>
+    </mc:Fallback>
+  </mc:AlternateContent>
+  <p:timing>
+    <p:tnLst>
+      <p:par>
+        <p:cTn id="13" dur="indefinite" restart="never" nodeType="tmRoot">
+          <p:childTnLst>
+            <p:seq>
+              <p:cTn id="14" dur="indefinite" nodeType="mainSeq"/>
+              <p:prevCondLst>
+                <p:cond delay="0" evt="onPrev">
+                  <p:tgtEl>
+                    <p:sldTgt/>
+                  </p:tgtEl>
+                </p:cond>
+              </p:prevCondLst>
+              <p:nextCondLst>
+                <p:cond delay="0" evt="onNext">
+                  <p:tgtEl>
+                    <p:sldTgt/>
+                  </p:tgtEl>
+                </p:cond>
+              </p:nextCondLst>
+            </p:seq>
+          </p:childTnLst>
+        </p:cTn>
+      </p:par>
+    </p:tnLst>
+  </p:timing>
+</p:sld>
+</file>
+
+<file path=ppt/slides/slide8.xml><?xml version="1.0" encoding="utf-8"?>
+<p:sld xmlns:a="http://schemas.openxmlformats.org/drawingml/2006/main" xmlns:p="http://schemas.openxmlformats.org/presentationml/2006/main" xmlns:r="http://schemas.openxmlformats.org/officeDocument/2006/relationships" xmlns:p14="http://schemas.microsoft.com/office/powerpoint/2010/main" xmlns:p15="http://schemas.microsoft.com/office/powerpoint/2012/main" xmlns:mc="http://schemas.openxmlformats.org/markup-compatibility/2006">
+  <p:cSld>
+    <p:spTree>
+      <p:nvGrpSpPr>
+        <p:cNvPr id="1" name=""/>
+        <p:cNvGrpSpPr/>
+        <p:nvPr/>
+      </p:nvGrpSpPr>
+      <p:grpSpPr>
+        <a:xfrm>
+          <a:off x="0" y="0"/>
+          <a:ext cx="0" cy="0"/>
+          <a:chOff x="0" y="0"/>
+          <a:chExt cx="0" cy="0"/>
+        </a:xfrm>
+      </p:grpSpPr>
+      <p:sp>
+        <p:nvSpPr>
+          <p:cNvPr id="51" name="TextShape 1"/>
+          <p:cNvSpPr txBox="1"/>
+          <p:nvPr/>
+        </p:nvSpPr>
+        <p:spPr>
+          <a:xfrm>
+            <a:off x="504360" y="2362320"/>
+            <a:ext cx="9072000" cy="946440"/>
+          </a:xfrm>
+          <a:prstGeom prst="rect">
+            <a:avLst/>
+          </a:prstGeom>
+          <a:noFill/>
+          <a:ln>
+            <a:noFill/>
+          </a:ln>
+        </p:spPr>
+        <p:txBody>
+          <a:bodyPr lIns="0" rIns="0" tIns="0" bIns="0" anchor="ctr">
+            <a:spAutoFit/>
+          </a:bodyPr>
+          <a:p>
+            <a:pPr algn="ctr"/>
+            <a:r>
+              <a:rPr b="0" lang="en-US" sz="4400" spc="-1" strike="noStrike">
+                <a:latin typeface="Arial"/>
+              </a:rPr>
+              <a:t>Segmentación de temas por género</a:t>
+            </a:r>
+            <a:endParaRPr b="0" lang="en-US" sz="4400" spc="-1" strike="noStrike">
+              <a:latin typeface="Arial"/>
+            </a:endParaRPr>
+          </a:p>
+        </p:txBody>
+      </p:sp>
+    </p:spTree>
+  </p:cSld>
+  <mc:AlternateContent>
+    <mc:Choice Requires="p14">
+      <p:transition spd="slow" p14:dur="2000"/>
+    </mc:Choice>
+    <mc:Fallback>
+      <p:transition spd="slow"/>
+    </mc:Fallback>
+  </mc:AlternateContent>
+  <p:timing>
+    <p:tnLst>
+      <p:par>
+        <p:cTn id="15" dur="indefinite" restart="never" nodeType="tmRoot">
+          <p:childTnLst>
+            <p:seq>
+              <p:cTn id="16" dur="indefinite" nodeType="mainSeq"/>
+              <p:prevCondLst>
+                <p:cond delay="0" evt="onPrev">
+                  <p:tgtEl>
+                    <p:sldTgt/>
+                  </p:tgtEl>
+                </p:cond>
+              </p:prevCondLst>
+              <p:nextCondLst>
+                <p:cond delay="0" evt="onNext">
+                  <p:tgtEl>
+                    <p:sldTgt/>
+                  </p:tgtEl>
+                </p:cond>
+              </p:nextCondLst>
+            </p:seq>
+          </p:childTnLst>
+        </p:cTn>
+      </p:par>
+    </p:tnLst>
+  </p:timing>
+</p:sld>
+</file>
+
+<file path=ppt/slides/slide9.xml><?xml version="1.0" encoding="utf-8"?>
+<p:sld xmlns:a="http://schemas.openxmlformats.org/drawingml/2006/main" xmlns:p="http://schemas.openxmlformats.org/presentationml/2006/main" xmlns:r="http://schemas.openxmlformats.org/officeDocument/2006/relationships" xmlns:p14="http://schemas.microsoft.com/office/powerpoint/2010/main" xmlns:p15="http://schemas.microsoft.com/office/powerpoint/2012/main" xmlns:mc="http://schemas.openxmlformats.org/markup-compatibility/2006">
+  <p:cSld>
+    <p:spTree>
+      <p:nvGrpSpPr>
+        <p:cNvPr id="1" name=""/>
+        <p:cNvGrpSpPr/>
+        <p:nvPr/>
+      </p:nvGrpSpPr>
+      <p:grpSpPr>
+        <a:xfrm>
+          <a:off x="0" y="0"/>
+          <a:ext cx="0" cy="0"/>
+          <a:chOff x="0" y="0"/>
+          <a:chExt cx="0" cy="0"/>
+        </a:xfrm>
+      </p:grpSpPr>
+      <p:sp>
+        <p:nvSpPr>
+          <p:cNvPr id="52" name="TextShape 1"/>
+          <p:cNvSpPr txBox="1"/>
+          <p:nvPr/>
+        </p:nvSpPr>
+        <p:spPr>
+          <a:xfrm>
+            <a:off x="504000" y="226080"/>
+            <a:ext cx="9072000" cy="946440"/>
+          </a:xfrm>
+          <a:prstGeom prst="rect">
+            <a:avLst/>
+          </a:prstGeom>
+          <a:noFill/>
+          <a:ln>
+            <a:noFill/>
+          </a:ln>
+        </p:spPr>
+        <p:txBody>
+          <a:bodyPr lIns="0" rIns="0" tIns="0" bIns="0" anchor="ctr">
+            <a:spAutoFit/>
+          </a:bodyPr>
+          <a:p>
+            <a:pPr algn="ctr"/>
+            <a:r>
+              <a:rPr b="0" lang="en-US" sz="4400" spc="-1" strike="noStrike">
+                <a:latin typeface="Arial"/>
+              </a:rPr>
+              <a:t>Método</a:t>
+            </a:r>
+            <a:endParaRPr b="0" lang="en-US" sz="4400" spc="-1" strike="noStrike">
+              <a:latin typeface="Arial"/>
+            </a:endParaRPr>
+          </a:p>
+        </p:txBody>
+      </p:sp>
+      <p:sp>
+        <p:nvSpPr>
+          <p:cNvPr id="53" name="TextShape 2"/>
+          <p:cNvSpPr txBox="1"/>
+          <p:nvPr/>
+        </p:nvSpPr>
+        <p:spPr>
+          <a:xfrm>
+            <a:off x="504000" y="1974600"/>
+            <a:ext cx="9452160" cy="3288600"/>
+          </a:xfrm>
+          <a:prstGeom prst="rect">
+            <a:avLst/>
+          </a:prstGeom>
+          <a:noFill/>
+          <a:ln>
+            <a:noFill/>
+          </a:ln>
+        </p:spPr>
+        <p:txBody>
+          <a:bodyPr lIns="0" rIns="0" tIns="0" bIns="0">
+            <a:normAutofit/>
+          </a:bodyPr>
+          <a:p>
+            <a:pPr marL="432000" indent="-324000">
+              <a:spcBef>
+                <a:spcPts val="1417"/>
+              </a:spcBef>
+              <a:buClr>
+                <a:srgbClr val="000000"/>
+              </a:buClr>
+              <a:buSzPct val="45000"/>
+              <a:buFont typeface="Wingdings" charset="2"/>
+              <a:buChar char=""/>
+            </a:pPr>
+            <a:r>
+              <a:rPr b="0" lang="en-US" sz="3200" spc="-1" strike="noStrike">
+                <a:latin typeface="Arial"/>
+              </a:rPr>
+              <a:t>Comparación de las distribuciones de edad por temas mediante visualización y Análisis de Chi-cuadrado.</a:t>
+            </a:r>
+            <a:endParaRPr b="0" lang="en-US" sz="3200" spc="-1" strike="noStrike">
+              <a:latin typeface="Arial"/>
+            </a:endParaRPr>
+          </a:p>
+        </p:txBody>
+      </p:sp>
+    </p:spTree>
+  </p:cSld>
+  <mc:AlternateContent>
+    <mc:Choice Requires="p14">
+      <p:transition spd="slow" p14:dur="2000"/>
+    </mc:Choice>
+    <mc:Fallback>
+      <p:transition spd="slow"/>
+    </mc:Fallback>
+  </mc:AlternateContent>
+  <p:timing>
+    <p:tnLst>
+      <p:par>
+        <p:cTn id="17" dur="indefinite" restart="never" nodeType="tmRoot">
+          <p:childTnLst>
+            <p:seq>
+              <p:cTn id="18" dur="indefinite" nodeType="mainSeq"/>
               <p:prevCondLst>
                 <p:cond delay="0" evt="onPrev">
                   <p:tgtEl>

</xml_diff>